<commit_message>
Added data source link to home page
</commit_message>
<xml_diff>
--- a/Project_2.pptx
+++ b/Project_2.pptx
@@ -6,12 +6,11 @@
   </p:sldMasterIdLst>
   <p:sldIdLst>
     <p:sldId id="293" r:id="rId5"/>
-    <p:sldId id="295" r:id="rId6"/>
-    <p:sldId id="296" r:id="rId7"/>
-    <p:sldId id="297" r:id="rId8"/>
-    <p:sldId id="300" r:id="rId9"/>
-    <p:sldId id="302" r:id="rId10"/>
-    <p:sldId id="299" r:id="rId11"/>
+    <p:sldId id="296" r:id="rId6"/>
+    <p:sldId id="297" r:id="rId7"/>
+    <p:sldId id="300" r:id="rId8"/>
+    <p:sldId id="302" r:id="rId9"/>
+    <p:sldId id="299" r:id="rId10"/>
   </p:sldIdLst>
   <p:sldSz cx="12192000" cy="6858000"/>
   <p:notesSz cx="6858000" cy="9144000"/>
@@ -124,4221 +123,6 @@
     <p1510:client id="{DBCE25DA-52FF-48BC-A975-FE3F7DD68B40}" v="105" dt="2021-02-03T07:33:47.266"/>
   </p1510:revLst>
 </p1510:revInfo>
-</file>
-
-<file path=ppt/diagrams/colors1.xml><?xml version="1.0" encoding="utf-8"?>
-<dgm:colorsDef xmlns:dgm="http://schemas.openxmlformats.org/drawingml/2006/diagram" xmlns:a="http://schemas.openxmlformats.org/drawingml/2006/main" uniqueId="urn:microsoft.com/office/officeart/2005/8/colors/accent1_2">
-  <dgm:title val=""/>
-  <dgm:desc val=""/>
-  <dgm:catLst>
-    <dgm:cat type="accent1" pri="11200"/>
-  </dgm:catLst>
-  <dgm:styleLbl name="node0">
-    <dgm:fillClrLst meth="repeat">
-      <a:schemeClr val="accent1"/>
-    </dgm:fillClrLst>
-    <dgm:linClrLst meth="repeat">
-      <a:schemeClr val="lt1"/>
-    </dgm:linClrLst>
-    <dgm:effectClrLst/>
-    <dgm:txLinClrLst/>
-    <dgm:txFillClrLst/>
-    <dgm:txEffectClrLst/>
-  </dgm:styleLbl>
-  <dgm:styleLbl name="alignNode1">
-    <dgm:fillClrLst meth="repeat">
-      <a:schemeClr val="accent1"/>
-    </dgm:fillClrLst>
-    <dgm:linClrLst meth="repeat">
-      <a:schemeClr val="accent1"/>
-    </dgm:linClrLst>
-    <dgm:effectClrLst/>
-    <dgm:txLinClrLst/>
-    <dgm:txFillClrLst/>
-    <dgm:txEffectClrLst/>
-  </dgm:styleLbl>
-  <dgm:styleLbl name="node1">
-    <dgm:fillClrLst meth="repeat">
-      <a:schemeClr val="accent1"/>
-    </dgm:fillClrLst>
-    <dgm:linClrLst meth="repeat">
-      <a:schemeClr val="lt1"/>
-    </dgm:linClrLst>
-    <dgm:effectClrLst/>
-    <dgm:txLinClrLst/>
-    <dgm:txFillClrLst/>
-    <dgm:txEffectClrLst/>
-  </dgm:styleLbl>
-  <dgm:styleLbl name="lnNode1">
-    <dgm:fillClrLst meth="repeat">
-      <a:schemeClr val="accent1"/>
-    </dgm:fillClrLst>
-    <dgm:linClrLst meth="repeat">
-      <a:schemeClr val="lt1"/>
-    </dgm:linClrLst>
-    <dgm:effectClrLst/>
-    <dgm:txLinClrLst/>
-    <dgm:txFillClrLst/>
-    <dgm:txEffectClrLst/>
-  </dgm:styleLbl>
-  <dgm:styleLbl name="vennNode1">
-    <dgm:fillClrLst meth="repeat">
-      <a:schemeClr val="accent1">
-        <a:alpha val="50000"/>
-      </a:schemeClr>
-    </dgm:fillClrLst>
-    <dgm:linClrLst meth="repeat">
-      <a:schemeClr val="lt1"/>
-    </dgm:linClrLst>
-    <dgm:effectClrLst/>
-    <dgm:txLinClrLst/>
-    <dgm:txFillClrLst/>
-    <dgm:txEffectClrLst/>
-  </dgm:styleLbl>
-  <dgm:styleLbl name="node2">
-    <dgm:fillClrLst meth="repeat">
-      <a:schemeClr val="accent1"/>
-    </dgm:fillClrLst>
-    <dgm:linClrLst meth="repeat">
-      <a:schemeClr val="lt1"/>
-    </dgm:linClrLst>
-    <dgm:effectClrLst/>
-    <dgm:txLinClrLst/>
-    <dgm:txFillClrLst/>
-    <dgm:txEffectClrLst/>
-  </dgm:styleLbl>
-  <dgm:styleLbl name="node3">
-    <dgm:fillClrLst meth="repeat">
-      <a:schemeClr val="accent1"/>
-    </dgm:fillClrLst>
-    <dgm:linClrLst meth="repeat">
-      <a:schemeClr val="lt1"/>
-    </dgm:linClrLst>
-    <dgm:effectClrLst/>
-    <dgm:txLinClrLst/>
-    <dgm:txFillClrLst/>
-    <dgm:txEffectClrLst/>
-  </dgm:styleLbl>
-  <dgm:styleLbl name="node4">
-    <dgm:fillClrLst meth="repeat">
-      <a:schemeClr val="accent1"/>
-    </dgm:fillClrLst>
-    <dgm:linClrLst meth="repeat">
-      <a:schemeClr val="lt1"/>
-    </dgm:linClrLst>
-    <dgm:effectClrLst/>
-    <dgm:txLinClrLst/>
-    <dgm:txFillClrLst/>
-    <dgm:txEffectClrLst/>
-  </dgm:styleLbl>
-  <dgm:styleLbl name="fgImgPlace1">
-    <dgm:fillClrLst meth="repeat">
-      <a:schemeClr val="accent1">
-        <a:tint val="50000"/>
-      </a:schemeClr>
-    </dgm:fillClrLst>
-    <dgm:linClrLst meth="repeat">
-      <a:schemeClr val="lt1"/>
-    </dgm:linClrLst>
-    <dgm:effectClrLst/>
-    <dgm:txLinClrLst/>
-    <dgm:txFillClrLst meth="repeat">
-      <a:schemeClr val="lt1"/>
-    </dgm:txFillClrLst>
-    <dgm:txEffectClrLst/>
-  </dgm:styleLbl>
-  <dgm:styleLbl name="alignImgPlace1">
-    <dgm:fillClrLst meth="repeat">
-      <a:schemeClr val="accent1">
-        <a:tint val="50000"/>
-      </a:schemeClr>
-    </dgm:fillClrLst>
-    <dgm:linClrLst meth="repeat">
-      <a:schemeClr val="lt1"/>
-    </dgm:linClrLst>
-    <dgm:effectClrLst/>
-    <dgm:txLinClrLst/>
-    <dgm:txFillClrLst meth="repeat">
-      <a:schemeClr val="lt1"/>
-    </dgm:txFillClrLst>
-    <dgm:txEffectClrLst/>
-  </dgm:styleLbl>
-  <dgm:styleLbl name="bgImgPlace1">
-    <dgm:fillClrLst meth="repeat">
-      <a:schemeClr val="accent1">
-        <a:tint val="50000"/>
-      </a:schemeClr>
-    </dgm:fillClrLst>
-    <dgm:linClrLst meth="repeat">
-      <a:schemeClr val="lt1"/>
-    </dgm:linClrLst>
-    <dgm:effectClrLst/>
-    <dgm:txLinClrLst/>
-    <dgm:txFillClrLst meth="repeat">
-      <a:schemeClr val="lt1"/>
-    </dgm:txFillClrLst>
-    <dgm:txEffectClrLst/>
-  </dgm:styleLbl>
-  <dgm:styleLbl name="sibTrans2D1">
-    <dgm:fillClrLst meth="repeat">
-      <a:schemeClr val="accent1">
-        <a:tint val="60000"/>
-      </a:schemeClr>
-    </dgm:fillClrLst>
-    <dgm:linClrLst meth="repeat">
-      <a:schemeClr val="accent1">
-        <a:tint val="60000"/>
-      </a:schemeClr>
-    </dgm:linClrLst>
-    <dgm:effectClrLst/>
-    <dgm:txLinClrLst/>
-    <dgm:txFillClrLst/>
-    <dgm:txEffectClrLst/>
-  </dgm:styleLbl>
-  <dgm:styleLbl name="fgSibTrans2D1">
-    <dgm:fillClrLst meth="repeat">
-      <a:schemeClr val="accent1">
-        <a:tint val="60000"/>
-      </a:schemeClr>
-    </dgm:fillClrLst>
-    <dgm:linClrLst meth="repeat">
-      <a:schemeClr val="accent1">
-        <a:tint val="60000"/>
-      </a:schemeClr>
-    </dgm:linClrLst>
-    <dgm:effectClrLst/>
-    <dgm:txLinClrLst/>
-    <dgm:txFillClrLst/>
-    <dgm:txEffectClrLst/>
-  </dgm:styleLbl>
-  <dgm:styleLbl name="bgSibTrans2D1">
-    <dgm:fillClrLst meth="repeat">
-      <a:schemeClr val="accent1">
-        <a:tint val="60000"/>
-      </a:schemeClr>
-    </dgm:fillClrLst>
-    <dgm:linClrLst meth="repeat">
-      <a:schemeClr val="accent1">
-        <a:tint val="60000"/>
-      </a:schemeClr>
-    </dgm:linClrLst>
-    <dgm:effectClrLst/>
-    <dgm:txLinClrLst/>
-    <dgm:txFillClrLst/>
-    <dgm:txEffectClrLst/>
-  </dgm:styleLbl>
-  <dgm:styleLbl name="sibTrans1D1">
-    <dgm:fillClrLst meth="repeat">
-      <a:schemeClr val="accent1"/>
-    </dgm:fillClrLst>
-    <dgm:linClrLst meth="repeat">
-      <a:schemeClr val="accent1"/>
-    </dgm:linClrLst>
-    <dgm:effectClrLst/>
-    <dgm:txLinClrLst/>
-    <dgm:txFillClrLst meth="repeat">
-      <a:schemeClr val="tx1"/>
-    </dgm:txFillClrLst>
-    <dgm:txEffectClrLst/>
-  </dgm:styleLbl>
-  <dgm:styleLbl name="callout">
-    <dgm:fillClrLst meth="repeat">
-      <a:schemeClr val="accent1"/>
-    </dgm:fillClrLst>
-    <dgm:linClrLst meth="repeat">
-      <a:schemeClr val="accent1">
-        <a:tint val="50000"/>
-      </a:schemeClr>
-    </dgm:linClrLst>
-    <dgm:effectClrLst/>
-    <dgm:txLinClrLst/>
-    <dgm:txFillClrLst meth="repeat">
-      <a:schemeClr val="tx1"/>
-    </dgm:txFillClrLst>
-    <dgm:txEffectClrLst/>
-  </dgm:styleLbl>
-  <dgm:styleLbl name="asst0">
-    <dgm:fillClrLst meth="repeat">
-      <a:schemeClr val="accent1"/>
-    </dgm:fillClrLst>
-    <dgm:linClrLst meth="repeat">
-      <a:schemeClr val="lt1"/>
-    </dgm:linClrLst>
-    <dgm:effectClrLst/>
-    <dgm:txLinClrLst/>
-    <dgm:txFillClrLst/>
-    <dgm:txEffectClrLst/>
-  </dgm:styleLbl>
-  <dgm:styleLbl name="asst1">
-    <dgm:fillClrLst meth="repeat">
-      <a:schemeClr val="accent1"/>
-    </dgm:fillClrLst>
-    <dgm:linClrLst meth="repeat">
-      <a:schemeClr val="lt1"/>
-    </dgm:linClrLst>
-    <dgm:effectClrLst/>
-    <dgm:txLinClrLst/>
-    <dgm:txFillClrLst/>
-    <dgm:txEffectClrLst/>
-  </dgm:styleLbl>
-  <dgm:styleLbl name="asst2">
-    <dgm:fillClrLst meth="repeat">
-      <a:schemeClr val="accent1"/>
-    </dgm:fillClrLst>
-    <dgm:linClrLst meth="repeat">
-      <a:schemeClr val="lt1"/>
-    </dgm:linClrLst>
-    <dgm:effectClrLst/>
-    <dgm:txLinClrLst/>
-    <dgm:txFillClrLst/>
-    <dgm:txEffectClrLst/>
-  </dgm:styleLbl>
-  <dgm:styleLbl name="asst3">
-    <dgm:fillClrLst meth="repeat">
-      <a:schemeClr val="accent1"/>
-    </dgm:fillClrLst>
-    <dgm:linClrLst meth="repeat">
-      <a:schemeClr val="lt1"/>
-    </dgm:linClrLst>
-    <dgm:effectClrLst/>
-    <dgm:txLinClrLst/>
-    <dgm:txFillClrLst/>
-    <dgm:txEffectClrLst/>
-  </dgm:styleLbl>
-  <dgm:styleLbl name="asst4">
-    <dgm:fillClrLst meth="repeat">
-      <a:schemeClr val="accent1"/>
-    </dgm:fillClrLst>
-    <dgm:linClrLst meth="repeat">
-      <a:schemeClr val="lt1"/>
-    </dgm:linClrLst>
-    <dgm:effectClrLst/>
-    <dgm:txLinClrLst/>
-    <dgm:txFillClrLst/>
-    <dgm:txEffectClrLst/>
-  </dgm:styleLbl>
-  <dgm:styleLbl name="parChTrans2D1">
-    <dgm:fillClrLst meth="repeat">
-      <a:schemeClr val="accent1">
-        <a:tint val="60000"/>
-      </a:schemeClr>
-    </dgm:fillClrLst>
-    <dgm:linClrLst meth="repeat">
-      <a:schemeClr val="accent1">
-        <a:tint val="60000"/>
-      </a:schemeClr>
-    </dgm:linClrLst>
-    <dgm:effectClrLst/>
-    <dgm:txLinClrLst/>
-    <dgm:txFillClrLst meth="repeat">
-      <a:schemeClr val="lt1"/>
-    </dgm:txFillClrLst>
-    <dgm:txEffectClrLst/>
-  </dgm:styleLbl>
-  <dgm:styleLbl name="parChTrans2D2">
-    <dgm:fillClrLst meth="repeat">
-      <a:schemeClr val="accent1"/>
-    </dgm:fillClrLst>
-    <dgm:linClrLst meth="repeat">
-      <a:schemeClr val="accent1"/>
-    </dgm:linClrLst>
-    <dgm:effectClrLst/>
-    <dgm:txLinClrLst/>
-    <dgm:txFillClrLst meth="repeat">
-      <a:schemeClr val="lt1"/>
-    </dgm:txFillClrLst>
-    <dgm:txEffectClrLst/>
-  </dgm:styleLbl>
-  <dgm:styleLbl name="parChTrans2D3">
-    <dgm:fillClrLst meth="repeat">
-      <a:schemeClr val="accent1"/>
-    </dgm:fillClrLst>
-    <dgm:linClrLst meth="repeat">
-      <a:schemeClr val="accent1"/>
-    </dgm:linClrLst>
-    <dgm:effectClrLst/>
-    <dgm:txLinClrLst/>
-    <dgm:txFillClrLst meth="repeat">
-      <a:schemeClr val="lt1"/>
-    </dgm:txFillClrLst>
-    <dgm:txEffectClrLst/>
-  </dgm:styleLbl>
-  <dgm:styleLbl name="parChTrans2D4">
-    <dgm:fillClrLst meth="repeat">
-      <a:schemeClr val="accent1"/>
-    </dgm:fillClrLst>
-    <dgm:linClrLst meth="repeat">
-      <a:schemeClr val="accent1"/>
-    </dgm:linClrLst>
-    <dgm:effectClrLst/>
-    <dgm:txLinClrLst/>
-    <dgm:txFillClrLst meth="repeat">
-      <a:schemeClr val="lt1"/>
-    </dgm:txFillClrLst>
-    <dgm:txEffectClrLst/>
-  </dgm:styleLbl>
-  <dgm:styleLbl name="parChTrans1D1">
-    <dgm:fillClrLst meth="repeat">
-      <a:schemeClr val="accent1"/>
-    </dgm:fillClrLst>
-    <dgm:linClrLst meth="repeat">
-      <a:schemeClr val="accent1">
-        <a:shade val="60000"/>
-      </a:schemeClr>
-    </dgm:linClrLst>
-    <dgm:effectClrLst/>
-    <dgm:txLinClrLst/>
-    <dgm:txFillClrLst meth="repeat">
-      <a:schemeClr val="tx1"/>
-    </dgm:txFillClrLst>
-    <dgm:txEffectClrLst/>
-  </dgm:styleLbl>
-  <dgm:styleLbl name="parChTrans1D2">
-    <dgm:fillClrLst meth="repeat">
-      <a:schemeClr val="accent1"/>
-    </dgm:fillClrLst>
-    <dgm:linClrLst meth="repeat">
-      <a:schemeClr val="accent1">
-        <a:shade val="60000"/>
-      </a:schemeClr>
-    </dgm:linClrLst>
-    <dgm:effectClrLst/>
-    <dgm:txLinClrLst/>
-    <dgm:txFillClrLst meth="repeat">
-      <a:schemeClr val="tx1"/>
-    </dgm:txFillClrLst>
-    <dgm:txEffectClrLst/>
-  </dgm:styleLbl>
-  <dgm:styleLbl name="parChTrans1D3">
-    <dgm:fillClrLst meth="repeat">
-      <a:schemeClr val="accent1"/>
-    </dgm:fillClrLst>
-    <dgm:linClrLst meth="repeat">
-      <a:schemeClr val="accent1">
-        <a:shade val="80000"/>
-      </a:schemeClr>
-    </dgm:linClrLst>
-    <dgm:effectClrLst/>
-    <dgm:txLinClrLst/>
-    <dgm:txFillClrLst meth="repeat">
-      <a:schemeClr val="tx1"/>
-    </dgm:txFillClrLst>
-    <dgm:txEffectClrLst/>
-  </dgm:styleLbl>
-  <dgm:styleLbl name="parChTrans1D4">
-    <dgm:fillClrLst meth="repeat">
-      <a:schemeClr val="accent1"/>
-    </dgm:fillClrLst>
-    <dgm:linClrLst meth="repeat">
-      <a:schemeClr val="accent1">
-        <a:shade val="80000"/>
-      </a:schemeClr>
-    </dgm:linClrLst>
-    <dgm:effectClrLst/>
-    <dgm:txLinClrLst/>
-    <dgm:txFillClrLst meth="repeat">
-      <a:schemeClr val="tx1"/>
-    </dgm:txFillClrLst>
-    <dgm:txEffectClrLst/>
-  </dgm:styleLbl>
-  <dgm:styleLbl name="fgAcc1">
-    <dgm:fillClrLst meth="repeat">
-      <a:schemeClr val="lt1">
-        <a:alpha val="90000"/>
-      </a:schemeClr>
-    </dgm:fillClrLst>
-    <dgm:linClrLst meth="repeat">
-      <a:schemeClr val="accent1"/>
-    </dgm:linClrLst>
-    <dgm:effectClrLst/>
-    <dgm:txLinClrLst/>
-    <dgm:txFillClrLst meth="repeat">
-      <a:schemeClr val="dk1"/>
-    </dgm:txFillClrLst>
-    <dgm:txEffectClrLst/>
-  </dgm:styleLbl>
-  <dgm:styleLbl name="conFgAcc1">
-    <dgm:fillClrLst meth="repeat">
-      <a:schemeClr val="lt1">
-        <a:alpha val="90000"/>
-      </a:schemeClr>
-    </dgm:fillClrLst>
-    <dgm:linClrLst meth="repeat">
-      <a:schemeClr val="accent1"/>
-    </dgm:linClrLst>
-    <dgm:effectClrLst/>
-    <dgm:txLinClrLst/>
-    <dgm:txFillClrLst meth="repeat">
-      <a:schemeClr val="dk1"/>
-    </dgm:txFillClrLst>
-    <dgm:txEffectClrLst/>
-  </dgm:styleLbl>
-  <dgm:styleLbl name="alignAcc1">
-    <dgm:fillClrLst meth="repeat">
-      <a:schemeClr val="lt1">
-        <a:alpha val="90000"/>
-      </a:schemeClr>
-    </dgm:fillClrLst>
-    <dgm:linClrLst meth="repeat">
-      <a:schemeClr val="accent1"/>
-    </dgm:linClrLst>
-    <dgm:effectClrLst/>
-    <dgm:txLinClrLst/>
-    <dgm:txFillClrLst meth="repeat">
-      <a:schemeClr val="dk1"/>
-    </dgm:txFillClrLst>
-    <dgm:txEffectClrLst/>
-  </dgm:styleLbl>
-  <dgm:styleLbl name="trAlignAcc1">
-    <dgm:fillClrLst meth="repeat">
-      <a:schemeClr val="lt1">
-        <a:alpha val="40000"/>
-      </a:schemeClr>
-    </dgm:fillClrLst>
-    <dgm:linClrLst meth="repeat">
-      <a:schemeClr val="accent1"/>
-    </dgm:linClrLst>
-    <dgm:effectClrLst/>
-    <dgm:txLinClrLst/>
-    <dgm:txFillClrLst meth="repeat">
-      <a:schemeClr val="dk1"/>
-    </dgm:txFillClrLst>
-    <dgm:txEffectClrLst/>
-  </dgm:styleLbl>
-  <dgm:styleLbl name="bgAcc1">
-    <dgm:fillClrLst meth="repeat">
-      <a:schemeClr val="lt1">
-        <a:alpha val="90000"/>
-      </a:schemeClr>
-    </dgm:fillClrLst>
-    <dgm:linClrLst meth="repeat">
-      <a:schemeClr val="accent1"/>
-    </dgm:linClrLst>
-    <dgm:effectClrLst/>
-    <dgm:txLinClrLst/>
-    <dgm:txFillClrLst meth="repeat">
-      <a:schemeClr val="dk1"/>
-    </dgm:txFillClrLst>
-    <dgm:txEffectClrLst/>
-  </dgm:styleLbl>
-  <dgm:styleLbl name="solidFgAcc1">
-    <dgm:fillClrLst meth="repeat">
-      <a:schemeClr val="lt1"/>
-    </dgm:fillClrLst>
-    <dgm:linClrLst meth="repeat">
-      <a:schemeClr val="accent1"/>
-    </dgm:linClrLst>
-    <dgm:effectClrLst/>
-    <dgm:txLinClrLst/>
-    <dgm:txFillClrLst meth="repeat">
-      <a:schemeClr val="dk1"/>
-    </dgm:txFillClrLst>
-    <dgm:txEffectClrLst/>
-  </dgm:styleLbl>
-  <dgm:styleLbl name="solidAlignAcc1">
-    <dgm:fillClrLst meth="repeat">
-      <a:schemeClr val="lt1"/>
-    </dgm:fillClrLst>
-    <dgm:linClrLst meth="repeat">
-      <a:schemeClr val="accent1"/>
-    </dgm:linClrLst>
-    <dgm:effectClrLst/>
-    <dgm:txLinClrLst/>
-    <dgm:txFillClrLst meth="repeat">
-      <a:schemeClr val="dk1"/>
-    </dgm:txFillClrLst>
-    <dgm:txEffectClrLst/>
-  </dgm:styleLbl>
-  <dgm:styleLbl name="solidBgAcc1">
-    <dgm:fillClrLst meth="repeat">
-      <a:schemeClr val="lt1"/>
-    </dgm:fillClrLst>
-    <dgm:linClrLst meth="repeat">
-      <a:schemeClr val="accent1"/>
-    </dgm:linClrLst>
-    <dgm:effectClrLst/>
-    <dgm:txLinClrLst/>
-    <dgm:txFillClrLst meth="repeat">
-      <a:schemeClr val="dk1"/>
-    </dgm:txFillClrLst>
-    <dgm:txEffectClrLst/>
-  </dgm:styleLbl>
-  <dgm:styleLbl name="fgAccFollowNode1">
-    <dgm:fillClrLst meth="repeat">
-      <a:schemeClr val="accent1">
-        <a:alpha val="90000"/>
-        <a:tint val="40000"/>
-      </a:schemeClr>
-    </dgm:fillClrLst>
-    <dgm:linClrLst meth="repeat">
-      <a:schemeClr val="accent1">
-        <a:alpha val="90000"/>
-        <a:tint val="40000"/>
-      </a:schemeClr>
-    </dgm:linClrLst>
-    <dgm:effectClrLst/>
-    <dgm:txLinClrLst/>
-    <dgm:txFillClrLst meth="repeat">
-      <a:schemeClr val="dk1"/>
-    </dgm:txFillClrLst>
-    <dgm:txEffectClrLst/>
-  </dgm:styleLbl>
-  <dgm:styleLbl name="alignAccFollowNode1">
-    <dgm:fillClrLst meth="repeat">
-      <a:schemeClr val="accent1">
-        <a:alpha val="90000"/>
-        <a:tint val="40000"/>
-      </a:schemeClr>
-    </dgm:fillClrLst>
-    <dgm:linClrLst meth="repeat">
-      <a:schemeClr val="accent1">
-        <a:alpha val="90000"/>
-        <a:tint val="40000"/>
-      </a:schemeClr>
-    </dgm:linClrLst>
-    <dgm:effectClrLst/>
-    <dgm:txLinClrLst/>
-    <dgm:txFillClrLst meth="repeat">
-      <a:schemeClr val="dk1"/>
-    </dgm:txFillClrLst>
-    <dgm:txEffectClrLst/>
-  </dgm:styleLbl>
-  <dgm:styleLbl name="bgAccFollowNode1">
-    <dgm:fillClrLst meth="repeat">
-      <a:schemeClr val="accent1">
-        <a:alpha val="90000"/>
-        <a:tint val="40000"/>
-      </a:schemeClr>
-    </dgm:fillClrLst>
-    <dgm:linClrLst meth="repeat">
-      <a:schemeClr val="accent1">
-        <a:alpha val="90000"/>
-        <a:tint val="40000"/>
-      </a:schemeClr>
-    </dgm:linClrLst>
-    <dgm:effectClrLst/>
-    <dgm:txLinClrLst/>
-    <dgm:txFillClrLst meth="repeat">
-      <a:schemeClr val="dk1"/>
-    </dgm:txFillClrLst>
-    <dgm:txEffectClrLst/>
-  </dgm:styleLbl>
-  <dgm:styleLbl name="fgAcc0">
-    <dgm:fillClrLst meth="repeat">
-      <a:schemeClr val="lt1">
-        <a:alpha val="90000"/>
-      </a:schemeClr>
-    </dgm:fillClrLst>
-    <dgm:linClrLst meth="repeat">
-      <a:schemeClr val="accent1"/>
-    </dgm:linClrLst>
-    <dgm:effectClrLst/>
-    <dgm:txLinClrLst/>
-    <dgm:txFillClrLst meth="repeat">
-      <a:schemeClr val="dk1"/>
-    </dgm:txFillClrLst>
-    <dgm:txEffectClrLst/>
-  </dgm:styleLbl>
-  <dgm:styleLbl name="fgAcc2">
-    <dgm:fillClrLst meth="repeat">
-      <a:schemeClr val="lt1">
-        <a:alpha val="90000"/>
-      </a:schemeClr>
-    </dgm:fillClrLst>
-    <dgm:linClrLst meth="repeat">
-      <a:schemeClr val="accent1"/>
-    </dgm:linClrLst>
-    <dgm:effectClrLst/>
-    <dgm:txLinClrLst/>
-    <dgm:txFillClrLst meth="repeat">
-      <a:schemeClr val="dk1"/>
-    </dgm:txFillClrLst>
-    <dgm:txEffectClrLst/>
-  </dgm:styleLbl>
-  <dgm:styleLbl name="fgAcc3">
-    <dgm:fillClrLst meth="repeat">
-      <a:schemeClr val="lt1">
-        <a:alpha val="90000"/>
-      </a:schemeClr>
-    </dgm:fillClrLst>
-    <dgm:linClrLst meth="repeat">
-      <a:schemeClr val="accent1"/>
-    </dgm:linClrLst>
-    <dgm:effectClrLst/>
-    <dgm:txLinClrLst/>
-    <dgm:txFillClrLst meth="repeat">
-      <a:schemeClr val="dk1"/>
-    </dgm:txFillClrLst>
-    <dgm:txEffectClrLst/>
-  </dgm:styleLbl>
-  <dgm:styleLbl name="fgAcc4">
-    <dgm:fillClrLst meth="repeat">
-      <a:schemeClr val="lt1">
-        <a:alpha val="90000"/>
-      </a:schemeClr>
-    </dgm:fillClrLst>
-    <dgm:linClrLst meth="repeat">
-      <a:schemeClr val="accent1"/>
-    </dgm:linClrLst>
-    <dgm:effectClrLst/>
-    <dgm:txLinClrLst/>
-    <dgm:txFillClrLst meth="repeat">
-      <a:schemeClr val="dk1"/>
-    </dgm:txFillClrLst>
-    <dgm:txEffectClrLst/>
-  </dgm:styleLbl>
-  <dgm:styleLbl name="bgShp">
-    <dgm:fillClrLst meth="repeat">
-      <a:schemeClr val="accent1">
-        <a:tint val="40000"/>
-      </a:schemeClr>
-    </dgm:fillClrLst>
-    <dgm:linClrLst meth="repeat">
-      <a:schemeClr val="accent1"/>
-    </dgm:linClrLst>
-    <dgm:effectClrLst/>
-    <dgm:txLinClrLst/>
-    <dgm:txFillClrLst meth="repeat">
-      <a:schemeClr val="dk1"/>
-    </dgm:txFillClrLst>
-    <dgm:txEffectClrLst/>
-  </dgm:styleLbl>
-  <dgm:styleLbl name="dkBgShp">
-    <dgm:fillClrLst meth="repeat">
-      <a:schemeClr val="accent1">
-        <a:shade val="80000"/>
-      </a:schemeClr>
-    </dgm:fillClrLst>
-    <dgm:linClrLst meth="repeat">
-      <a:schemeClr val="accent1"/>
-    </dgm:linClrLst>
-    <dgm:effectClrLst/>
-    <dgm:txLinClrLst/>
-    <dgm:txFillClrLst meth="repeat">
-      <a:schemeClr val="lt1"/>
-    </dgm:txFillClrLst>
-    <dgm:txEffectClrLst/>
-  </dgm:styleLbl>
-  <dgm:styleLbl name="trBgShp">
-    <dgm:fillClrLst meth="repeat">
-      <a:schemeClr val="accent1">
-        <a:tint val="50000"/>
-        <a:alpha val="40000"/>
-      </a:schemeClr>
-    </dgm:fillClrLst>
-    <dgm:linClrLst meth="repeat">
-      <a:schemeClr val="accent1"/>
-    </dgm:linClrLst>
-    <dgm:effectClrLst/>
-    <dgm:txLinClrLst/>
-    <dgm:txFillClrLst meth="repeat">
-      <a:schemeClr val="lt1"/>
-    </dgm:txFillClrLst>
-    <dgm:txEffectClrLst/>
-  </dgm:styleLbl>
-  <dgm:styleLbl name="fgShp">
-    <dgm:fillClrLst meth="repeat">
-      <a:schemeClr val="accent1">
-        <a:tint val="60000"/>
-      </a:schemeClr>
-    </dgm:fillClrLst>
-    <dgm:linClrLst meth="repeat">
-      <a:schemeClr val="lt1"/>
-    </dgm:linClrLst>
-    <dgm:effectClrLst/>
-    <dgm:txLinClrLst/>
-    <dgm:txFillClrLst meth="repeat">
-      <a:schemeClr val="dk1"/>
-    </dgm:txFillClrLst>
-    <dgm:txEffectClrLst/>
-  </dgm:styleLbl>
-  <dgm:styleLbl name="revTx">
-    <dgm:fillClrLst meth="repeat">
-      <a:schemeClr val="lt1">
-        <a:alpha val="0"/>
-      </a:schemeClr>
-    </dgm:fillClrLst>
-    <dgm:linClrLst meth="repeat">
-      <a:schemeClr val="dk1">
-        <a:alpha val="0"/>
-      </a:schemeClr>
-    </dgm:linClrLst>
-    <dgm:effectClrLst/>
-    <dgm:txLinClrLst/>
-    <dgm:txFillClrLst meth="repeat">
-      <a:schemeClr val="tx1"/>
-    </dgm:txFillClrLst>
-    <dgm:txEffectClrLst/>
-  </dgm:styleLbl>
-</dgm:colorsDef>
-</file>
-
-<file path=ppt/diagrams/data1.xml><?xml version="1.0" encoding="utf-8"?>
-<dgm:dataModel xmlns:dgm="http://schemas.openxmlformats.org/drawingml/2006/diagram" xmlns:a="http://schemas.openxmlformats.org/drawingml/2006/main">
-  <dgm:ptLst>
-    <dgm:pt modelId="{08F627ED-A304-4697-8C44-18E45D3D2B1A}" type="doc">
-      <dgm:prSet loTypeId="urn:microsoft.com/office/officeart/2016/7/layout/HexagonTimeline" loCatId="process" qsTypeId="urn:microsoft.com/office/officeart/2005/8/quickstyle/simple2" qsCatId="simple" csTypeId="urn:microsoft.com/office/officeart/2005/8/colors/accent1_2" csCatId="accent1" phldr="1"/>
-      <dgm:spPr/>
-      <dgm:t>
-        <a:bodyPr/>
-        <a:lstStyle/>
-        <a:p>
-          <a:endParaRPr lang="en-US"/>
-        </a:p>
-      </dgm:t>
-    </dgm:pt>
-    <dgm:pt modelId="{E5E4D699-C3CF-4415-B32C-A18B48AFE2A3}">
-      <dgm:prSet/>
-      <dgm:spPr/>
-      <dgm:t>
-        <a:bodyPr/>
-        <a:lstStyle/>
-        <a:p>
-          <a:r>
-            <a:rPr lang="en-US" dirty="0"/>
-            <a:t>Brief Background</a:t>
-          </a:r>
-        </a:p>
-      </dgm:t>
-    </dgm:pt>
-    <dgm:pt modelId="{C7C70553-EB1A-4554-849D-8153CC4AFCEB}" type="parTrans" cxnId="{A2DF84EA-DA42-4F03-BD6F-8E8D9966CB10}">
-      <dgm:prSet/>
-      <dgm:spPr/>
-      <dgm:t>
-        <a:bodyPr/>
-        <a:lstStyle/>
-        <a:p>
-          <a:endParaRPr lang="en-US"/>
-        </a:p>
-      </dgm:t>
-    </dgm:pt>
-    <dgm:pt modelId="{61990FFE-20A5-4112-BACD-16BA28C36EBA}" type="sibTrans" cxnId="{A2DF84EA-DA42-4F03-BD6F-8E8D9966CB10}">
-      <dgm:prSet/>
-      <dgm:spPr/>
-      <dgm:t>
-        <a:bodyPr/>
-        <a:lstStyle/>
-        <a:p>
-          <a:endParaRPr lang="en-US"/>
-        </a:p>
-      </dgm:t>
-    </dgm:pt>
-    <dgm:pt modelId="{C057D6ED-8F49-42DC-B8A7-C07F68F0F734}">
-      <dgm:prSet/>
-      <dgm:spPr/>
-      <dgm:t>
-        <a:bodyPr/>
-        <a:lstStyle/>
-        <a:p>
-          <a:r>
-            <a:rPr lang="en-US" dirty="0"/>
-            <a:t>Turbidity</a:t>
-          </a:r>
-        </a:p>
-      </dgm:t>
-    </dgm:pt>
-    <dgm:pt modelId="{131D11D9-3030-4E3B-8F84-0108E6497B2A}" type="parTrans" cxnId="{FB0FA082-3950-4822-951F-05A1A9548F18}">
-      <dgm:prSet/>
-      <dgm:spPr/>
-      <dgm:t>
-        <a:bodyPr/>
-        <a:lstStyle/>
-        <a:p>
-          <a:endParaRPr lang="en-US"/>
-        </a:p>
-      </dgm:t>
-    </dgm:pt>
-    <dgm:pt modelId="{6E885013-4246-43E1-A818-2251A99C8FD2}" type="sibTrans" cxnId="{FB0FA082-3950-4822-951F-05A1A9548F18}">
-      <dgm:prSet/>
-      <dgm:spPr/>
-      <dgm:t>
-        <a:bodyPr/>
-        <a:lstStyle/>
-        <a:p>
-          <a:endParaRPr lang="en-US"/>
-        </a:p>
-      </dgm:t>
-    </dgm:pt>
-    <dgm:pt modelId="{9845D52A-E054-4EB0-A5A3-32AE7DC6D645}">
-      <dgm:prSet/>
-      <dgm:spPr/>
-      <dgm:t>
-        <a:bodyPr/>
-        <a:lstStyle/>
-        <a:p>
-          <a:r>
-            <a:rPr lang="en-US" dirty="0"/>
-            <a:t>Chart(s) Overview</a:t>
-          </a:r>
-        </a:p>
-      </dgm:t>
-    </dgm:pt>
-    <dgm:pt modelId="{952EE001-86C3-4022-96EE-ABDB540B8A78}" type="parTrans" cxnId="{B04C6215-C46D-4282-963F-02A26E25C8AB}">
-      <dgm:prSet/>
-      <dgm:spPr/>
-      <dgm:t>
-        <a:bodyPr/>
-        <a:lstStyle/>
-        <a:p>
-          <a:endParaRPr lang="en-US"/>
-        </a:p>
-      </dgm:t>
-    </dgm:pt>
-    <dgm:pt modelId="{796364FD-7651-493A-AEE5-8DD45DF8EEAC}" type="sibTrans" cxnId="{B04C6215-C46D-4282-963F-02A26E25C8AB}">
-      <dgm:prSet/>
-      <dgm:spPr/>
-      <dgm:t>
-        <a:bodyPr/>
-        <a:lstStyle/>
-        <a:p>
-          <a:endParaRPr lang="en-US"/>
-        </a:p>
-      </dgm:t>
-    </dgm:pt>
-    <dgm:pt modelId="{566C4A8F-CE66-4FF5-AF11-6C385F74A275}">
-      <dgm:prSet/>
-      <dgm:spPr/>
-      <dgm:t>
-        <a:bodyPr/>
-        <a:lstStyle/>
-        <a:p>
-          <a:r>
-            <a:rPr lang="en-US" dirty="0"/>
-            <a:t>Explanation</a:t>
-          </a:r>
-        </a:p>
-      </dgm:t>
-    </dgm:pt>
-    <dgm:pt modelId="{375C5A5E-5F04-4FE8-98F8-795867C18A18}" type="parTrans" cxnId="{66E8CE3C-459F-4648-B4D7-5039298A0E92}">
-      <dgm:prSet/>
-      <dgm:spPr/>
-      <dgm:t>
-        <a:bodyPr/>
-        <a:lstStyle/>
-        <a:p>
-          <a:endParaRPr lang="en-US"/>
-        </a:p>
-      </dgm:t>
-    </dgm:pt>
-    <dgm:pt modelId="{E74B8A5E-78D9-4E5B-86E1-203DE271581F}" type="sibTrans" cxnId="{66E8CE3C-459F-4648-B4D7-5039298A0E92}">
-      <dgm:prSet/>
-      <dgm:spPr/>
-      <dgm:t>
-        <a:bodyPr/>
-        <a:lstStyle/>
-        <a:p>
-          <a:endParaRPr lang="en-US"/>
-        </a:p>
-      </dgm:t>
-    </dgm:pt>
-    <dgm:pt modelId="{9AC77E87-FC4D-4F04-889B-73358514DC0D}">
-      <dgm:prSet/>
-      <dgm:spPr/>
-      <dgm:t>
-        <a:bodyPr/>
-        <a:lstStyle/>
-        <a:p>
-          <a:r>
-            <a:rPr lang="en-US" dirty="0"/>
-            <a:t>Conclusion</a:t>
-          </a:r>
-        </a:p>
-      </dgm:t>
-    </dgm:pt>
-    <dgm:pt modelId="{B29F90F6-921F-42B9-A496-5D121F61821E}" type="parTrans" cxnId="{04774158-8FAB-47B4-A2EE-D3D3A7E958BE}">
-      <dgm:prSet/>
-      <dgm:spPr/>
-      <dgm:t>
-        <a:bodyPr/>
-        <a:lstStyle/>
-        <a:p>
-          <a:endParaRPr lang="en-US"/>
-        </a:p>
-      </dgm:t>
-    </dgm:pt>
-    <dgm:pt modelId="{3A77AB9A-DF29-465E-A0A5-D4FA3D0C537F}" type="sibTrans" cxnId="{04774158-8FAB-47B4-A2EE-D3D3A7E958BE}">
-      <dgm:prSet/>
-      <dgm:spPr/>
-      <dgm:t>
-        <a:bodyPr/>
-        <a:lstStyle/>
-        <a:p>
-          <a:endParaRPr lang="en-US"/>
-        </a:p>
-      </dgm:t>
-    </dgm:pt>
-    <dgm:pt modelId="{C2F0E5C9-2943-4A9B-872F-ECF6B159E9F4}">
-      <dgm:prSet/>
-      <dgm:spPr/>
-      <dgm:t>
-        <a:bodyPr/>
-        <a:lstStyle/>
-        <a:p>
-          <a:r>
-            <a:rPr lang="en-US" dirty="0"/>
-            <a:t>Results Explained</a:t>
-          </a:r>
-        </a:p>
-      </dgm:t>
-    </dgm:pt>
-    <dgm:pt modelId="{8FBB852D-32B7-4273-9DE3-951F1CFE69EC}" type="parTrans" cxnId="{F7608388-5A1F-4FE9-96E5-520EA7B1F725}">
-      <dgm:prSet/>
-      <dgm:spPr/>
-      <dgm:t>
-        <a:bodyPr/>
-        <a:lstStyle/>
-        <a:p>
-          <a:endParaRPr lang="en-US"/>
-        </a:p>
-      </dgm:t>
-    </dgm:pt>
-    <dgm:pt modelId="{1A62CB6F-38D7-44F2-AFAB-0C4382E3DA24}" type="sibTrans" cxnId="{F7608388-5A1F-4FE9-96E5-520EA7B1F725}">
-      <dgm:prSet/>
-      <dgm:spPr/>
-      <dgm:t>
-        <a:bodyPr/>
-        <a:lstStyle/>
-        <a:p>
-          <a:endParaRPr lang="en-US"/>
-        </a:p>
-      </dgm:t>
-    </dgm:pt>
-    <dgm:pt modelId="{5FC34D3A-C8D4-483C-8695-507470E74D50}">
-      <dgm:prSet/>
-      <dgm:spPr/>
-      <dgm:t>
-        <a:bodyPr/>
-        <a:lstStyle/>
-        <a:p>
-          <a:r>
-            <a:rPr lang="en-US" dirty="0"/>
-            <a:t>Data Explanation</a:t>
-          </a:r>
-        </a:p>
-      </dgm:t>
-    </dgm:pt>
-    <dgm:pt modelId="{1DECF9F5-40C0-4379-BCCE-7BCAAD54807B}" type="sibTrans" cxnId="{277179CE-E2F5-4733-8D23-9E37CACB7B9E}">
-      <dgm:prSet/>
-      <dgm:spPr/>
-      <dgm:t>
-        <a:bodyPr/>
-        <a:lstStyle/>
-        <a:p>
-          <a:endParaRPr lang="en-US"/>
-        </a:p>
-      </dgm:t>
-    </dgm:pt>
-    <dgm:pt modelId="{9978A89C-C2F1-4241-807C-13619E6D6376}" type="parTrans" cxnId="{277179CE-E2F5-4733-8D23-9E37CACB7B9E}">
-      <dgm:prSet/>
-      <dgm:spPr/>
-      <dgm:t>
-        <a:bodyPr/>
-        <a:lstStyle/>
-        <a:p>
-          <a:endParaRPr lang="en-US"/>
-        </a:p>
-      </dgm:t>
-    </dgm:pt>
-    <dgm:pt modelId="{9DB38719-EEF9-4638-91CE-8E8C646CC524}">
-      <dgm:prSet/>
-      <dgm:spPr/>
-      <dgm:t>
-        <a:bodyPr/>
-        <a:lstStyle/>
-        <a:p>
-          <a:r>
-            <a:rPr lang="en-US" dirty="0"/>
-            <a:t>Data Source</a:t>
-          </a:r>
-        </a:p>
-      </dgm:t>
-    </dgm:pt>
-    <dgm:pt modelId="{B8EFC625-D79E-4B16-A077-46ABEB1913DC}" type="sibTrans" cxnId="{82C2E40D-9BC0-4ADA-915E-708000D2737D}">
-      <dgm:prSet/>
-      <dgm:spPr/>
-      <dgm:t>
-        <a:bodyPr/>
-        <a:lstStyle/>
-        <a:p>
-          <a:endParaRPr lang="en-US"/>
-        </a:p>
-      </dgm:t>
-    </dgm:pt>
-    <dgm:pt modelId="{2D70C797-29DD-498F-9D71-4F6A2362408D}" type="parTrans" cxnId="{82C2E40D-9BC0-4ADA-915E-708000D2737D}">
-      <dgm:prSet/>
-      <dgm:spPr/>
-      <dgm:t>
-        <a:bodyPr/>
-        <a:lstStyle/>
-        <a:p>
-          <a:endParaRPr lang="en-US"/>
-        </a:p>
-      </dgm:t>
-    </dgm:pt>
-    <dgm:pt modelId="{44A90682-7781-4612-9FFC-DA9195CD8EC1}">
-      <dgm:prSet/>
-      <dgm:spPr/>
-      <dgm:t>
-        <a:bodyPr/>
-        <a:lstStyle/>
-        <a:p>
-          <a:r>
-            <a:rPr lang="en-US" dirty="0"/>
-            <a:t>Code </a:t>
-          </a:r>
-        </a:p>
-      </dgm:t>
-    </dgm:pt>
-    <dgm:pt modelId="{15DC71EA-684D-4AA7-A936-92D26EE7F934}" type="parTrans" cxnId="{F5DFEB44-AE5A-49D5-8105-E6D86410137A}">
-      <dgm:prSet/>
-      <dgm:spPr/>
-      <dgm:t>
-        <a:bodyPr/>
-        <a:lstStyle/>
-        <a:p>
-          <a:endParaRPr lang="en-US"/>
-        </a:p>
-      </dgm:t>
-    </dgm:pt>
-    <dgm:pt modelId="{B1D2F799-CBAE-4272-8BE9-FED8B0A5ED5B}" type="sibTrans" cxnId="{F5DFEB44-AE5A-49D5-8105-E6D86410137A}">
-      <dgm:prSet/>
-      <dgm:spPr/>
-      <dgm:t>
-        <a:bodyPr/>
-        <a:lstStyle/>
-        <a:p>
-          <a:endParaRPr lang="en-US"/>
-        </a:p>
-      </dgm:t>
-    </dgm:pt>
-    <dgm:pt modelId="{2CDF0086-1502-4E31-9E9A-3A37F419B5F4}">
-      <dgm:prSet/>
-      <dgm:spPr/>
-      <dgm:t>
-        <a:bodyPr/>
-        <a:lstStyle/>
-        <a:p>
-          <a:r>
-            <a:rPr lang="en-US" dirty="0"/>
-            <a:t>Quick Look</a:t>
-          </a:r>
-        </a:p>
-      </dgm:t>
-    </dgm:pt>
-    <dgm:pt modelId="{FDC3C5C8-DB07-4690-9775-78EBE845226C}" type="parTrans" cxnId="{D4F051D3-EB47-4FD6-A974-A812CFCEC723}">
-      <dgm:prSet/>
-      <dgm:spPr/>
-      <dgm:t>
-        <a:bodyPr/>
-        <a:lstStyle/>
-        <a:p>
-          <a:endParaRPr lang="en-US"/>
-        </a:p>
-      </dgm:t>
-    </dgm:pt>
-    <dgm:pt modelId="{6E6E05A7-D4DC-4FD9-AF74-EF71DC5E70A3}" type="sibTrans" cxnId="{D4F051D3-EB47-4FD6-A974-A812CFCEC723}">
-      <dgm:prSet/>
-      <dgm:spPr/>
-      <dgm:t>
-        <a:bodyPr/>
-        <a:lstStyle/>
-        <a:p>
-          <a:endParaRPr lang="en-US"/>
-        </a:p>
-      </dgm:t>
-    </dgm:pt>
-    <dgm:pt modelId="{0580C383-85A3-425E-A44E-5E7306FF943E}" type="pres">
-      <dgm:prSet presAssocID="{08F627ED-A304-4697-8C44-18E45D3D2B1A}" presName="Name0" presStyleCnt="0">
-        <dgm:presLayoutVars>
-          <dgm:chMax/>
-          <dgm:chPref/>
-          <dgm:animLvl val="lvl"/>
-        </dgm:presLayoutVars>
-      </dgm:prSet>
-      <dgm:spPr/>
-    </dgm:pt>
-    <dgm:pt modelId="{78B1F1D9-D4A1-4078-8320-A9F734DAF01D}" type="pres">
-      <dgm:prSet presAssocID="{E5E4D699-C3CF-4415-B32C-A18B48AFE2A3}" presName="composite" presStyleCnt="0"/>
-      <dgm:spPr/>
-    </dgm:pt>
-    <dgm:pt modelId="{556899F1-13C2-441E-879C-8B5F26234632}" type="pres">
-      <dgm:prSet presAssocID="{E5E4D699-C3CF-4415-B32C-A18B48AFE2A3}" presName="Parent1" presStyleLbl="alignNode1" presStyleIdx="0" presStyleCnt="5" custLinFactY="-80137" custLinFactNeighborX="-579" custLinFactNeighborY="-100000">
-        <dgm:presLayoutVars>
-          <dgm:chMax val="1"/>
-          <dgm:chPref val="1"/>
-          <dgm:bulletEnabled val="1"/>
-        </dgm:presLayoutVars>
-      </dgm:prSet>
-      <dgm:spPr/>
-    </dgm:pt>
-    <dgm:pt modelId="{3F8C8DF1-69FF-4267-9807-429FE1F669A4}" type="pres">
-      <dgm:prSet presAssocID="{E5E4D699-C3CF-4415-B32C-A18B48AFE2A3}" presName="Childtext1" presStyleLbl="revTx" presStyleIdx="0" presStyleCnt="5">
-        <dgm:presLayoutVars>
-          <dgm:chMax val="0"/>
-          <dgm:chPref val="0"/>
-          <dgm:bulletEnabled/>
-        </dgm:presLayoutVars>
-      </dgm:prSet>
-      <dgm:spPr/>
-    </dgm:pt>
-    <dgm:pt modelId="{7CD542A5-A839-406E-A09D-761397CD34CA}" type="pres">
-      <dgm:prSet presAssocID="{E5E4D699-C3CF-4415-B32C-A18B48AFE2A3}" presName="ConnectLine" presStyleLbl="sibTrans1D1" presStyleIdx="0" presStyleCnt="5"/>
-      <dgm:spPr>
-        <a:noFill/>
-        <a:ln w="12700" cap="flat" cmpd="sng" algn="ctr">
-          <a:solidFill>
-            <a:schemeClr val="accent1">
-              <a:hueOff val="0"/>
-              <a:satOff val="0"/>
-              <a:lumOff val="0"/>
-              <a:alphaOff val="0"/>
-            </a:schemeClr>
-          </a:solidFill>
-          <a:prstDash val="dash"/>
-        </a:ln>
-        <a:effectLst/>
-      </dgm:spPr>
-    </dgm:pt>
-    <dgm:pt modelId="{8EAC9032-35F1-40A2-BA92-FC6DD5F3161F}" type="pres">
-      <dgm:prSet presAssocID="{E5E4D699-C3CF-4415-B32C-A18B48AFE2A3}" presName="ConnectLineEnd" presStyleLbl="node1" presStyleIdx="0" presStyleCnt="5"/>
-      <dgm:spPr/>
-    </dgm:pt>
-    <dgm:pt modelId="{CF11A881-B1B6-4E4B-9AB0-2514A9285EBA}" type="pres">
-      <dgm:prSet presAssocID="{E5E4D699-C3CF-4415-B32C-A18B48AFE2A3}" presName="EmptyPane" presStyleCnt="0"/>
-      <dgm:spPr/>
-    </dgm:pt>
-    <dgm:pt modelId="{0EDA1889-E3C7-4C7B-AA49-EF34A4D5D342}" type="pres">
-      <dgm:prSet presAssocID="{61990FFE-20A5-4112-BACD-16BA28C36EBA}" presName="spaceBetweenRectangles" presStyleLbl="fgAcc1" presStyleIdx="0" presStyleCnt="4"/>
-      <dgm:spPr/>
-    </dgm:pt>
-    <dgm:pt modelId="{AF022427-467C-44D2-B19C-073E877201DB}" type="pres">
-      <dgm:prSet presAssocID="{5FC34D3A-C8D4-483C-8695-507470E74D50}" presName="composite" presStyleCnt="0"/>
-      <dgm:spPr/>
-    </dgm:pt>
-    <dgm:pt modelId="{63AECF3B-25CA-476D-B7CA-904B4760CF3F}" type="pres">
-      <dgm:prSet presAssocID="{5FC34D3A-C8D4-483C-8695-507470E74D50}" presName="Parent1" presStyleLbl="alignNode1" presStyleIdx="1" presStyleCnt="5">
-        <dgm:presLayoutVars>
-          <dgm:chMax val="1"/>
-          <dgm:chPref val="1"/>
-          <dgm:bulletEnabled val="1"/>
-        </dgm:presLayoutVars>
-      </dgm:prSet>
-      <dgm:spPr/>
-    </dgm:pt>
-    <dgm:pt modelId="{7197D426-886B-449E-A886-FD13F5E0AC97}" type="pres">
-      <dgm:prSet presAssocID="{5FC34D3A-C8D4-483C-8695-507470E74D50}" presName="Childtext1" presStyleLbl="revTx" presStyleIdx="1" presStyleCnt="5">
-        <dgm:presLayoutVars>
-          <dgm:chMax val="0"/>
-          <dgm:chPref val="0"/>
-          <dgm:bulletEnabled/>
-        </dgm:presLayoutVars>
-      </dgm:prSet>
-      <dgm:spPr/>
-    </dgm:pt>
-    <dgm:pt modelId="{B9D6C9D4-469A-4107-97AE-8C43EA5CB946}" type="pres">
-      <dgm:prSet presAssocID="{5FC34D3A-C8D4-483C-8695-507470E74D50}" presName="ConnectLine" presStyleLbl="sibTrans1D1" presStyleIdx="1" presStyleCnt="5"/>
-      <dgm:spPr>
-        <a:noFill/>
-        <a:ln w="12700" cap="flat" cmpd="sng" algn="ctr">
-          <a:solidFill>
-            <a:schemeClr val="accent1">
-              <a:hueOff val="0"/>
-              <a:satOff val="0"/>
-              <a:lumOff val="0"/>
-              <a:alphaOff val="0"/>
-            </a:schemeClr>
-          </a:solidFill>
-          <a:prstDash val="dash"/>
-        </a:ln>
-        <a:effectLst/>
-      </dgm:spPr>
-    </dgm:pt>
-    <dgm:pt modelId="{C1BEC2C0-22DD-44C4-AAFC-5C26B7685EF4}" type="pres">
-      <dgm:prSet presAssocID="{5FC34D3A-C8D4-483C-8695-507470E74D50}" presName="ConnectLineEnd" presStyleLbl="node1" presStyleIdx="1" presStyleCnt="5"/>
-      <dgm:spPr/>
-    </dgm:pt>
-    <dgm:pt modelId="{AC3D3D7F-40C6-4526-8B59-8E5946ACD3E0}" type="pres">
-      <dgm:prSet presAssocID="{5FC34D3A-C8D4-483C-8695-507470E74D50}" presName="EmptyPane" presStyleCnt="0"/>
-      <dgm:spPr/>
-    </dgm:pt>
-    <dgm:pt modelId="{1E3B17F3-BEE3-4918-AC1A-690DF45EE902}" type="pres">
-      <dgm:prSet presAssocID="{1DECF9F5-40C0-4379-BCCE-7BCAAD54807B}" presName="spaceBetweenRectangles" presStyleLbl="fgAcc1" presStyleIdx="1" presStyleCnt="4"/>
-      <dgm:spPr/>
-    </dgm:pt>
-    <dgm:pt modelId="{72BCC622-94D2-4269-AB8E-70B7F8354D5D}" type="pres">
-      <dgm:prSet presAssocID="{44A90682-7781-4612-9FFC-DA9195CD8EC1}" presName="composite" presStyleCnt="0"/>
-      <dgm:spPr/>
-    </dgm:pt>
-    <dgm:pt modelId="{3782C2A6-B84E-4852-8D55-A4CFB2DCB5F5}" type="pres">
-      <dgm:prSet presAssocID="{44A90682-7781-4612-9FFC-DA9195CD8EC1}" presName="Parent1" presStyleLbl="alignNode1" presStyleIdx="2" presStyleCnt="5" custLinFactY="-66386" custLinFactNeighborY="-100000">
-        <dgm:presLayoutVars>
-          <dgm:chMax val="1"/>
-          <dgm:chPref val="1"/>
-          <dgm:bulletEnabled val="1"/>
-        </dgm:presLayoutVars>
-      </dgm:prSet>
-      <dgm:spPr/>
-    </dgm:pt>
-    <dgm:pt modelId="{C0CE3C5C-5508-4767-9B4C-4C899EDE1E89}" type="pres">
-      <dgm:prSet presAssocID="{44A90682-7781-4612-9FFC-DA9195CD8EC1}" presName="Childtext1" presStyleLbl="revTx" presStyleIdx="2" presStyleCnt="5">
-        <dgm:presLayoutVars>
-          <dgm:chMax val="0"/>
-          <dgm:chPref val="0"/>
-          <dgm:bulletEnabled/>
-        </dgm:presLayoutVars>
-      </dgm:prSet>
-      <dgm:spPr/>
-    </dgm:pt>
-    <dgm:pt modelId="{81135117-69EF-4429-B2C8-1BB030260010}" type="pres">
-      <dgm:prSet presAssocID="{44A90682-7781-4612-9FFC-DA9195CD8EC1}" presName="ConnectLine" presStyleLbl="sibTrans1D1" presStyleIdx="2" presStyleCnt="5"/>
-      <dgm:spPr>
-        <a:noFill/>
-        <a:ln w="12700" cap="flat" cmpd="sng" algn="ctr">
-          <a:solidFill>
-            <a:schemeClr val="accent1">
-              <a:hueOff val="0"/>
-              <a:satOff val="0"/>
-              <a:lumOff val="0"/>
-              <a:alphaOff val="0"/>
-            </a:schemeClr>
-          </a:solidFill>
-          <a:prstDash val="dash"/>
-        </a:ln>
-        <a:effectLst/>
-      </dgm:spPr>
-    </dgm:pt>
-    <dgm:pt modelId="{42A210F7-6AA0-4950-8054-6D03D79E6340}" type="pres">
-      <dgm:prSet presAssocID="{44A90682-7781-4612-9FFC-DA9195CD8EC1}" presName="ConnectLineEnd" presStyleLbl="node1" presStyleIdx="2" presStyleCnt="5"/>
-      <dgm:spPr/>
-    </dgm:pt>
-    <dgm:pt modelId="{E67073FB-D2D2-4B45-8BC1-43AD1429206B}" type="pres">
-      <dgm:prSet presAssocID="{44A90682-7781-4612-9FFC-DA9195CD8EC1}" presName="EmptyPane" presStyleCnt="0"/>
-      <dgm:spPr/>
-    </dgm:pt>
-    <dgm:pt modelId="{7E71538C-BAE4-498F-87A3-9BD9065A0150}" type="pres">
-      <dgm:prSet presAssocID="{B1D2F799-CBAE-4272-8BE9-FED8B0A5ED5B}" presName="spaceBetweenRectangles" presStyleLbl="fgAcc1" presStyleIdx="2" presStyleCnt="4"/>
-      <dgm:spPr/>
-    </dgm:pt>
-    <dgm:pt modelId="{D1770950-AE34-40D9-810A-BC109B39D24D}" type="pres">
-      <dgm:prSet presAssocID="{9845D52A-E054-4EB0-A5A3-32AE7DC6D645}" presName="composite" presStyleCnt="0"/>
-      <dgm:spPr/>
-    </dgm:pt>
-    <dgm:pt modelId="{BF256D98-0EB6-41C8-AEED-E83691475757}" type="pres">
-      <dgm:prSet presAssocID="{9845D52A-E054-4EB0-A5A3-32AE7DC6D645}" presName="Parent1" presStyleLbl="alignNode1" presStyleIdx="3" presStyleCnt="5">
-        <dgm:presLayoutVars>
-          <dgm:chMax val="1"/>
-          <dgm:chPref val="1"/>
-          <dgm:bulletEnabled val="1"/>
-        </dgm:presLayoutVars>
-      </dgm:prSet>
-      <dgm:spPr/>
-    </dgm:pt>
-    <dgm:pt modelId="{DEDEAEC8-775B-4A0E-BDF8-C0B5BC0821DF}" type="pres">
-      <dgm:prSet presAssocID="{9845D52A-E054-4EB0-A5A3-32AE7DC6D645}" presName="Childtext1" presStyleLbl="revTx" presStyleIdx="3" presStyleCnt="5">
-        <dgm:presLayoutVars>
-          <dgm:chMax val="0"/>
-          <dgm:chPref val="0"/>
-          <dgm:bulletEnabled/>
-        </dgm:presLayoutVars>
-      </dgm:prSet>
-      <dgm:spPr/>
-    </dgm:pt>
-    <dgm:pt modelId="{D59E0661-D3C3-4072-9F55-5F1D1C88A7C9}" type="pres">
-      <dgm:prSet presAssocID="{9845D52A-E054-4EB0-A5A3-32AE7DC6D645}" presName="ConnectLine" presStyleLbl="sibTrans1D1" presStyleIdx="3" presStyleCnt="5"/>
-      <dgm:spPr>
-        <a:noFill/>
-        <a:ln w="12700" cap="flat" cmpd="sng" algn="ctr">
-          <a:solidFill>
-            <a:schemeClr val="accent1">
-              <a:hueOff val="0"/>
-              <a:satOff val="0"/>
-              <a:lumOff val="0"/>
-              <a:alphaOff val="0"/>
-            </a:schemeClr>
-          </a:solidFill>
-          <a:prstDash val="dash"/>
-        </a:ln>
-        <a:effectLst/>
-      </dgm:spPr>
-    </dgm:pt>
-    <dgm:pt modelId="{4A753F44-E78B-4293-B0C7-6430408A43FA}" type="pres">
-      <dgm:prSet presAssocID="{9845D52A-E054-4EB0-A5A3-32AE7DC6D645}" presName="ConnectLineEnd" presStyleLbl="node1" presStyleIdx="3" presStyleCnt="5"/>
-      <dgm:spPr/>
-    </dgm:pt>
-    <dgm:pt modelId="{40AE410E-3FB3-4E51-8DE0-EDECFB7DA049}" type="pres">
-      <dgm:prSet presAssocID="{9845D52A-E054-4EB0-A5A3-32AE7DC6D645}" presName="EmptyPane" presStyleCnt="0"/>
-      <dgm:spPr/>
-    </dgm:pt>
-    <dgm:pt modelId="{601495B8-8CCC-4CA7-9BCE-B7441480B866}" type="pres">
-      <dgm:prSet presAssocID="{796364FD-7651-493A-AEE5-8DD45DF8EEAC}" presName="spaceBetweenRectangles" presStyleLbl="fgAcc1" presStyleIdx="3" presStyleCnt="4"/>
-      <dgm:spPr/>
-    </dgm:pt>
-    <dgm:pt modelId="{5B34DA1A-FC3A-4252-92D3-378DC0EC0FE5}" type="pres">
-      <dgm:prSet presAssocID="{9AC77E87-FC4D-4F04-889B-73358514DC0D}" presName="composite" presStyleCnt="0"/>
-      <dgm:spPr/>
-    </dgm:pt>
-    <dgm:pt modelId="{2167599F-F719-471E-A82D-5E79BEF908F2}" type="pres">
-      <dgm:prSet presAssocID="{9AC77E87-FC4D-4F04-889B-73358514DC0D}" presName="Parent1" presStyleLbl="alignNode1" presStyleIdx="4" presStyleCnt="5" custLinFactY="-16386" custLinFactNeighborX="3476" custLinFactNeighborY="-100000">
-        <dgm:presLayoutVars>
-          <dgm:chMax val="1"/>
-          <dgm:chPref val="1"/>
-          <dgm:bulletEnabled val="1"/>
-        </dgm:presLayoutVars>
-      </dgm:prSet>
-      <dgm:spPr/>
-    </dgm:pt>
-    <dgm:pt modelId="{BFDCC47A-3FE9-44B5-9256-8406C22486BA}" type="pres">
-      <dgm:prSet presAssocID="{9AC77E87-FC4D-4F04-889B-73358514DC0D}" presName="Childtext1" presStyleLbl="revTx" presStyleIdx="4" presStyleCnt="5">
-        <dgm:presLayoutVars>
-          <dgm:chMax val="0"/>
-          <dgm:chPref val="0"/>
-          <dgm:bulletEnabled/>
-        </dgm:presLayoutVars>
-      </dgm:prSet>
-      <dgm:spPr/>
-    </dgm:pt>
-    <dgm:pt modelId="{DF12EC0F-ABC1-486B-A916-C06438CBEF0F}" type="pres">
-      <dgm:prSet presAssocID="{9AC77E87-FC4D-4F04-889B-73358514DC0D}" presName="ConnectLine" presStyleLbl="sibTrans1D1" presStyleIdx="4" presStyleCnt="5"/>
-      <dgm:spPr>
-        <a:noFill/>
-        <a:ln w="12700" cap="flat" cmpd="sng" algn="ctr">
-          <a:solidFill>
-            <a:schemeClr val="accent1">
-              <a:hueOff val="0"/>
-              <a:satOff val="0"/>
-              <a:lumOff val="0"/>
-              <a:alphaOff val="0"/>
-            </a:schemeClr>
-          </a:solidFill>
-          <a:prstDash val="dash"/>
-        </a:ln>
-        <a:effectLst/>
-      </dgm:spPr>
-    </dgm:pt>
-    <dgm:pt modelId="{140BD0F3-FA93-4CE5-A91C-40B9CBAA8403}" type="pres">
-      <dgm:prSet presAssocID="{9AC77E87-FC4D-4F04-889B-73358514DC0D}" presName="ConnectLineEnd" presStyleLbl="node1" presStyleIdx="4" presStyleCnt="5"/>
-      <dgm:spPr/>
-    </dgm:pt>
-    <dgm:pt modelId="{D3810F1D-4B00-48FE-B4C9-510F3F52C1C3}" type="pres">
-      <dgm:prSet presAssocID="{9AC77E87-FC4D-4F04-889B-73358514DC0D}" presName="EmptyPane" presStyleCnt="0"/>
-      <dgm:spPr/>
-    </dgm:pt>
-  </dgm:ptLst>
-  <dgm:cxnLst>
-    <dgm:cxn modelId="{82C2E40D-9BC0-4ADA-915E-708000D2737D}" srcId="{E5E4D699-C3CF-4415-B32C-A18B48AFE2A3}" destId="{9DB38719-EEF9-4638-91CE-8E8C646CC524}" srcOrd="0" destOrd="0" parTransId="{2D70C797-29DD-498F-9D71-4F6A2362408D}" sibTransId="{B8EFC625-D79E-4B16-A077-46ABEB1913DC}"/>
-    <dgm:cxn modelId="{6E1E710E-5FCE-4A3A-BCC2-57EE88D2B611}" type="presOf" srcId="{9845D52A-E054-4EB0-A5A3-32AE7DC6D645}" destId="{BF256D98-0EB6-41C8-AEED-E83691475757}" srcOrd="0" destOrd="0" presId="urn:microsoft.com/office/officeart/2016/7/layout/HexagonTimeline"/>
-    <dgm:cxn modelId="{B04C6215-C46D-4282-963F-02A26E25C8AB}" srcId="{08F627ED-A304-4697-8C44-18E45D3D2B1A}" destId="{9845D52A-E054-4EB0-A5A3-32AE7DC6D645}" srcOrd="3" destOrd="0" parTransId="{952EE001-86C3-4022-96EE-ABDB540B8A78}" sibTransId="{796364FD-7651-493A-AEE5-8DD45DF8EEAC}"/>
-    <dgm:cxn modelId="{0BBE1328-2BDE-48E8-8607-729E9AD5CC15}" type="presOf" srcId="{9DB38719-EEF9-4638-91CE-8E8C646CC524}" destId="{3F8C8DF1-69FF-4267-9807-429FE1F669A4}" srcOrd="0" destOrd="0" presId="urn:microsoft.com/office/officeart/2016/7/layout/HexagonTimeline"/>
-    <dgm:cxn modelId="{BD204A29-3AE9-4D43-8D20-E6691DA3D10E}" type="presOf" srcId="{566C4A8F-CE66-4FF5-AF11-6C385F74A275}" destId="{DEDEAEC8-775B-4A0E-BDF8-C0B5BC0821DF}" srcOrd="0" destOrd="0" presId="urn:microsoft.com/office/officeart/2016/7/layout/HexagonTimeline"/>
-    <dgm:cxn modelId="{C5D8602B-517E-43E4-BD3A-FC1FECDD1246}" type="presOf" srcId="{08F627ED-A304-4697-8C44-18E45D3D2B1A}" destId="{0580C383-85A3-425E-A44E-5E7306FF943E}" srcOrd="0" destOrd="0" presId="urn:microsoft.com/office/officeart/2016/7/layout/HexagonTimeline"/>
-    <dgm:cxn modelId="{66E8CE3C-459F-4648-B4D7-5039298A0E92}" srcId="{9845D52A-E054-4EB0-A5A3-32AE7DC6D645}" destId="{566C4A8F-CE66-4FF5-AF11-6C385F74A275}" srcOrd="0" destOrd="0" parTransId="{375C5A5E-5F04-4FE8-98F8-795867C18A18}" sibTransId="{E74B8A5E-78D9-4E5B-86E1-203DE271581F}"/>
-    <dgm:cxn modelId="{6D67163F-4880-4E0E-B95A-F0DDE2AB3673}" type="presOf" srcId="{C2F0E5C9-2943-4A9B-872F-ECF6B159E9F4}" destId="{BFDCC47A-3FE9-44B5-9256-8406C22486BA}" srcOrd="0" destOrd="0" presId="urn:microsoft.com/office/officeart/2016/7/layout/HexagonTimeline"/>
-    <dgm:cxn modelId="{F5DFEB44-AE5A-49D5-8105-E6D86410137A}" srcId="{08F627ED-A304-4697-8C44-18E45D3D2B1A}" destId="{44A90682-7781-4612-9FFC-DA9195CD8EC1}" srcOrd="2" destOrd="0" parTransId="{15DC71EA-684D-4AA7-A936-92D26EE7F934}" sibTransId="{B1D2F799-CBAE-4272-8BE9-FED8B0A5ED5B}"/>
-    <dgm:cxn modelId="{04774158-8FAB-47B4-A2EE-D3D3A7E958BE}" srcId="{08F627ED-A304-4697-8C44-18E45D3D2B1A}" destId="{9AC77E87-FC4D-4F04-889B-73358514DC0D}" srcOrd="4" destOrd="0" parTransId="{B29F90F6-921F-42B9-A496-5D121F61821E}" sibTransId="{3A77AB9A-DF29-465E-A0A5-D4FA3D0C537F}"/>
-    <dgm:cxn modelId="{FF79A57F-A2E9-483E-AD10-5F90BB6D9BFF}" type="presOf" srcId="{5FC34D3A-C8D4-483C-8695-507470E74D50}" destId="{63AECF3B-25CA-476D-B7CA-904B4760CF3F}" srcOrd="0" destOrd="0" presId="urn:microsoft.com/office/officeart/2016/7/layout/HexagonTimeline"/>
-    <dgm:cxn modelId="{FB0FA082-3950-4822-951F-05A1A9548F18}" srcId="{5FC34D3A-C8D4-483C-8695-507470E74D50}" destId="{C057D6ED-8F49-42DC-B8A7-C07F68F0F734}" srcOrd="0" destOrd="0" parTransId="{131D11D9-3030-4E3B-8F84-0108E6497B2A}" sibTransId="{6E885013-4246-43E1-A818-2251A99C8FD2}"/>
-    <dgm:cxn modelId="{F7608388-5A1F-4FE9-96E5-520EA7B1F725}" srcId="{9AC77E87-FC4D-4F04-889B-73358514DC0D}" destId="{C2F0E5C9-2943-4A9B-872F-ECF6B159E9F4}" srcOrd="0" destOrd="0" parTransId="{8FBB852D-32B7-4273-9DE3-951F1CFE69EC}" sibTransId="{1A62CB6F-38D7-44F2-AFAB-0C4382E3DA24}"/>
-    <dgm:cxn modelId="{35B936A8-2271-4C63-95B7-0EA12D0C625E}" type="presOf" srcId="{44A90682-7781-4612-9FFC-DA9195CD8EC1}" destId="{3782C2A6-B84E-4852-8D55-A4CFB2DCB5F5}" srcOrd="0" destOrd="0" presId="urn:microsoft.com/office/officeart/2016/7/layout/HexagonTimeline"/>
-    <dgm:cxn modelId="{A6BB1BBC-671E-4B35-937E-DD6E947B3158}" type="presOf" srcId="{C057D6ED-8F49-42DC-B8A7-C07F68F0F734}" destId="{7197D426-886B-449E-A886-FD13F5E0AC97}" srcOrd="0" destOrd="0" presId="urn:microsoft.com/office/officeart/2016/7/layout/HexagonTimeline"/>
-    <dgm:cxn modelId="{EBF452CA-3471-43AB-ACE9-A8D1E3C66270}" type="presOf" srcId="{E5E4D699-C3CF-4415-B32C-A18B48AFE2A3}" destId="{556899F1-13C2-441E-879C-8B5F26234632}" srcOrd="0" destOrd="0" presId="urn:microsoft.com/office/officeart/2016/7/layout/HexagonTimeline"/>
-    <dgm:cxn modelId="{277179CE-E2F5-4733-8D23-9E37CACB7B9E}" srcId="{08F627ED-A304-4697-8C44-18E45D3D2B1A}" destId="{5FC34D3A-C8D4-483C-8695-507470E74D50}" srcOrd="1" destOrd="0" parTransId="{9978A89C-C2F1-4241-807C-13619E6D6376}" sibTransId="{1DECF9F5-40C0-4379-BCCE-7BCAAD54807B}"/>
-    <dgm:cxn modelId="{D83265D3-E692-4137-90D3-748CD191DC94}" type="presOf" srcId="{9AC77E87-FC4D-4F04-889B-73358514DC0D}" destId="{2167599F-F719-471E-A82D-5E79BEF908F2}" srcOrd="0" destOrd="0" presId="urn:microsoft.com/office/officeart/2016/7/layout/HexagonTimeline"/>
-    <dgm:cxn modelId="{D4F051D3-EB47-4FD6-A974-A812CFCEC723}" srcId="{44A90682-7781-4612-9FFC-DA9195CD8EC1}" destId="{2CDF0086-1502-4E31-9E9A-3A37F419B5F4}" srcOrd="0" destOrd="0" parTransId="{FDC3C5C8-DB07-4690-9775-78EBE845226C}" sibTransId="{6E6E05A7-D4DC-4FD9-AF74-EF71DC5E70A3}"/>
-    <dgm:cxn modelId="{A2DF84EA-DA42-4F03-BD6F-8E8D9966CB10}" srcId="{08F627ED-A304-4697-8C44-18E45D3D2B1A}" destId="{E5E4D699-C3CF-4415-B32C-A18B48AFE2A3}" srcOrd="0" destOrd="0" parTransId="{C7C70553-EB1A-4554-849D-8153CC4AFCEB}" sibTransId="{61990FFE-20A5-4112-BACD-16BA28C36EBA}"/>
-    <dgm:cxn modelId="{F50E83F1-3F88-44C4-80C2-AF5738D46773}" type="presOf" srcId="{2CDF0086-1502-4E31-9E9A-3A37F419B5F4}" destId="{C0CE3C5C-5508-4767-9B4C-4C899EDE1E89}" srcOrd="0" destOrd="0" presId="urn:microsoft.com/office/officeart/2016/7/layout/HexagonTimeline"/>
-    <dgm:cxn modelId="{F6B66A9F-F428-4AD7-99F8-E293C148ADA4}" type="presParOf" srcId="{0580C383-85A3-425E-A44E-5E7306FF943E}" destId="{78B1F1D9-D4A1-4078-8320-A9F734DAF01D}" srcOrd="0" destOrd="0" presId="urn:microsoft.com/office/officeart/2016/7/layout/HexagonTimeline"/>
-    <dgm:cxn modelId="{F8D9346E-E7B0-4A3E-A3E5-66D91A5BB4EF}" type="presParOf" srcId="{78B1F1D9-D4A1-4078-8320-A9F734DAF01D}" destId="{556899F1-13C2-441E-879C-8B5F26234632}" srcOrd="0" destOrd="0" presId="urn:microsoft.com/office/officeart/2016/7/layout/HexagonTimeline"/>
-    <dgm:cxn modelId="{1F4BFCED-49A0-470B-807C-94766C1A6E88}" type="presParOf" srcId="{78B1F1D9-D4A1-4078-8320-A9F734DAF01D}" destId="{3F8C8DF1-69FF-4267-9807-429FE1F669A4}" srcOrd="1" destOrd="0" presId="urn:microsoft.com/office/officeart/2016/7/layout/HexagonTimeline"/>
-    <dgm:cxn modelId="{453F1C98-FCC0-488D-9610-0BEFFADC7BBD}" type="presParOf" srcId="{78B1F1D9-D4A1-4078-8320-A9F734DAF01D}" destId="{7CD542A5-A839-406E-A09D-761397CD34CA}" srcOrd="2" destOrd="0" presId="urn:microsoft.com/office/officeart/2016/7/layout/HexagonTimeline"/>
-    <dgm:cxn modelId="{1D60F2B8-EC42-4898-9347-2E9FEA726633}" type="presParOf" srcId="{78B1F1D9-D4A1-4078-8320-A9F734DAF01D}" destId="{8EAC9032-35F1-40A2-BA92-FC6DD5F3161F}" srcOrd="3" destOrd="0" presId="urn:microsoft.com/office/officeart/2016/7/layout/HexagonTimeline"/>
-    <dgm:cxn modelId="{0C4C8501-E8D0-4411-8A38-A7BBFDB0E499}" type="presParOf" srcId="{78B1F1D9-D4A1-4078-8320-A9F734DAF01D}" destId="{CF11A881-B1B6-4E4B-9AB0-2514A9285EBA}" srcOrd="4" destOrd="0" presId="urn:microsoft.com/office/officeart/2016/7/layout/HexagonTimeline"/>
-    <dgm:cxn modelId="{1070EAB3-C0F2-4158-9934-A96BE7D30CD9}" type="presParOf" srcId="{0580C383-85A3-425E-A44E-5E7306FF943E}" destId="{0EDA1889-E3C7-4C7B-AA49-EF34A4D5D342}" srcOrd="1" destOrd="0" presId="urn:microsoft.com/office/officeart/2016/7/layout/HexagonTimeline"/>
-    <dgm:cxn modelId="{FFEB116A-0DE3-4720-BD99-8ABC77BD1C02}" type="presParOf" srcId="{0580C383-85A3-425E-A44E-5E7306FF943E}" destId="{AF022427-467C-44D2-B19C-073E877201DB}" srcOrd="2" destOrd="0" presId="urn:microsoft.com/office/officeart/2016/7/layout/HexagonTimeline"/>
-    <dgm:cxn modelId="{9EF28E46-6E27-4C18-BDF8-0BFCC94FA57E}" type="presParOf" srcId="{AF022427-467C-44D2-B19C-073E877201DB}" destId="{63AECF3B-25CA-476D-B7CA-904B4760CF3F}" srcOrd="0" destOrd="0" presId="urn:microsoft.com/office/officeart/2016/7/layout/HexagonTimeline"/>
-    <dgm:cxn modelId="{E6ED1BB3-E46F-42D9-9458-24DED11FEC07}" type="presParOf" srcId="{AF022427-467C-44D2-B19C-073E877201DB}" destId="{7197D426-886B-449E-A886-FD13F5E0AC97}" srcOrd="1" destOrd="0" presId="urn:microsoft.com/office/officeart/2016/7/layout/HexagonTimeline"/>
-    <dgm:cxn modelId="{FECFBD0C-B248-4FB1-86E5-D192B987C2F5}" type="presParOf" srcId="{AF022427-467C-44D2-B19C-073E877201DB}" destId="{B9D6C9D4-469A-4107-97AE-8C43EA5CB946}" srcOrd="2" destOrd="0" presId="urn:microsoft.com/office/officeart/2016/7/layout/HexagonTimeline"/>
-    <dgm:cxn modelId="{B645B247-C944-4B53-A533-FC70B88844CA}" type="presParOf" srcId="{AF022427-467C-44D2-B19C-073E877201DB}" destId="{C1BEC2C0-22DD-44C4-AAFC-5C26B7685EF4}" srcOrd="3" destOrd="0" presId="urn:microsoft.com/office/officeart/2016/7/layout/HexagonTimeline"/>
-    <dgm:cxn modelId="{EFEB0104-9BE6-4BE6-8CA4-080E4EC1D796}" type="presParOf" srcId="{AF022427-467C-44D2-B19C-073E877201DB}" destId="{AC3D3D7F-40C6-4526-8B59-8E5946ACD3E0}" srcOrd="4" destOrd="0" presId="urn:microsoft.com/office/officeart/2016/7/layout/HexagonTimeline"/>
-    <dgm:cxn modelId="{30813E9F-92FE-457F-A798-34AED8C14747}" type="presParOf" srcId="{0580C383-85A3-425E-A44E-5E7306FF943E}" destId="{1E3B17F3-BEE3-4918-AC1A-690DF45EE902}" srcOrd="3" destOrd="0" presId="urn:microsoft.com/office/officeart/2016/7/layout/HexagonTimeline"/>
-    <dgm:cxn modelId="{0ECB84CD-C6FD-4919-9D8B-432ACF1EAD54}" type="presParOf" srcId="{0580C383-85A3-425E-A44E-5E7306FF943E}" destId="{72BCC622-94D2-4269-AB8E-70B7F8354D5D}" srcOrd="4" destOrd="0" presId="urn:microsoft.com/office/officeart/2016/7/layout/HexagonTimeline"/>
-    <dgm:cxn modelId="{553C220B-E7D6-42E9-9868-0D550CA4D158}" type="presParOf" srcId="{72BCC622-94D2-4269-AB8E-70B7F8354D5D}" destId="{3782C2A6-B84E-4852-8D55-A4CFB2DCB5F5}" srcOrd="0" destOrd="0" presId="urn:microsoft.com/office/officeart/2016/7/layout/HexagonTimeline"/>
-    <dgm:cxn modelId="{D450D88B-C3CA-4F24-A3FA-11DEFFE4F861}" type="presParOf" srcId="{72BCC622-94D2-4269-AB8E-70B7F8354D5D}" destId="{C0CE3C5C-5508-4767-9B4C-4C899EDE1E89}" srcOrd="1" destOrd="0" presId="urn:microsoft.com/office/officeart/2016/7/layout/HexagonTimeline"/>
-    <dgm:cxn modelId="{6DE67D7E-6DDE-4E4D-B6BF-3A4E083D208E}" type="presParOf" srcId="{72BCC622-94D2-4269-AB8E-70B7F8354D5D}" destId="{81135117-69EF-4429-B2C8-1BB030260010}" srcOrd="2" destOrd="0" presId="urn:microsoft.com/office/officeart/2016/7/layout/HexagonTimeline"/>
-    <dgm:cxn modelId="{AE85AEA8-BE20-49F2-9CB2-CC07DC192C21}" type="presParOf" srcId="{72BCC622-94D2-4269-AB8E-70B7F8354D5D}" destId="{42A210F7-6AA0-4950-8054-6D03D79E6340}" srcOrd="3" destOrd="0" presId="urn:microsoft.com/office/officeart/2016/7/layout/HexagonTimeline"/>
-    <dgm:cxn modelId="{46015D56-3F4D-4E95-A0F8-B4EA6C02C9FD}" type="presParOf" srcId="{72BCC622-94D2-4269-AB8E-70B7F8354D5D}" destId="{E67073FB-D2D2-4B45-8BC1-43AD1429206B}" srcOrd="4" destOrd="0" presId="urn:microsoft.com/office/officeart/2016/7/layout/HexagonTimeline"/>
-    <dgm:cxn modelId="{1D72D592-07D6-403C-B42A-4BA152D6B078}" type="presParOf" srcId="{0580C383-85A3-425E-A44E-5E7306FF943E}" destId="{7E71538C-BAE4-498F-87A3-9BD9065A0150}" srcOrd="5" destOrd="0" presId="urn:microsoft.com/office/officeart/2016/7/layout/HexagonTimeline"/>
-    <dgm:cxn modelId="{BFE8FC82-748F-4007-B16A-8ADD470E5CE8}" type="presParOf" srcId="{0580C383-85A3-425E-A44E-5E7306FF943E}" destId="{D1770950-AE34-40D9-810A-BC109B39D24D}" srcOrd="6" destOrd="0" presId="urn:microsoft.com/office/officeart/2016/7/layout/HexagonTimeline"/>
-    <dgm:cxn modelId="{DFBD7509-815F-4FB8-A809-02375B172794}" type="presParOf" srcId="{D1770950-AE34-40D9-810A-BC109B39D24D}" destId="{BF256D98-0EB6-41C8-AEED-E83691475757}" srcOrd="0" destOrd="0" presId="urn:microsoft.com/office/officeart/2016/7/layout/HexagonTimeline"/>
-    <dgm:cxn modelId="{0C3DD67A-9FDC-4E90-B290-3282E9CF1422}" type="presParOf" srcId="{D1770950-AE34-40D9-810A-BC109B39D24D}" destId="{DEDEAEC8-775B-4A0E-BDF8-C0B5BC0821DF}" srcOrd="1" destOrd="0" presId="urn:microsoft.com/office/officeart/2016/7/layout/HexagonTimeline"/>
-    <dgm:cxn modelId="{DE943765-9F2B-414A-B8D6-82E9446F1B9C}" type="presParOf" srcId="{D1770950-AE34-40D9-810A-BC109B39D24D}" destId="{D59E0661-D3C3-4072-9F55-5F1D1C88A7C9}" srcOrd="2" destOrd="0" presId="urn:microsoft.com/office/officeart/2016/7/layout/HexagonTimeline"/>
-    <dgm:cxn modelId="{8BCF504B-2DB1-409E-91C5-1930DC978596}" type="presParOf" srcId="{D1770950-AE34-40D9-810A-BC109B39D24D}" destId="{4A753F44-E78B-4293-B0C7-6430408A43FA}" srcOrd="3" destOrd="0" presId="urn:microsoft.com/office/officeart/2016/7/layout/HexagonTimeline"/>
-    <dgm:cxn modelId="{D5E0E930-6D1D-4CA3-9410-1B7166E1ECE6}" type="presParOf" srcId="{D1770950-AE34-40D9-810A-BC109B39D24D}" destId="{40AE410E-3FB3-4E51-8DE0-EDECFB7DA049}" srcOrd="4" destOrd="0" presId="urn:microsoft.com/office/officeart/2016/7/layout/HexagonTimeline"/>
-    <dgm:cxn modelId="{91F94770-C15E-4938-B10F-2A7CBA135758}" type="presParOf" srcId="{0580C383-85A3-425E-A44E-5E7306FF943E}" destId="{601495B8-8CCC-4CA7-9BCE-B7441480B866}" srcOrd="7" destOrd="0" presId="urn:microsoft.com/office/officeart/2016/7/layout/HexagonTimeline"/>
-    <dgm:cxn modelId="{D2F630C4-800F-4F2C-96C2-5FAC8C3DDA3F}" type="presParOf" srcId="{0580C383-85A3-425E-A44E-5E7306FF943E}" destId="{5B34DA1A-FC3A-4252-92D3-378DC0EC0FE5}" srcOrd="8" destOrd="0" presId="urn:microsoft.com/office/officeart/2016/7/layout/HexagonTimeline"/>
-    <dgm:cxn modelId="{42E56619-0899-4F93-AA04-6B89D6E75EE2}" type="presParOf" srcId="{5B34DA1A-FC3A-4252-92D3-378DC0EC0FE5}" destId="{2167599F-F719-471E-A82D-5E79BEF908F2}" srcOrd="0" destOrd="0" presId="urn:microsoft.com/office/officeart/2016/7/layout/HexagonTimeline"/>
-    <dgm:cxn modelId="{CC8BB429-1C1D-41D0-9C32-118F0D311091}" type="presParOf" srcId="{5B34DA1A-FC3A-4252-92D3-378DC0EC0FE5}" destId="{BFDCC47A-3FE9-44B5-9256-8406C22486BA}" srcOrd="1" destOrd="0" presId="urn:microsoft.com/office/officeart/2016/7/layout/HexagonTimeline"/>
-    <dgm:cxn modelId="{4363C672-AA2C-4885-821C-BF5619A95076}" type="presParOf" srcId="{5B34DA1A-FC3A-4252-92D3-378DC0EC0FE5}" destId="{DF12EC0F-ABC1-486B-A916-C06438CBEF0F}" srcOrd="2" destOrd="0" presId="urn:microsoft.com/office/officeart/2016/7/layout/HexagonTimeline"/>
-    <dgm:cxn modelId="{F95F8B9A-6966-4FC1-9D25-C6B1B1EDE017}" type="presParOf" srcId="{5B34DA1A-FC3A-4252-92D3-378DC0EC0FE5}" destId="{140BD0F3-FA93-4CE5-A91C-40B9CBAA8403}" srcOrd="3" destOrd="0" presId="urn:microsoft.com/office/officeart/2016/7/layout/HexagonTimeline"/>
-    <dgm:cxn modelId="{C6E7CA53-3FC8-438D-A502-77876C4B69E0}" type="presParOf" srcId="{5B34DA1A-FC3A-4252-92D3-378DC0EC0FE5}" destId="{D3810F1D-4B00-48FE-B4C9-510F3F52C1C3}" srcOrd="4" destOrd="0" presId="urn:microsoft.com/office/officeart/2016/7/layout/HexagonTimeline"/>
-  </dgm:cxnLst>
-  <dgm:bg/>
-  <dgm:whole/>
-  <dgm:extLst>
-    <a:ext uri="http://schemas.microsoft.com/office/drawing/2008/diagram">
-      <dsp:dataModelExt xmlns:dsp="http://schemas.microsoft.com/office/drawing/2008/diagram" relId="rId7" minVer="http://schemas.openxmlformats.org/drawingml/2006/diagram"/>
-    </a:ext>
-  </dgm:extLst>
-</dgm:dataModel>
-</file>
-
-<file path=ppt/diagrams/drawing1.xml><?xml version="1.0" encoding="utf-8"?>
-<dsp:drawing xmlns:dgm="http://schemas.openxmlformats.org/drawingml/2006/diagram" xmlns:dsp="http://schemas.microsoft.com/office/drawing/2008/diagram" xmlns:a="http://schemas.openxmlformats.org/drawingml/2006/main">
-  <dsp:spTree>
-    <dsp:nvGrpSpPr>
-      <dsp:cNvPr id="0" name=""/>
-      <dsp:cNvGrpSpPr/>
-    </dsp:nvGrpSpPr>
-    <dsp:grpSpPr/>
-    <dsp:sp modelId="{556899F1-13C2-441E-879C-8B5F26234632}">
-      <dsp:nvSpPr>
-        <dsp:cNvPr id="0" name=""/>
-        <dsp:cNvSpPr/>
-      </dsp:nvSpPr>
-      <dsp:spPr>
-        <a:xfrm>
-          <a:off x="274410" y="833924"/>
-          <a:ext cx="1448055" cy="447073"/>
-        </a:xfrm>
-        <a:prstGeom prst="homePlate">
-          <a:avLst>
-            <a:gd name="adj" fmla="val 40000"/>
-          </a:avLst>
-        </a:prstGeom>
-        <a:solidFill>
-          <a:schemeClr val="accent1">
-            <a:hueOff val="0"/>
-            <a:satOff val="0"/>
-            <a:lumOff val="0"/>
-            <a:alphaOff val="0"/>
-          </a:schemeClr>
-        </a:solidFill>
-        <a:ln w="12700" cap="flat" cmpd="sng" algn="ctr">
-          <a:solidFill>
-            <a:schemeClr val="accent1">
-              <a:hueOff val="0"/>
-              <a:satOff val="0"/>
-              <a:lumOff val="0"/>
-              <a:alphaOff val="0"/>
-            </a:schemeClr>
-          </a:solidFill>
-          <a:prstDash val="solid"/>
-        </a:ln>
-        <a:effectLst/>
-      </dsp:spPr>
-      <dsp:style>
-        <a:lnRef idx="2">
-          <a:scrgbClr r="0" g="0" b="0"/>
-        </a:lnRef>
-        <a:fillRef idx="1">
-          <a:scrgbClr r="0" g="0" b="0"/>
-        </a:fillRef>
-        <a:effectRef idx="1">
-          <a:scrgbClr r="0" g="0" b="0"/>
-        </a:effectRef>
-        <a:fontRef idx="minor">
-          <a:schemeClr val="lt1"/>
-        </a:fontRef>
-      </dsp:style>
-      <dsp:txBody>
-        <a:bodyPr spcFirstLastPara="0" vert="horz" wrap="square" lIns="83820" tIns="83820" rIns="83820" bIns="83820" numCol="1" spcCol="1270" anchor="ctr" anchorCtr="0">
-          <a:noAutofit/>
-        </a:bodyPr>
-        <a:lstStyle/>
-        <a:p>
-          <a:pPr marL="0" lvl="0" indent="0" algn="ctr" defTabSz="488950">
-            <a:lnSpc>
-              <a:spcPct val="90000"/>
-            </a:lnSpc>
-            <a:spcBef>
-              <a:spcPct val="0"/>
-            </a:spcBef>
-            <a:spcAft>
-              <a:spcPct val="35000"/>
-            </a:spcAft>
-            <a:buNone/>
-          </a:pPr>
-          <a:r>
-            <a:rPr lang="en-US" sz="1100" kern="1200" dirty="0"/>
-            <a:t>Brief Background</a:t>
-          </a:r>
-        </a:p>
-      </dsp:txBody>
-      <dsp:txXfrm>
-        <a:off x="274410" y="833924"/>
-        <a:ext cx="1358640" cy="447073"/>
-      </dsp:txXfrm>
-    </dsp:sp>
-    <dsp:sp modelId="{3F8C8DF1-69FF-4267-9807-429FE1F669A4}">
-      <dsp:nvSpPr>
-        <dsp:cNvPr id="0" name=""/>
-        <dsp:cNvSpPr/>
-      </dsp:nvSpPr>
-      <dsp:spPr>
-        <a:xfrm>
-          <a:off x="-7156" y="-805344"/>
-          <a:ext cx="2011188" cy="1192195"/>
-        </a:xfrm>
-        <a:prstGeom prst="rect">
-          <a:avLst/>
-        </a:prstGeom>
-        <a:noFill/>
-        <a:ln>
-          <a:noFill/>
-        </a:ln>
-        <a:effectLst/>
-      </dsp:spPr>
-      <dsp:style>
-        <a:lnRef idx="0">
-          <a:scrgbClr r="0" g="0" b="0"/>
-        </a:lnRef>
-        <a:fillRef idx="0">
-          <a:scrgbClr r="0" g="0" b="0"/>
-        </a:fillRef>
-        <a:effectRef idx="0">
-          <a:scrgbClr r="0" g="0" b="0"/>
-        </a:effectRef>
-        <a:fontRef idx="minor"/>
-      </dsp:style>
-      <dsp:txBody>
-        <a:bodyPr spcFirstLastPara="0" vert="horz" wrap="square" lIns="0" tIns="97790" rIns="0" bIns="97790" numCol="1" spcCol="1270" anchor="b" anchorCtr="1">
-          <a:noAutofit/>
-        </a:bodyPr>
-        <a:lstStyle/>
-        <a:p>
-          <a:pPr marL="0" lvl="0" indent="0" algn="ctr" defTabSz="488950">
-            <a:lnSpc>
-              <a:spcPct val="90000"/>
-            </a:lnSpc>
-            <a:spcBef>
-              <a:spcPct val="0"/>
-            </a:spcBef>
-            <a:spcAft>
-              <a:spcPct val="35000"/>
-            </a:spcAft>
-            <a:buNone/>
-          </a:pPr>
-          <a:r>
-            <a:rPr lang="en-US" sz="1100" kern="1200" dirty="0"/>
-            <a:t>Data Source</a:t>
-          </a:r>
-        </a:p>
-      </dsp:txBody>
-      <dsp:txXfrm>
-        <a:off x="-7156" y="-805344"/>
-        <a:ext cx="2011188" cy="1192195"/>
-      </dsp:txXfrm>
-    </dsp:sp>
-    <dsp:sp modelId="{0EDA1889-E3C7-4C7B-AA49-EF34A4D5D342}">
-      <dsp:nvSpPr>
-        <dsp:cNvPr id="0" name=""/>
-        <dsp:cNvSpPr/>
-      </dsp:nvSpPr>
-      <dsp:spPr>
-        <a:xfrm rot="3278303">
-          <a:off x="1514460" y="1460133"/>
-          <a:ext cx="987528" cy="0"/>
-        </a:xfrm>
-        <a:custGeom>
-          <a:avLst/>
-          <a:gdLst/>
-          <a:ahLst/>
-          <a:cxnLst/>
-          <a:rect l="0" t="0" r="0" b="0"/>
-          <a:pathLst>
-            <a:path>
-              <a:moveTo>
-                <a:pt x="0" y="0"/>
-              </a:moveTo>
-              <a:lnTo>
-                <a:pt x="987528" y="0"/>
-              </a:lnTo>
-            </a:path>
-          </a:pathLst>
-        </a:custGeom>
-        <a:noFill/>
-        <a:ln w="12700" cap="flat" cmpd="sng" algn="ctr">
-          <a:solidFill>
-            <a:schemeClr val="accent1">
-              <a:hueOff val="0"/>
-              <a:satOff val="0"/>
-              <a:lumOff val="0"/>
-              <a:alphaOff val="0"/>
-            </a:schemeClr>
-          </a:solidFill>
-          <a:prstDash val="solid"/>
-        </a:ln>
-        <a:effectLst/>
-      </dsp:spPr>
-      <dsp:style>
-        <a:lnRef idx="2">
-          <a:scrgbClr r="0" g="0" b="0"/>
-        </a:lnRef>
-        <a:fillRef idx="1">
-          <a:scrgbClr r="0" g="0" b="0"/>
-        </a:fillRef>
-        <a:effectRef idx="0">
-          <a:scrgbClr r="0" g="0" b="0"/>
-        </a:effectRef>
-        <a:fontRef idx="minor"/>
-      </dsp:style>
-    </dsp:sp>
-    <dsp:sp modelId="{7CD542A5-A839-406E-A09D-761397CD34CA}">
-      <dsp:nvSpPr>
-        <dsp:cNvPr id="0" name=""/>
-        <dsp:cNvSpPr/>
-      </dsp:nvSpPr>
-      <dsp:spPr>
-        <a:xfrm>
-          <a:off x="998438" y="461363"/>
-          <a:ext cx="0" cy="372561"/>
-        </a:xfrm>
-        <a:prstGeom prst="line">
-          <a:avLst/>
-        </a:prstGeom>
-        <a:noFill/>
-        <a:ln w="12700" cap="flat" cmpd="sng" algn="ctr">
-          <a:solidFill>
-            <a:schemeClr val="accent1">
-              <a:hueOff val="0"/>
-              <a:satOff val="0"/>
-              <a:lumOff val="0"/>
-              <a:alphaOff val="0"/>
-            </a:schemeClr>
-          </a:solidFill>
-          <a:prstDash val="dash"/>
-        </a:ln>
-        <a:effectLst/>
-      </dsp:spPr>
-      <dsp:style>
-        <a:lnRef idx="1">
-          <a:scrgbClr r="0" g="0" b="0"/>
-        </a:lnRef>
-        <a:fillRef idx="0">
-          <a:scrgbClr r="0" g="0" b="0"/>
-        </a:fillRef>
-        <a:effectRef idx="0">
-          <a:scrgbClr r="0" g="0" b="0"/>
-        </a:effectRef>
-        <a:fontRef idx="minor"/>
-      </dsp:style>
-    </dsp:sp>
-    <dsp:sp modelId="{8EAC9032-35F1-40A2-BA92-FC6DD5F3161F}">
-      <dsp:nvSpPr>
-        <dsp:cNvPr id="0" name=""/>
-        <dsp:cNvSpPr/>
-      </dsp:nvSpPr>
-      <dsp:spPr>
-        <a:xfrm>
-          <a:off x="961181" y="386851"/>
-          <a:ext cx="74512" cy="74512"/>
-        </a:xfrm>
-        <a:prstGeom prst="rect">
-          <a:avLst/>
-        </a:prstGeom>
-        <a:solidFill>
-          <a:schemeClr val="accent1">
-            <a:hueOff val="0"/>
-            <a:satOff val="0"/>
-            <a:lumOff val="0"/>
-            <a:alphaOff val="0"/>
-          </a:schemeClr>
-        </a:solidFill>
-        <a:ln w="19050" cap="flat" cmpd="sng" algn="ctr">
-          <a:solidFill>
-            <a:schemeClr val="lt1">
-              <a:hueOff val="0"/>
-              <a:satOff val="0"/>
-              <a:lumOff val="0"/>
-              <a:alphaOff val="0"/>
-            </a:schemeClr>
-          </a:solidFill>
-          <a:prstDash val="solid"/>
-        </a:ln>
-        <a:effectLst/>
-      </dsp:spPr>
-      <dsp:style>
-        <a:lnRef idx="3">
-          <a:scrgbClr r="0" g="0" b="0"/>
-        </a:lnRef>
-        <a:fillRef idx="1">
-          <a:scrgbClr r="0" g="0" b="0"/>
-        </a:fillRef>
-        <a:effectRef idx="1">
-          <a:scrgbClr r="0" g="0" b="0"/>
-        </a:effectRef>
-        <a:fontRef idx="minor">
-          <a:schemeClr val="lt1"/>
-        </a:fontRef>
-      </dsp:style>
-    </dsp:sp>
-    <dsp:sp modelId="{63AECF3B-25CA-476D-B7CA-904B4760CF3F}">
-      <dsp:nvSpPr>
-        <dsp:cNvPr id="0" name=""/>
-        <dsp:cNvSpPr/>
-      </dsp:nvSpPr>
-      <dsp:spPr>
-        <a:xfrm>
-          <a:off x="2293983" y="1639269"/>
-          <a:ext cx="1448055" cy="447073"/>
-        </a:xfrm>
-        <a:prstGeom prst="hexagon">
-          <a:avLst>
-            <a:gd name="adj" fmla="val 40000"/>
-            <a:gd name="vf" fmla="val 115470"/>
-          </a:avLst>
-        </a:prstGeom>
-        <a:solidFill>
-          <a:schemeClr val="accent1">
-            <a:hueOff val="0"/>
-            <a:satOff val="0"/>
-            <a:lumOff val="0"/>
-            <a:alphaOff val="0"/>
-          </a:schemeClr>
-        </a:solidFill>
-        <a:ln w="12700" cap="flat" cmpd="sng" algn="ctr">
-          <a:solidFill>
-            <a:schemeClr val="accent1">
-              <a:hueOff val="0"/>
-              <a:satOff val="0"/>
-              <a:lumOff val="0"/>
-              <a:alphaOff val="0"/>
-            </a:schemeClr>
-          </a:solidFill>
-          <a:prstDash val="solid"/>
-        </a:ln>
-        <a:effectLst/>
-      </dsp:spPr>
-      <dsp:style>
-        <a:lnRef idx="2">
-          <a:scrgbClr r="0" g="0" b="0"/>
-        </a:lnRef>
-        <a:fillRef idx="1">
-          <a:scrgbClr r="0" g="0" b="0"/>
-        </a:fillRef>
-        <a:effectRef idx="1">
-          <a:scrgbClr r="0" g="0" b="0"/>
-        </a:effectRef>
-        <a:fontRef idx="minor">
-          <a:schemeClr val="lt1"/>
-        </a:fontRef>
-      </dsp:style>
-      <dsp:txBody>
-        <a:bodyPr spcFirstLastPara="0" vert="horz" wrap="square" lIns="83820" tIns="83820" rIns="83820" bIns="83820" numCol="1" spcCol="1270" anchor="ctr" anchorCtr="0">
-          <a:noAutofit/>
-        </a:bodyPr>
-        <a:lstStyle/>
-        <a:p>
-          <a:pPr marL="0" lvl="0" indent="0" algn="ctr" defTabSz="488950">
-            <a:lnSpc>
-              <a:spcPct val="90000"/>
-            </a:lnSpc>
-            <a:spcBef>
-              <a:spcPct val="0"/>
-            </a:spcBef>
-            <a:spcAft>
-              <a:spcPct val="35000"/>
-            </a:spcAft>
-            <a:buNone/>
-          </a:pPr>
-          <a:r>
-            <a:rPr lang="en-US" sz="1100" kern="1200" dirty="0"/>
-            <a:t>Data Explanation</a:t>
-          </a:r>
-        </a:p>
-      </dsp:txBody>
-      <dsp:txXfrm>
-        <a:off x="2474264" y="1694929"/>
-        <a:ext cx="1087493" cy="335753"/>
-      </dsp:txXfrm>
-    </dsp:sp>
-    <dsp:sp modelId="{7197D426-886B-449E-A886-FD13F5E0AC97}">
-      <dsp:nvSpPr>
-        <dsp:cNvPr id="0" name=""/>
-        <dsp:cNvSpPr/>
-      </dsp:nvSpPr>
-      <dsp:spPr>
-        <a:xfrm>
-          <a:off x="2012416" y="2533416"/>
-          <a:ext cx="2011188" cy="1192195"/>
-        </a:xfrm>
-        <a:prstGeom prst="rect">
-          <a:avLst/>
-        </a:prstGeom>
-        <a:noFill/>
-        <a:ln>
-          <a:noFill/>
-        </a:ln>
-        <a:effectLst/>
-      </dsp:spPr>
-      <dsp:style>
-        <a:lnRef idx="0">
-          <a:scrgbClr r="0" g="0" b="0"/>
-        </a:lnRef>
-        <a:fillRef idx="0">
-          <a:scrgbClr r="0" g="0" b="0"/>
-        </a:fillRef>
-        <a:effectRef idx="0">
-          <a:scrgbClr r="0" g="0" b="0"/>
-        </a:effectRef>
-        <a:fontRef idx="minor"/>
-      </dsp:style>
-      <dsp:txBody>
-        <a:bodyPr spcFirstLastPara="0" vert="horz" wrap="square" lIns="0" tIns="97790" rIns="0" bIns="97790" numCol="1" spcCol="1270" anchor="t" anchorCtr="1">
-          <a:noAutofit/>
-        </a:bodyPr>
-        <a:lstStyle/>
-        <a:p>
-          <a:pPr marL="0" lvl="0" indent="0" algn="ctr" defTabSz="488950">
-            <a:lnSpc>
-              <a:spcPct val="90000"/>
-            </a:lnSpc>
-            <a:spcBef>
-              <a:spcPct val="0"/>
-            </a:spcBef>
-            <a:spcAft>
-              <a:spcPct val="35000"/>
-            </a:spcAft>
-            <a:buNone/>
-          </a:pPr>
-          <a:r>
-            <a:rPr lang="en-US" sz="1100" kern="1200" dirty="0"/>
-            <a:t>Turbidity</a:t>
-          </a:r>
-        </a:p>
-      </dsp:txBody>
-      <dsp:txXfrm>
-        <a:off x="2012416" y="2533416"/>
-        <a:ext cx="2011188" cy="1192195"/>
-      </dsp:txXfrm>
-    </dsp:sp>
-    <dsp:sp modelId="{1E3B17F3-BEE3-4918-AC1A-690DF45EE902}">
-      <dsp:nvSpPr>
-        <dsp:cNvPr id="0" name=""/>
-        <dsp:cNvSpPr/>
-      </dsp:nvSpPr>
-      <dsp:spPr>
-        <a:xfrm rot="18427617">
-          <a:off x="3557113" y="1490872"/>
-          <a:ext cx="932983" cy="0"/>
-        </a:xfrm>
-        <a:custGeom>
-          <a:avLst/>
-          <a:gdLst/>
-          <a:ahLst/>
-          <a:cxnLst/>
-          <a:rect l="0" t="0" r="0" b="0"/>
-          <a:pathLst>
-            <a:path>
-              <a:moveTo>
-                <a:pt x="0" y="0"/>
-              </a:moveTo>
-              <a:lnTo>
-                <a:pt x="932983" y="0"/>
-              </a:lnTo>
-            </a:path>
-          </a:pathLst>
-        </a:custGeom>
-        <a:noFill/>
-        <a:ln w="12700" cap="flat" cmpd="sng" algn="ctr">
-          <a:solidFill>
-            <a:schemeClr val="accent1">
-              <a:hueOff val="0"/>
-              <a:satOff val="0"/>
-              <a:lumOff val="0"/>
-              <a:alphaOff val="0"/>
-            </a:schemeClr>
-          </a:solidFill>
-          <a:prstDash val="solid"/>
-        </a:ln>
-        <a:effectLst/>
-      </dsp:spPr>
-      <dsp:style>
-        <a:lnRef idx="2">
-          <a:scrgbClr r="0" g="0" b="0"/>
-        </a:lnRef>
-        <a:fillRef idx="1">
-          <a:scrgbClr r="0" g="0" b="0"/>
-        </a:fillRef>
-        <a:effectRef idx="0">
-          <a:scrgbClr r="0" g="0" b="0"/>
-        </a:effectRef>
-        <a:fontRef idx="minor"/>
-      </dsp:style>
-    </dsp:sp>
-    <dsp:sp modelId="{B9D6C9D4-469A-4107-97AE-8C43EA5CB946}">
-      <dsp:nvSpPr>
-        <dsp:cNvPr id="0" name=""/>
-        <dsp:cNvSpPr/>
-      </dsp:nvSpPr>
-      <dsp:spPr>
-        <a:xfrm>
-          <a:off x="3018011" y="2086342"/>
-          <a:ext cx="0" cy="372561"/>
-        </a:xfrm>
-        <a:prstGeom prst="line">
-          <a:avLst/>
-        </a:prstGeom>
-        <a:noFill/>
-        <a:ln w="12700" cap="flat" cmpd="sng" algn="ctr">
-          <a:solidFill>
-            <a:schemeClr val="accent1">
-              <a:hueOff val="0"/>
-              <a:satOff val="0"/>
-              <a:lumOff val="0"/>
-              <a:alphaOff val="0"/>
-            </a:schemeClr>
-          </a:solidFill>
-          <a:prstDash val="dash"/>
-        </a:ln>
-        <a:effectLst/>
-      </dsp:spPr>
-      <dsp:style>
-        <a:lnRef idx="1">
-          <a:scrgbClr r="0" g="0" b="0"/>
-        </a:lnRef>
-        <a:fillRef idx="0">
-          <a:scrgbClr r="0" g="0" b="0"/>
-        </a:fillRef>
-        <a:effectRef idx="0">
-          <a:scrgbClr r="0" g="0" b="0"/>
-        </a:effectRef>
-        <a:fontRef idx="minor"/>
-      </dsp:style>
-    </dsp:sp>
-    <dsp:sp modelId="{C1BEC2C0-22DD-44C4-AAFC-5C26B7685EF4}">
-      <dsp:nvSpPr>
-        <dsp:cNvPr id="0" name=""/>
-        <dsp:cNvSpPr/>
-      </dsp:nvSpPr>
-      <dsp:spPr>
-        <a:xfrm>
-          <a:off x="2980755" y="2458903"/>
-          <a:ext cx="74512" cy="74512"/>
-        </a:xfrm>
-        <a:prstGeom prst="rect">
-          <a:avLst/>
-        </a:prstGeom>
-        <a:solidFill>
-          <a:schemeClr val="accent1">
-            <a:hueOff val="0"/>
-            <a:satOff val="0"/>
-            <a:lumOff val="0"/>
-            <a:alphaOff val="0"/>
-          </a:schemeClr>
-        </a:solidFill>
-        <a:ln w="19050" cap="flat" cmpd="sng" algn="ctr">
-          <a:solidFill>
-            <a:schemeClr val="lt1">
-              <a:hueOff val="0"/>
-              <a:satOff val="0"/>
-              <a:lumOff val="0"/>
-              <a:alphaOff val="0"/>
-            </a:schemeClr>
-          </a:solidFill>
-          <a:prstDash val="solid"/>
-        </a:ln>
-        <a:effectLst/>
-      </dsp:spPr>
-      <dsp:style>
-        <a:lnRef idx="3">
-          <a:scrgbClr r="0" g="0" b="0"/>
-        </a:lnRef>
-        <a:fillRef idx="1">
-          <a:scrgbClr r="0" g="0" b="0"/>
-        </a:fillRef>
-        <a:effectRef idx="1">
-          <a:scrgbClr r="0" g="0" b="0"/>
-        </a:effectRef>
-        <a:fontRef idx="minor">
-          <a:schemeClr val="lt1"/>
-        </a:fontRef>
-      </dsp:style>
-    </dsp:sp>
-    <dsp:sp modelId="{3782C2A6-B84E-4852-8D55-A4CFB2DCB5F5}">
-      <dsp:nvSpPr>
-        <dsp:cNvPr id="0" name=""/>
-        <dsp:cNvSpPr/>
-      </dsp:nvSpPr>
-      <dsp:spPr>
-        <a:xfrm>
-          <a:off x="4305172" y="895401"/>
-          <a:ext cx="1448055" cy="447073"/>
-        </a:xfrm>
-        <a:prstGeom prst="hexagon">
-          <a:avLst>
-            <a:gd name="adj" fmla="val 40000"/>
-            <a:gd name="vf" fmla="val 115470"/>
-          </a:avLst>
-        </a:prstGeom>
-        <a:solidFill>
-          <a:schemeClr val="accent1">
-            <a:hueOff val="0"/>
-            <a:satOff val="0"/>
-            <a:lumOff val="0"/>
-            <a:alphaOff val="0"/>
-          </a:schemeClr>
-        </a:solidFill>
-        <a:ln w="12700" cap="flat" cmpd="sng" algn="ctr">
-          <a:solidFill>
-            <a:schemeClr val="accent1">
-              <a:hueOff val="0"/>
-              <a:satOff val="0"/>
-              <a:lumOff val="0"/>
-              <a:alphaOff val="0"/>
-            </a:schemeClr>
-          </a:solidFill>
-          <a:prstDash val="solid"/>
-        </a:ln>
-        <a:effectLst/>
-      </dsp:spPr>
-      <dsp:style>
-        <a:lnRef idx="2">
-          <a:scrgbClr r="0" g="0" b="0"/>
-        </a:lnRef>
-        <a:fillRef idx="1">
-          <a:scrgbClr r="0" g="0" b="0"/>
-        </a:fillRef>
-        <a:effectRef idx="1">
-          <a:scrgbClr r="0" g="0" b="0"/>
-        </a:effectRef>
-        <a:fontRef idx="minor">
-          <a:schemeClr val="lt1"/>
-        </a:fontRef>
-      </dsp:style>
-      <dsp:txBody>
-        <a:bodyPr spcFirstLastPara="0" vert="horz" wrap="square" lIns="83820" tIns="83820" rIns="83820" bIns="83820" numCol="1" spcCol="1270" anchor="ctr" anchorCtr="0">
-          <a:noAutofit/>
-        </a:bodyPr>
-        <a:lstStyle/>
-        <a:p>
-          <a:pPr marL="0" lvl="0" indent="0" algn="ctr" defTabSz="488950">
-            <a:lnSpc>
-              <a:spcPct val="90000"/>
-            </a:lnSpc>
-            <a:spcBef>
-              <a:spcPct val="0"/>
-            </a:spcBef>
-            <a:spcAft>
-              <a:spcPct val="35000"/>
-            </a:spcAft>
-            <a:buNone/>
-          </a:pPr>
-          <a:r>
-            <a:rPr lang="en-US" sz="1100" kern="1200" dirty="0"/>
-            <a:t>Code </a:t>
-          </a:r>
-        </a:p>
-      </dsp:txBody>
-      <dsp:txXfrm>
-        <a:off x="4485453" y="951061"/>
-        <a:ext cx="1087493" cy="335753"/>
-      </dsp:txXfrm>
-    </dsp:sp>
-    <dsp:sp modelId="{C0CE3C5C-5508-4767-9B4C-4C899EDE1E89}">
-      <dsp:nvSpPr>
-        <dsp:cNvPr id="0" name=""/>
-        <dsp:cNvSpPr/>
-      </dsp:nvSpPr>
-      <dsp:spPr>
-        <a:xfrm>
-          <a:off x="4023605" y="-743867"/>
-          <a:ext cx="2011188" cy="1192195"/>
-        </a:xfrm>
-        <a:prstGeom prst="rect">
-          <a:avLst/>
-        </a:prstGeom>
-        <a:noFill/>
-        <a:ln>
-          <a:noFill/>
-        </a:ln>
-        <a:effectLst/>
-      </dsp:spPr>
-      <dsp:style>
-        <a:lnRef idx="0">
-          <a:scrgbClr r="0" g="0" b="0"/>
-        </a:lnRef>
-        <a:fillRef idx="0">
-          <a:scrgbClr r="0" g="0" b="0"/>
-        </a:fillRef>
-        <a:effectRef idx="0">
-          <a:scrgbClr r="0" g="0" b="0"/>
-        </a:effectRef>
-        <a:fontRef idx="minor"/>
-      </dsp:style>
-      <dsp:txBody>
-        <a:bodyPr spcFirstLastPara="0" vert="horz" wrap="square" lIns="0" tIns="97790" rIns="0" bIns="97790" numCol="1" spcCol="1270" anchor="b" anchorCtr="1">
-          <a:noAutofit/>
-        </a:bodyPr>
-        <a:lstStyle/>
-        <a:p>
-          <a:pPr marL="0" lvl="0" indent="0" algn="ctr" defTabSz="488950">
-            <a:lnSpc>
-              <a:spcPct val="90000"/>
-            </a:lnSpc>
-            <a:spcBef>
-              <a:spcPct val="0"/>
-            </a:spcBef>
-            <a:spcAft>
-              <a:spcPct val="35000"/>
-            </a:spcAft>
-            <a:buNone/>
-          </a:pPr>
-          <a:r>
-            <a:rPr lang="en-US" sz="1100" kern="1200" dirty="0"/>
-            <a:t>Quick Look</a:t>
-          </a:r>
-        </a:p>
-      </dsp:txBody>
-      <dsp:txXfrm>
-        <a:off x="4023605" y="-743867"/>
-        <a:ext cx="2011188" cy="1192195"/>
-      </dsp:txXfrm>
-    </dsp:sp>
-    <dsp:sp modelId="{7E71538C-BAE4-498F-87A3-9BD9065A0150}">
-      <dsp:nvSpPr>
-        <dsp:cNvPr id="0" name=""/>
-        <dsp:cNvSpPr/>
-      </dsp:nvSpPr>
-      <dsp:spPr>
-        <a:xfrm rot="3172383">
-          <a:off x="5568302" y="1490872"/>
-          <a:ext cx="932983" cy="0"/>
-        </a:xfrm>
-        <a:custGeom>
-          <a:avLst/>
-          <a:gdLst/>
-          <a:ahLst/>
-          <a:cxnLst/>
-          <a:rect l="0" t="0" r="0" b="0"/>
-          <a:pathLst>
-            <a:path>
-              <a:moveTo>
-                <a:pt x="0" y="0"/>
-              </a:moveTo>
-              <a:lnTo>
-                <a:pt x="932983" y="0"/>
-              </a:lnTo>
-            </a:path>
-          </a:pathLst>
-        </a:custGeom>
-        <a:noFill/>
-        <a:ln w="12700" cap="flat" cmpd="sng" algn="ctr">
-          <a:solidFill>
-            <a:schemeClr val="accent1">
-              <a:hueOff val="0"/>
-              <a:satOff val="0"/>
-              <a:lumOff val="0"/>
-              <a:alphaOff val="0"/>
-            </a:schemeClr>
-          </a:solidFill>
-          <a:prstDash val="solid"/>
-        </a:ln>
-        <a:effectLst/>
-      </dsp:spPr>
-      <dsp:style>
-        <a:lnRef idx="2">
-          <a:scrgbClr r="0" g="0" b="0"/>
-        </a:lnRef>
-        <a:fillRef idx="1">
-          <a:scrgbClr r="0" g="0" b="0"/>
-        </a:fillRef>
-        <a:effectRef idx="0">
-          <a:scrgbClr r="0" g="0" b="0"/>
-        </a:effectRef>
-        <a:fontRef idx="minor"/>
-      </dsp:style>
-    </dsp:sp>
-    <dsp:sp modelId="{81135117-69EF-4429-B2C8-1BB030260010}">
-      <dsp:nvSpPr>
-        <dsp:cNvPr id="0" name=""/>
-        <dsp:cNvSpPr/>
-      </dsp:nvSpPr>
-      <dsp:spPr>
-        <a:xfrm>
-          <a:off x="5029199" y="522840"/>
-          <a:ext cx="0" cy="372561"/>
-        </a:xfrm>
-        <a:prstGeom prst="line">
-          <a:avLst/>
-        </a:prstGeom>
-        <a:noFill/>
-        <a:ln w="12700" cap="flat" cmpd="sng" algn="ctr">
-          <a:solidFill>
-            <a:schemeClr val="accent1">
-              <a:hueOff val="0"/>
-              <a:satOff val="0"/>
-              <a:lumOff val="0"/>
-              <a:alphaOff val="0"/>
-            </a:schemeClr>
-          </a:solidFill>
-          <a:prstDash val="dash"/>
-        </a:ln>
-        <a:effectLst/>
-      </dsp:spPr>
-      <dsp:style>
-        <a:lnRef idx="1">
-          <a:scrgbClr r="0" g="0" b="0"/>
-        </a:lnRef>
-        <a:fillRef idx="0">
-          <a:scrgbClr r="0" g="0" b="0"/>
-        </a:fillRef>
-        <a:effectRef idx="0">
-          <a:scrgbClr r="0" g="0" b="0"/>
-        </a:effectRef>
-        <a:fontRef idx="minor"/>
-      </dsp:style>
-    </dsp:sp>
-    <dsp:sp modelId="{42A210F7-6AA0-4950-8054-6D03D79E6340}">
-      <dsp:nvSpPr>
-        <dsp:cNvPr id="0" name=""/>
-        <dsp:cNvSpPr/>
-      </dsp:nvSpPr>
-      <dsp:spPr>
-        <a:xfrm>
-          <a:off x="4991943" y="448328"/>
-          <a:ext cx="74512" cy="74512"/>
-        </a:xfrm>
-        <a:prstGeom prst="rect">
-          <a:avLst/>
-        </a:prstGeom>
-        <a:solidFill>
-          <a:schemeClr val="accent1">
-            <a:hueOff val="0"/>
-            <a:satOff val="0"/>
-            <a:lumOff val="0"/>
-            <a:alphaOff val="0"/>
-          </a:schemeClr>
-        </a:solidFill>
-        <a:ln w="19050" cap="flat" cmpd="sng" algn="ctr">
-          <a:solidFill>
-            <a:schemeClr val="lt1">
-              <a:hueOff val="0"/>
-              <a:satOff val="0"/>
-              <a:lumOff val="0"/>
-              <a:alphaOff val="0"/>
-            </a:schemeClr>
-          </a:solidFill>
-          <a:prstDash val="solid"/>
-        </a:ln>
-        <a:effectLst/>
-      </dsp:spPr>
-      <dsp:style>
-        <a:lnRef idx="3">
-          <a:scrgbClr r="0" g="0" b="0"/>
-        </a:lnRef>
-        <a:fillRef idx="1">
-          <a:scrgbClr r="0" g="0" b="0"/>
-        </a:fillRef>
-        <a:effectRef idx="1">
-          <a:scrgbClr r="0" g="0" b="0"/>
-        </a:effectRef>
-        <a:fontRef idx="minor">
-          <a:schemeClr val="lt1"/>
-        </a:fontRef>
-      </dsp:style>
-    </dsp:sp>
-    <dsp:sp modelId="{BF256D98-0EB6-41C8-AEED-E83691475757}">
-      <dsp:nvSpPr>
-        <dsp:cNvPr id="0" name=""/>
-        <dsp:cNvSpPr/>
-      </dsp:nvSpPr>
-      <dsp:spPr>
-        <a:xfrm>
-          <a:off x="6316360" y="1639269"/>
-          <a:ext cx="1448055" cy="447073"/>
-        </a:xfrm>
-        <a:prstGeom prst="hexagon">
-          <a:avLst>
-            <a:gd name="adj" fmla="val 40000"/>
-            <a:gd name="vf" fmla="val 115470"/>
-          </a:avLst>
-        </a:prstGeom>
-        <a:solidFill>
-          <a:schemeClr val="accent1">
-            <a:hueOff val="0"/>
-            <a:satOff val="0"/>
-            <a:lumOff val="0"/>
-            <a:alphaOff val="0"/>
-          </a:schemeClr>
-        </a:solidFill>
-        <a:ln w="12700" cap="flat" cmpd="sng" algn="ctr">
-          <a:solidFill>
-            <a:schemeClr val="accent1">
-              <a:hueOff val="0"/>
-              <a:satOff val="0"/>
-              <a:lumOff val="0"/>
-              <a:alphaOff val="0"/>
-            </a:schemeClr>
-          </a:solidFill>
-          <a:prstDash val="solid"/>
-        </a:ln>
-        <a:effectLst/>
-      </dsp:spPr>
-      <dsp:style>
-        <a:lnRef idx="2">
-          <a:scrgbClr r="0" g="0" b="0"/>
-        </a:lnRef>
-        <a:fillRef idx="1">
-          <a:scrgbClr r="0" g="0" b="0"/>
-        </a:fillRef>
-        <a:effectRef idx="1">
-          <a:scrgbClr r="0" g="0" b="0"/>
-        </a:effectRef>
-        <a:fontRef idx="minor">
-          <a:schemeClr val="lt1"/>
-        </a:fontRef>
-      </dsp:style>
-      <dsp:txBody>
-        <a:bodyPr spcFirstLastPara="0" vert="horz" wrap="square" lIns="83820" tIns="83820" rIns="83820" bIns="83820" numCol="1" spcCol="1270" anchor="ctr" anchorCtr="0">
-          <a:noAutofit/>
-        </a:bodyPr>
-        <a:lstStyle/>
-        <a:p>
-          <a:pPr marL="0" lvl="0" indent="0" algn="ctr" defTabSz="488950">
-            <a:lnSpc>
-              <a:spcPct val="90000"/>
-            </a:lnSpc>
-            <a:spcBef>
-              <a:spcPct val="0"/>
-            </a:spcBef>
-            <a:spcAft>
-              <a:spcPct val="35000"/>
-            </a:spcAft>
-            <a:buNone/>
-          </a:pPr>
-          <a:r>
-            <a:rPr lang="en-US" sz="1100" kern="1200" dirty="0"/>
-            <a:t>Chart(s) Overview</a:t>
-          </a:r>
-        </a:p>
-      </dsp:txBody>
-      <dsp:txXfrm>
-        <a:off x="6496641" y="1694929"/>
-        <a:ext cx="1087493" cy="335753"/>
-      </dsp:txXfrm>
-    </dsp:sp>
-    <dsp:sp modelId="{DEDEAEC8-775B-4A0E-BDF8-C0B5BC0821DF}">
-      <dsp:nvSpPr>
-        <dsp:cNvPr id="0" name=""/>
-        <dsp:cNvSpPr/>
-      </dsp:nvSpPr>
-      <dsp:spPr>
-        <a:xfrm>
-          <a:off x="6034794" y="2533416"/>
-          <a:ext cx="2011188" cy="1192195"/>
-        </a:xfrm>
-        <a:prstGeom prst="rect">
-          <a:avLst/>
-        </a:prstGeom>
-        <a:noFill/>
-        <a:ln>
-          <a:noFill/>
-        </a:ln>
-        <a:effectLst/>
-      </dsp:spPr>
-      <dsp:style>
-        <a:lnRef idx="0">
-          <a:scrgbClr r="0" g="0" b="0"/>
-        </a:lnRef>
-        <a:fillRef idx="0">
-          <a:scrgbClr r="0" g="0" b="0"/>
-        </a:fillRef>
-        <a:effectRef idx="0">
-          <a:scrgbClr r="0" g="0" b="0"/>
-        </a:effectRef>
-        <a:fontRef idx="minor"/>
-      </dsp:style>
-      <dsp:txBody>
-        <a:bodyPr spcFirstLastPara="0" vert="horz" wrap="square" lIns="0" tIns="97790" rIns="0" bIns="97790" numCol="1" spcCol="1270" anchor="t" anchorCtr="1">
-          <a:noAutofit/>
-        </a:bodyPr>
-        <a:lstStyle/>
-        <a:p>
-          <a:pPr marL="0" lvl="0" indent="0" algn="ctr" defTabSz="488950">
-            <a:lnSpc>
-              <a:spcPct val="90000"/>
-            </a:lnSpc>
-            <a:spcBef>
-              <a:spcPct val="0"/>
-            </a:spcBef>
-            <a:spcAft>
-              <a:spcPct val="35000"/>
-            </a:spcAft>
-            <a:buNone/>
-          </a:pPr>
-          <a:r>
-            <a:rPr lang="en-US" sz="1100" kern="1200" dirty="0"/>
-            <a:t>Explanation</a:t>
-          </a:r>
-        </a:p>
-      </dsp:txBody>
-      <dsp:txXfrm>
-        <a:off x="6034794" y="2533416"/>
-        <a:ext cx="2011188" cy="1192195"/>
-      </dsp:txXfrm>
-    </dsp:sp>
-    <dsp:sp modelId="{601495B8-8CCC-4CA7-9BCE-B7441480B866}">
-      <dsp:nvSpPr>
-        <dsp:cNvPr id="0" name=""/>
-        <dsp:cNvSpPr/>
-      </dsp:nvSpPr>
-      <dsp:spPr>
-        <a:xfrm rot="19181763">
-          <a:off x="7668942" y="1602640"/>
-          <a:ext cx="804416" cy="0"/>
-        </a:xfrm>
-        <a:custGeom>
-          <a:avLst/>
-          <a:gdLst/>
-          <a:ahLst/>
-          <a:cxnLst/>
-          <a:rect l="0" t="0" r="0" b="0"/>
-          <a:pathLst>
-            <a:path>
-              <a:moveTo>
-                <a:pt x="0" y="0"/>
-              </a:moveTo>
-              <a:lnTo>
-                <a:pt x="804416" y="0"/>
-              </a:lnTo>
-            </a:path>
-          </a:pathLst>
-        </a:custGeom>
-        <a:noFill/>
-        <a:ln w="12700" cap="flat" cmpd="sng" algn="ctr">
-          <a:solidFill>
-            <a:schemeClr val="accent1">
-              <a:hueOff val="0"/>
-              <a:satOff val="0"/>
-              <a:lumOff val="0"/>
-              <a:alphaOff val="0"/>
-            </a:schemeClr>
-          </a:solidFill>
-          <a:prstDash val="solid"/>
-        </a:ln>
-        <a:effectLst/>
-      </dsp:spPr>
-      <dsp:style>
-        <a:lnRef idx="2">
-          <a:scrgbClr r="0" g="0" b="0"/>
-        </a:lnRef>
-        <a:fillRef idx="1">
-          <a:scrgbClr r="0" g="0" b="0"/>
-        </a:fillRef>
-        <a:effectRef idx="0">
-          <a:scrgbClr r="0" g="0" b="0"/>
-        </a:effectRef>
-        <a:fontRef idx="minor"/>
-      </dsp:style>
-    </dsp:sp>
-    <dsp:sp modelId="{D59E0661-D3C3-4072-9F55-5F1D1C88A7C9}">
-      <dsp:nvSpPr>
-        <dsp:cNvPr id="0" name=""/>
-        <dsp:cNvSpPr/>
-      </dsp:nvSpPr>
-      <dsp:spPr>
-        <a:xfrm>
-          <a:off x="7040388" y="2086342"/>
-          <a:ext cx="0" cy="372561"/>
-        </a:xfrm>
-        <a:prstGeom prst="line">
-          <a:avLst/>
-        </a:prstGeom>
-        <a:noFill/>
-        <a:ln w="12700" cap="flat" cmpd="sng" algn="ctr">
-          <a:solidFill>
-            <a:schemeClr val="accent1">
-              <a:hueOff val="0"/>
-              <a:satOff val="0"/>
-              <a:lumOff val="0"/>
-              <a:alphaOff val="0"/>
-            </a:schemeClr>
-          </a:solidFill>
-          <a:prstDash val="dash"/>
-        </a:ln>
-        <a:effectLst/>
-      </dsp:spPr>
-      <dsp:style>
-        <a:lnRef idx="1">
-          <a:scrgbClr r="0" g="0" b="0"/>
-        </a:lnRef>
-        <a:fillRef idx="0">
-          <a:scrgbClr r="0" g="0" b="0"/>
-        </a:fillRef>
-        <a:effectRef idx="0">
-          <a:scrgbClr r="0" g="0" b="0"/>
-        </a:effectRef>
-        <a:fontRef idx="minor"/>
-      </dsp:style>
-    </dsp:sp>
-    <dsp:sp modelId="{4A753F44-E78B-4293-B0C7-6430408A43FA}">
-      <dsp:nvSpPr>
-        <dsp:cNvPr id="0" name=""/>
-        <dsp:cNvSpPr/>
-      </dsp:nvSpPr>
-      <dsp:spPr>
-        <a:xfrm>
-          <a:off x="7003132" y="2458903"/>
-          <a:ext cx="74512" cy="74512"/>
-        </a:xfrm>
-        <a:prstGeom prst="rect">
-          <a:avLst/>
-        </a:prstGeom>
-        <a:solidFill>
-          <a:schemeClr val="accent1">
-            <a:hueOff val="0"/>
-            <a:satOff val="0"/>
-            <a:lumOff val="0"/>
-            <a:alphaOff val="0"/>
-          </a:schemeClr>
-        </a:solidFill>
-        <a:ln w="19050" cap="flat" cmpd="sng" algn="ctr">
-          <a:solidFill>
-            <a:schemeClr val="lt1">
-              <a:hueOff val="0"/>
-              <a:satOff val="0"/>
-              <a:lumOff val="0"/>
-              <a:alphaOff val="0"/>
-            </a:schemeClr>
-          </a:solidFill>
-          <a:prstDash val="solid"/>
-        </a:ln>
-        <a:effectLst/>
-      </dsp:spPr>
-      <dsp:style>
-        <a:lnRef idx="3">
-          <a:scrgbClr r="0" g="0" b="0"/>
-        </a:lnRef>
-        <a:fillRef idx="1">
-          <a:scrgbClr r="0" g="0" b="0"/>
-        </a:fillRef>
-        <a:effectRef idx="1">
-          <a:scrgbClr r="0" g="0" b="0"/>
-        </a:effectRef>
-        <a:fontRef idx="minor">
-          <a:schemeClr val="lt1"/>
-        </a:fontRef>
-      </dsp:style>
-    </dsp:sp>
-    <dsp:sp modelId="{2167599F-F719-471E-A82D-5E79BEF908F2}">
-      <dsp:nvSpPr>
-        <dsp:cNvPr id="0" name=""/>
-        <dsp:cNvSpPr/>
-      </dsp:nvSpPr>
-      <dsp:spPr>
-        <a:xfrm rot="10800000">
-          <a:off x="8377884" y="1118938"/>
-          <a:ext cx="1448055" cy="447073"/>
-        </a:xfrm>
-        <a:prstGeom prst="homePlate">
-          <a:avLst>
-            <a:gd name="adj" fmla="val 40000"/>
-          </a:avLst>
-        </a:prstGeom>
-        <a:solidFill>
-          <a:schemeClr val="accent1">
-            <a:hueOff val="0"/>
-            <a:satOff val="0"/>
-            <a:lumOff val="0"/>
-            <a:alphaOff val="0"/>
-          </a:schemeClr>
-        </a:solidFill>
-        <a:ln w="12700" cap="flat" cmpd="sng" algn="ctr">
-          <a:solidFill>
-            <a:schemeClr val="accent1">
-              <a:hueOff val="0"/>
-              <a:satOff val="0"/>
-              <a:lumOff val="0"/>
-              <a:alphaOff val="0"/>
-            </a:schemeClr>
-          </a:solidFill>
-          <a:prstDash val="solid"/>
-        </a:ln>
-        <a:effectLst/>
-      </dsp:spPr>
-      <dsp:style>
-        <a:lnRef idx="2">
-          <a:scrgbClr r="0" g="0" b="0"/>
-        </a:lnRef>
-        <a:fillRef idx="1">
-          <a:scrgbClr r="0" g="0" b="0"/>
-        </a:fillRef>
-        <a:effectRef idx="1">
-          <a:scrgbClr r="0" g="0" b="0"/>
-        </a:effectRef>
-        <a:fontRef idx="minor">
-          <a:schemeClr val="lt1"/>
-        </a:fontRef>
-      </dsp:style>
-      <dsp:txBody>
-        <a:bodyPr spcFirstLastPara="0" vert="horz" wrap="square" lIns="83820" tIns="83820" rIns="83820" bIns="83820" numCol="1" spcCol="1270" anchor="ctr" anchorCtr="0">
-          <a:noAutofit/>
-        </a:bodyPr>
-        <a:lstStyle/>
-        <a:p>
-          <a:pPr marL="0" lvl="0" indent="0" algn="ctr" defTabSz="488950">
-            <a:lnSpc>
-              <a:spcPct val="90000"/>
-            </a:lnSpc>
-            <a:spcBef>
-              <a:spcPct val="0"/>
-            </a:spcBef>
-            <a:spcAft>
-              <a:spcPct val="35000"/>
-            </a:spcAft>
-            <a:buNone/>
-          </a:pPr>
-          <a:r>
-            <a:rPr lang="en-US" sz="1100" kern="1200" dirty="0"/>
-            <a:t>Conclusion</a:t>
-          </a:r>
-        </a:p>
-      </dsp:txBody>
-      <dsp:txXfrm rot="10800000">
-        <a:off x="8467299" y="1118938"/>
-        <a:ext cx="1358640" cy="447073"/>
-      </dsp:txXfrm>
-    </dsp:sp>
-    <dsp:sp modelId="{BFDCC47A-3FE9-44B5-9256-8406C22486BA}">
-      <dsp:nvSpPr>
-        <dsp:cNvPr id="0" name=""/>
-        <dsp:cNvSpPr/>
-      </dsp:nvSpPr>
-      <dsp:spPr>
-        <a:xfrm>
-          <a:off x="8096317" y="-520330"/>
-          <a:ext cx="2011188" cy="1192195"/>
-        </a:xfrm>
-        <a:prstGeom prst="rect">
-          <a:avLst/>
-        </a:prstGeom>
-        <a:noFill/>
-        <a:ln>
-          <a:noFill/>
-        </a:ln>
-        <a:effectLst/>
-      </dsp:spPr>
-      <dsp:style>
-        <a:lnRef idx="0">
-          <a:scrgbClr r="0" g="0" b="0"/>
-        </a:lnRef>
-        <a:fillRef idx="0">
-          <a:scrgbClr r="0" g="0" b="0"/>
-        </a:fillRef>
-        <a:effectRef idx="0">
-          <a:scrgbClr r="0" g="0" b="0"/>
-        </a:effectRef>
-        <a:fontRef idx="minor"/>
-      </dsp:style>
-      <dsp:txBody>
-        <a:bodyPr spcFirstLastPara="0" vert="horz" wrap="square" lIns="0" tIns="97790" rIns="0" bIns="97790" numCol="1" spcCol="1270" anchor="b" anchorCtr="1">
-          <a:noAutofit/>
-        </a:bodyPr>
-        <a:lstStyle/>
-        <a:p>
-          <a:pPr marL="0" lvl="0" indent="0" algn="ctr" defTabSz="488950">
-            <a:lnSpc>
-              <a:spcPct val="90000"/>
-            </a:lnSpc>
-            <a:spcBef>
-              <a:spcPct val="0"/>
-            </a:spcBef>
-            <a:spcAft>
-              <a:spcPct val="35000"/>
-            </a:spcAft>
-            <a:buNone/>
-          </a:pPr>
-          <a:r>
-            <a:rPr lang="en-US" sz="1100" kern="1200" dirty="0"/>
-            <a:t>Results Explained</a:t>
-          </a:r>
-        </a:p>
-      </dsp:txBody>
-      <dsp:txXfrm>
-        <a:off x="8096317" y="-520330"/>
-        <a:ext cx="2011188" cy="1192195"/>
-      </dsp:txXfrm>
-    </dsp:sp>
-    <dsp:sp modelId="{DF12EC0F-ABC1-486B-A916-C06438CBEF0F}">
-      <dsp:nvSpPr>
-        <dsp:cNvPr id="0" name=""/>
-        <dsp:cNvSpPr/>
-      </dsp:nvSpPr>
-      <dsp:spPr>
-        <a:xfrm>
-          <a:off x="9101912" y="746377"/>
-          <a:ext cx="0" cy="372561"/>
-        </a:xfrm>
-        <a:prstGeom prst="line">
-          <a:avLst/>
-        </a:prstGeom>
-        <a:noFill/>
-        <a:ln w="12700" cap="flat" cmpd="sng" algn="ctr">
-          <a:solidFill>
-            <a:schemeClr val="accent1">
-              <a:hueOff val="0"/>
-              <a:satOff val="0"/>
-              <a:lumOff val="0"/>
-              <a:alphaOff val="0"/>
-            </a:schemeClr>
-          </a:solidFill>
-          <a:prstDash val="dash"/>
-        </a:ln>
-        <a:effectLst/>
-      </dsp:spPr>
-      <dsp:style>
-        <a:lnRef idx="1">
-          <a:scrgbClr r="0" g="0" b="0"/>
-        </a:lnRef>
-        <a:fillRef idx="0">
-          <a:scrgbClr r="0" g="0" b="0"/>
-        </a:fillRef>
-        <a:effectRef idx="0">
-          <a:scrgbClr r="0" g="0" b="0"/>
-        </a:effectRef>
-        <a:fontRef idx="minor"/>
-      </dsp:style>
-    </dsp:sp>
-    <dsp:sp modelId="{140BD0F3-FA93-4CE5-A91C-40B9CBAA8403}">
-      <dsp:nvSpPr>
-        <dsp:cNvPr id="0" name=""/>
-        <dsp:cNvSpPr/>
-      </dsp:nvSpPr>
-      <dsp:spPr>
-        <a:xfrm>
-          <a:off x="9064656" y="671864"/>
-          <a:ext cx="74512" cy="74512"/>
-        </a:xfrm>
-        <a:prstGeom prst="rect">
-          <a:avLst/>
-        </a:prstGeom>
-        <a:solidFill>
-          <a:schemeClr val="accent1">
-            <a:hueOff val="0"/>
-            <a:satOff val="0"/>
-            <a:lumOff val="0"/>
-            <a:alphaOff val="0"/>
-          </a:schemeClr>
-        </a:solidFill>
-        <a:ln w="19050" cap="flat" cmpd="sng" algn="ctr">
-          <a:solidFill>
-            <a:schemeClr val="lt1">
-              <a:hueOff val="0"/>
-              <a:satOff val="0"/>
-              <a:lumOff val="0"/>
-              <a:alphaOff val="0"/>
-            </a:schemeClr>
-          </a:solidFill>
-          <a:prstDash val="solid"/>
-        </a:ln>
-        <a:effectLst/>
-      </dsp:spPr>
-      <dsp:style>
-        <a:lnRef idx="3">
-          <a:scrgbClr r="0" g="0" b="0"/>
-        </a:lnRef>
-        <a:fillRef idx="1">
-          <a:scrgbClr r="0" g="0" b="0"/>
-        </a:fillRef>
-        <a:effectRef idx="1">
-          <a:scrgbClr r="0" g="0" b="0"/>
-        </a:effectRef>
-        <a:fontRef idx="minor">
-          <a:schemeClr val="lt1"/>
-        </a:fontRef>
-      </dsp:style>
-    </dsp:sp>
-  </dsp:spTree>
-</dsp:drawing>
-</file>
-
-<file path=ppt/diagrams/layout1.xml><?xml version="1.0" encoding="utf-8"?>
-<dgm:layoutDef xmlns:dgm="http://schemas.openxmlformats.org/drawingml/2006/diagram" xmlns:a="http://schemas.openxmlformats.org/drawingml/2006/main" uniqueId="urn:microsoft.com/office/officeart/2016/7/layout/HexagonTimeline">
-  <dgm:title val="Hexagon Timeline"/>
-  <dgm:desc val="Use to show a list of events in chronological order. An invisible box contains the description while the date is shown in hexagons, except for the first and last node where the date is shown in a home shape. It can display large amount of text with medium length date format."/>
-  <dgm:catLst>
-    <dgm:cat type="timeline" pri="500"/>
-    <dgm:cat type="process" pri="600"/>
-  </dgm:catLst>
-  <dgm:sampData>
-    <dgm:dataModel>
-      <dgm:ptLst>
-        <dgm:pt modelId="0" type="doc"/>
-        <dgm:pt modelId="10">
-          <dgm:prSet phldr="1"/>
-        </dgm:pt>
-        <dgm:pt modelId="11">
-          <dgm:prSet phldr="1"/>
-        </dgm:pt>
-        <dgm:pt modelId="20">
-          <dgm:prSet phldr="1"/>
-        </dgm:pt>
-        <dgm:pt modelId="21">
-          <dgm:prSet phldr="1"/>
-        </dgm:pt>
-        <dgm:pt modelId="30">
-          <dgm:prSet phldr="1"/>
-        </dgm:pt>
-        <dgm:pt modelId="31">
-          <dgm:prSet phldr="1"/>
-        </dgm:pt>
-      </dgm:ptLst>
-      <dgm:cxnLst>
-        <dgm:cxn modelId="40" srcId="0" destId="10" srcOrd="0" destOrd="0"/>
-        <dgm:cxn modelId="12" srcId="10" destId="11" srcOrd="0" destOrd="0"/>
-        <dgm:cxn modelId="50" srcId="0" destId="20" srcOrd="1" destOrd="0"/>
-        <dgm:cxn modelId="22" srcId="20" destId="21" srcOrd="0" destOrd="0"/>
-        <dgm:cxn modelId="60" srcId="0" destId="30" srcOrd="1" destOrd="0"/>
-        <dgm:cxn modelId="32" srcId="30" destId="31" srcOrd="0" destOrd="0"/>
-      </dgm:cxnLst>
-      <dgm:bg/>
-      <dgm:whole/>
-    </dgm:dataModel>
-  </dgm:sampData>
-  <dgm:styleData>
-    <dgm:dataModel>
-      <dgm:ptLst>
-        <dgm:pt modelId="0" type="doc"/>
-        <dgm:pt modelId="10">
-          <dgm:prSet phldr="1"/>
-        </dgm:pt>
-        <dgm:pt modelId="20">
-          <dgm:prSet phldr="1"/>
-        </dgm:pt>
-      </dgm:ptLst>
-      <dgm:cxnLst>
-        <dgm:cxn modelId="60" srcId="0" destId="10" srcOrd="0" destOrd="0"/>
-        <dgm:cxn modelId="70" srcId="0" destId="20" srcOrd="1" destOrd="0"/>
-      </dgm:cxnLst>
-      <dgm:bg/>
-      <dgm:whole/>
-    </dgm:dataModel>
-  </dgm:styleData>
-  <dgm:clrData>
-    <dgm:dataModel>
-      <dgm:ptLst>
-        <dgm:pt modelId="0" type="doc"/>
-        <dgm:pt modelId="10">
-          <dgm:prSet phldr="1"/>
-        </dgm:pt>
-        <dgm:pt modelId="20">
-          <dgm:prSet phldr="1"/>
-        </dgm:pt>
-        <dgm:pt modelId="30">
-          <dgm:prSet phldr="1"/>
-        </dgm:pt>
-        <dgm:pt modelId="40">
-          <dgm:prSet phldr="1"/>
-        </dgm:pt>
-      </dgm:ptLst>
-      <dgm:cxnLst>
-        <dgm:cxn modelId="60" srcId="0" destId="10" srcOrd="0" destOrd="0"/>
-        <dgm:cxn modelId="70" srcId="0" destId="20" srcOrd="1" destOrd="0"/>
-        <dgm:cxn modelId="80" srcId="0" destId="30" srcOrd="2" destOrd="0"/>
-        <dgm:cxn modelId="90" srcId="0" destId="40" srcOrd="3" destOrd="0"/>
-      </dgm:cxnLst>
-      <dgm:bg/>
-      <dgm:whole/>
-    </dgm:dataModel>
-  </dgm:clrData>
-  <dgm:layoutNode name="Name0">
-    <dgm:varLst>
-      <dgm:chMax/>
-      <dgm:chPref/>
-      <dgm:animLvl val="lvl"/>
-    </dgm:varLst>
-    <dgm:choose name="Name1">
-      <dgm:if name="Name2" func="var" arg="dir" op="equ" val="norm">
-        <dgm:alg type="lin"/>
-      </dgm:if>
-      <dgm:else name="Name3">
-        <dgm:alg type="lin">
-          <dgm:param type="linDir" val="fromR"/>
-        </dgm:alg>
-      </dgm:else>
-    </dgm:choose>
-    <dgm:shape xmlns:r="http://schemas.openxmlformats.org/officeDocument/2006/relationships" r:blip="">
-      <dgm:adjLst/>
-    </dgm:shape>
-    <dgm:constrLst>
-      <dgm:constr type="primFontSz" for="des" forName="Parent1" val="20"/>
-      <dgm:constr type="primFontSz" for="des" forName="Childtext1" val="20"/>
-      <dgm:constr type="primFontSz" for="des" forName="Childtext1" refType="primFontSz" refFor="des" refForName="Parent1" op="lte"/>
-      <dgm:constr type="w" for="ch" forName="composite" refType="w"/>
-      <dgm:constr type="h" for="ch" forName="composite" refType="h"/>
-      <dgm:constr type="w" for="ch" forName="spaceBetweenRectangles" refType="w" fact="0"/>
-      <dgm:constr type="h" for="ch" forName="spaceBetweenRectangles" refType="h" fact="0"/>
-      <dgm:constr type="primFontSz" for="des" forName="Parent1" op="equ"/>
-      <dgm:constr type="primFontSz" for="des" forName="Childtext1" op="equ"/>
-    </dgm:constrLst>
-    <dgm:forEach name="nodesForEach" axis="ch" ptType="node">
-      <dgm:layoutNode name="composite">
-        <dgm:alg type="composite"/>
-        <dgm:shape xmlns:r="http://schemas.openxmlformats.org/officeDocument/2006/relationships" r:blip="">
-          <dgm:adjLst/>
-        </dgm:shape>
-        <dgm:choose name="casesForSnakingLogic">
-          <dgm:if name="Name7" axis="self" ptType="node" func="posOdd" op="equ" val="1">
-            <dgm:constrLst>
-              <dgm:constr type="w" for="ch" forName="Parent1" refType="w" fact="0.72"/>
-              <dgm:constr type="ctrY" for="ch" forName="Parent1" refType="h" fact="0.5"/>
-              <dgm:constr type="h" for="ch" forName="Parent1" refType="h" fact="0.12"/>
-              <dgm:constr type="l" for="ch" forName="Parent1" refType="w" fact="0.14"/>
-              <dgm:constr type="w" for="ch" forName="Childtext1" refType="w"/>
-              <dgm:constr type="h" for="ch" forName="Childtext1" refType="h" fact="0.32"/>
-              <dgm:constr type="t" for="ch" forName="Childtext1" refType="h" fact="0"/>
-              <dgm:constr type="w" for="ch" forName="ConnectLine"/>
-              <dgm:constr type="h" for="ch" forName="ConnectLine" refType="h" fact="0.1"/>
-              <dgm:constr type="b" for="ch" forName="ConnectLine" refType="t" refFor="ch" refForName="Parent1"/>
-              <dgm:constr type="ctrX" for="ch" forName="ConnectLine" refType="w" fact="0.5"/>
-              <dgm:constr type="w" for="ch" forName="ConnectLineEnd" refType="h" fact="0.02"/>
-              <dgm:constr type="h" for="ch" forName="ConnectLineEnd" refType="h" fact="0.02"/>
-              <dgm:constr type="b" for="ch" forName="ConnectLineEnd" refType="t" refFor="ch" refForName="ConnectLine"/>
-              <dgm:constr type="ctrX" for="ch" forName="ConnectLineEnd" refType="ctrX" refFor="ch" refForName="ConnectLine"/>
-              <dgm:constr type="w" for="ch" forName="EmptyPane" refType="w"/>
-              <dgm:constr type="b" for="ch" forName="EmptyPane" refType="h"/>
-              <dgm:constr type="h" for="ch" forName="EmptyPane" refType="h" fact="0.44"/>
-            </dgm:constrLst>
-          </dgm:if>
-          <dgm:else name="Name8">
-            <dgm:constrLst>
-              <dgm:constr type="w" for="ch" forName="Parent1" refType="w" fact="0.72"/>
-              <dgm:constr type="ctrY" for="ch" forName="Parent1" refType="h" fact="0.5"/>
-              <dgm:constr type="h" for="ch" forName="Parent1" refType="h" fact="0.12"/>
-              <dgm:constr type="l" for="ch" forName="Parent1" refType="w" fact="0.14"/>
-              <dgm:constr type="w" for="ch" forName="Childtext1" refType="w"/>
-              <dgm:constr type="h" for="ch" forName="Childtext1" refType="h" fact="0.32"/>
-              <dgm:constr type="b" for="ch" forName="Childtext1" refType="h"/>
-              <dgm:constr type="w" for="ch" forName="ConnectLine"/>
-              <dgm:constr type="h" for="ch" forName="ConnectLine" refType="h" fact="0.1"/>
-              <dgm:constr type="t" for="ch" forName="ConnectLine" refType="b" refFor="ch" refForName="Parent1"/>
-              <dgm:constr type="ctrX" for="ch" forName="ConnectLine" refType="w" fact="0.5"/>
-              <dgm:constr type="w" for="ch" forName="ConnectLineEnd" refType="h" fact="0.02"/>
-              <dgm:constr type="h" for="ch" forName="ConnectLineEnd" refType="h" fact="0.02"/>
-              <dgm:constr type="t" for="ch" forName="ConnectLineEnd" refType="b" refFor="ch" refForName="ConnectLine"/>
-              <dgm:constr type="ctrX" for="ch" forName="ConnectLineEnd" refType="ctrX" refFor="ch" refForName="ConnectLine"/>
-              <dgm:constr type="w" for="ch" forName="EmptyPane" refType="w"/>
-              <dgm:constr type="h" for="ch" forName="EmptyPane" refType="h" fact="0.44"/>
-            </dgm:constrLst>
-          </dgm:else>
-        </dgm:choose>
-        <dgm:layoutNode name="Parent1" styleLbl="alignNode1">
-          <dgm:varLst>
-            <dgm:chMax val="1"/>
-            <dgm:chPref val="1"/>
-            <dgm:bulletEnabled val="1"/>
-          </dgm:varLst>
-          <dgm:alg type="tx"/>
-          <dgm:choose name="casesForFirstAndLastNode">
-            <dgm:if name="startNode" axis="self" ptType="node" func="pos" op="equ" val="1">
-              <dgm:choose name="removeLineWhenOnlyOneNode">
-                <dgm:if name="ifOnlyOneNode" axis="followSib" ptType="node" func="cnt" op="equ" val="0">
-                  <dgm:shape xmlns:r="http://schemas.openxmlformats.org/officeDocument/2006/relationships" type="rect" r:blip="">
-                    <dgm:adjLst/>
-                  </dgm:shape>
-                </dgm:if>
-                <dgm:else name="ifMoreThanOneNode">
-                  <dgm:choose name="Name18">
-                    <dgm:if name="Name19" func="var" arg="dir" op="equ" val="norm">
-                      <dgm:shape xmlns:r="http://schemas.openxmlformats.org/officeDocument/2006/relationships" type="homePlate" r:blip="">
-                        <dgm:adjLst>
-                          <dgm:adj idx="1" val="0.4"/>
-                        </dgm:adjLst>
-                      </dgm:shape>
-                    </dgm:if>
-                    <dgm:else name="Name20">
-                      <dgm:shape xmlns:r="http://schemas.openxmlformats.org/officeDocument/2006/relationships" rot="180" type="homePlate" r:blip="">
-                        <dgm:adjLst>
-                          <dgm:adj idx="1" val="0.4"/>
-                        </dgm:adjLst>
-                      </dgm:shape>
-                    </dgm:else>
-                  </dgm:choose>
-                </dgm:else>
-              </dgm:choose>
-            </dgm:if>
-            <dgm:else name="notStartNode">
-              <dgm:choose name="Name22">
-                <dgm:if name="Name23" axis="self" ptType="node" func="revPos" op="equ" val="1">
-                  <dgm:choose name="Name24">
-                    <dgm:if name="Name25" func="var" arg="dir" op="equ" val="norm">
-                      <dgm:shape xmlns:r="http://schemas.openxmlformats.org/officeDocument/2006/relationships" rot="180" type="homePlate" r:blip="">
-                        <dgm:adjLst>
-                          <dgm:adj idx="1" val="0.4"/>
-                        </dgm:adjLst>
-                      </dgm:shape>
-                    </dgm:if>
-                    <dgm:else name="Name26">
-                      <dgm:shape xmlns:r="http://schemas.openxmlformats.org/officeDocument/2006/relationships" type="homePlate" r:blip="">
-                        <dgm:adjLst>
-                          <dgm:adj idx="1" val="0.4"/>
-                        </dgm:adjLst>
-                      </dgm:shape>
-                    </dgm:else>
-                  </dgm:choose>
-                </dgm:if>
-                <dgm:else name="Name27">
-                  <dgm:shape xmlns:r="http://schemas.openxmlformats.org/officeDocument/2006/relationships" type="hexagon" r:blip="">
-                    <dgm:adjLst>
-                      <dgm:adj idx="1" val="0.4"/>
-                    </dgm:adjLst>
-                  </dgm:shape>
-                </dgm:else>
-              </dgm:choose>
-            </dgm:else>
-          </dgm:choose>
-          <dgm:presOf axis="self" ptType="node"/>
-          <dgm:constrLst>
-            <dgm:constr type="lMarg" refType="primFontSz" fact="0.6"/>
-            <dgm:constr type="rMarg" refType="primFontSz" fact="0.6"/>
-            <dgm:constr type="tMarg" refType="primFontSz" fact="0.6"/>
-            <dgm:constr type="bMarg" refType="primFontSz" fact="0.6"/>
-          </dgm:constrLst>
-          <dgm:ruleLst>
-            <dgm:rule type="primFontSz" val="11" fact="NaN" max="NaN"/>
-          </dgm:ruleLst>
-        </dgm:layoutNode>
-        <dgm:layoutNode name="Childtext1" styleLbl="revTx" moveWith="Parent1">
-          <dgm:varLst>
-            <dgm:chMax val="0"/>
-            <dgm:chPref val="0"/>
-            <dgm:bulletEnabled/>
-          </dgm:varLst>
-          <dgm:choose name="casesForTxtDirLogic1">
-            <dgm:if name="Name77" axis="self" ptType="node" func="posOdd" op="equ" val="1">
-              <dgm:alg type="tx">
-                <dgm:param type="txAnchorVert" val="b"/>
-                <dgm:param type="txAnchorHorz" val="ctr"/>
-                <dgm:param type="parTxRTLAlign" val="ctr"/>
-                <dgm:param type="parTxLTRAlign" val="ctr"/>
-              </dgm:alg>
-            </dgm:if>
-            <dgm:else name="Name88">
-              <dgm:alg type="tx">
-                <dgm:param type="txAnchorVert" val="t"/>
-                <dgm:param type="txAnchorHorz" val="ctr"/>
-                <dgm:param type="parTxRTLAlign" val="ctr"/>
-                <dgm:param type="parTxLTRAlign" val="ctr"/>
-              </dgm:alg>
-            </dgm:else>
-          </dgm:choose>
-          <dgm:shape xmlns:r="http://schemas.openxmlformats.org/officeDocument/2006/relationships" type="rect" r:blip="">
-            <dgm:adjLst/>
-          </dgm:shape>
-          <dgm:constrLst>
-            <dgm:constr type="lMarg"/>
-            <dgm:constr type="rMarg"/>
-            <dgm:constr type="tMarg" refType="primFontSz" fact="0.7"/>
-            <dgm:constr type="bMarg" refType="primFontSz" fact="0.7"/>
-          </dgm:constrLst>
-          <dgm:presOf axis="ch" ptType="node"/>
-          <dgm:ruleLst>
-            <dgm:rule type="primFontSz" val="11" fact="NaN" max="NaN"/>
-          </dgm:ruleLst>
-        </dgm:layoutNode>
-        <dgm:layoutNode name="ConnectLine" styleLbl="sibTrans1D1" moveWith="Parent1">
-          <dgm:alg type="sp"/>
-          <dgm:shape xmlns:r="http://schemas.openxmlformats.org/officeDocument/2006/relationships" type="line" r:blip="">
-            <dgm:adjLst/>
-            <dgm:extLst>
-              <a:ext uri="{B698B0E9-8C71-41B9-8309-B3DCBF30829C}">
-                <dgm1612:spPr xmlns:dgm1612="http://schemas.microsoft.com/office/drawing/2016/12/diagram">
-                  <a:ln w="12700">
-                    <a:prstDash val="dash"/>
-                  </a:ln>
-                </dgm1612:spPr>
-              </a:ext>
-            </dgm:extLst>
-          </dgm:shape>
-          <dgm:presOf/>
-          <dgm:constrLst/>
-        </dgm:layoutNode>
-        <dgm:layoutNode name="ConnectLineEnd" styleLbl="node1" moveWith="Parent1">
-          <dgm:alg type="sp"/>
-          <dgm:shape xmlns:r="http://schemas.openxmlformats.org/officeDocument/2006/relationships" type="rect" r:blip="">
-            <dgm:adjLst/>
-          </dgm:shape>
-          <dgm:presOf/>
-          <dgm:constrLst/>
-        </dgm:layoutNode>
-        <dgm:layoutNode name="EmptyPane" moveWith="Parent1">
-          <dgm:alg type="sp"/>
-          <dgm:shape xmlns:r="http://schemas.openxmlformats.org/officeDocument/2006/relationships" r:blip="">
-            <dgm:adjLst/>
-          </dgm:shape>
-          <dgm:presOf/>
-          <dgm:constrLst/>
-        </dgm:layoutNode>
-      </dgm:layoutNode>
-      <dgm:forEach name="Name28" axis="followSib" ptType="sibTrans" cnt="1">
-        <dgm:layoutNode name="spaceBetweenRectangles" styleLbl="fgAcc1">
-          <dgm:alg type="conn">
-            <dgm:param type="dim" val="1D"/>
-            <dgm:param type="srcNode" val="Parent1"/>
-            <dgm:param type="dstNode" val="Parent1"/>
-            <dgm:param type="begPts" val="midR"/>
-            <dgm:param type="endPts" val="midL"/>
-            <dgm:param type="endSty" val="noArr"/>
-          </dgm:alg>
-          <dgm:shape xmlns:r="http://schemas.openxmlformats.org/officeDocument/2006/relationships" type="conn" r:blip="" zOrderOff="-2">
-            <dgm:adjLst/>
-          </dgm:shape>
-          <dgm:presOf/>
-          <dgm:constrLst>
-            <dgm:constr type="connDist"/>
-            <dgm:constr type="begPad"/>
-            <dgm:constr type="endPad"/>
-          </dgm:constrLst>
-          <dgm:ruleLst/>
-        </dgm:layoutNode>
-      </dgm:forEach>
-    </dgm:forEach>
-  </dgm:layoutNode>
-</dgm:layoutDef>
-</file>
-
-<file path=ppt/diagrams/quickStyle1.xml><?xml version="1.0" encoding="utf-8"?>
-<dgm:styleDef xmlns:dgm="http://schemas.openxmlformats.org/drawingml/2006/diagram" xmlns:a="http://schemas.openxmlformats.org/drawingml/2006/main" uniqueId="urn:microsoft.com/office/officeart/2005/8/quickstyle/simple2">
-  <dgm:title val=""/>
-  <dgm:desc val=""/>
-  <dgm:catLst>
-    <dgm:cat type="simple" pri="10200"/>
-  </dgm:catLst>
-  <dgm:scene3d>
-    <a:camera prst="orthographicFront"/>
-    <a:lightRig rig="threePt" dir="t"/>
-  </dgm:scene3d>
-  <dgm:styleLbl name="node0">
-    <dgm:scene3d>
-      <a:camera prst="orthographicFront"/>
-      <a:lightRig rig="threePt" dir="t"/>
-    </dgm:scene3d>
-    <dgm:sp3d/>
-    <dgm:txPr/>
-    <dgm:style>
-      <a:lnRef idx="3">
-        <a:scrgbClr r="0" g="0" b="0"/>
-      </a:lnRef>
-      <a:fillRef idx="1">
-        <a:scrgbClr r="0" g="0" b="0"/>
-      </a:fillRef>
-      <a:effectRef idx="1">
-        <a:scrgbClr r="0" g="0" b="0"/>
-      </a:effectRef>
-      <a:fontRef idx="minor">
-        <a:schemeClr val="lt1"/>
-      </a:fontRef>
-    </dgm:style>
-  </dgm:styleLbl>
-  <dgm:styleLbl name="lnNode1">
-    <dgm:scene3d>
-      <a:camera prst="orthographicFront"/>
-      <a:lightRig rig="threePt" dir="t"/>
-    </dgm:scene3d>
-    <dgm:sp3d/>
-    <dgm:txPr/>
-    <dgm:style>
-      <a:lnRef idx="3">
-        <a:scrgbClr r="0" g="0" b="0"/>
-      </a:lnRef>
-      <a:fillRef idx="1">
-        <a:scrgbClr r="0" g="0" b="0"/>
-      </a:fillRef>
-      <a:effectRef idx="1">
-        <a:scrgbClr r="0" g="0" b="0"/>
-      </a:effectRef>
-      <a:fontRef idx="minor">
-        <a:schemeClr val="lt1"/>
-      </a:fontRef>
-    </dgm:style>
-  </dgm:styleLbl>
-  <dgm:styleLbl name="vennNode1">
-    <dgm:scene3d>
-      <a:camera prst="orthographicFront"/>
-      <a:lightRig rig="threePt" dir="t"/>
-    </dgm:scene3d>
-    <dgm:sp3d/>
-    <dgm:txPr/>
-    <dgm:style>
-      <a:lnRef idx="3">
-        <a:scrgbClr r="0" g="0" b="0"/>
-      </a:lnRef>
-      <a:fillRef idx="1">
-        <a:scrgbClr r="0" g="0" b="0"/>
-      </a:fillRef>
-      <a:effectRef idx="0">
-        <a:scrgbClr r="0" g="0" b="0"/>
-      </a:effectRef>
-      <a:fontRef idx="minor">
-        <a:schemeClr val="tx1"/>
-      </a:fontRef>
-    </dgm:style>
-  </dgm:styleLbl>
-  <dgm:styleLbl name="alignNode1">
-    <dgm:scene3d>
-      <a:camera prst="orthographicFront"/>
-      <a:lightRig rig="threePt" dir="t"/>
-    </dgm:scene3d>
-    <dgm:sp3d/>
-    <dgm:txPr/>
-    <dgm:style>
-      <a:lnRef idx="2">
-        <a:scrgbClr r="0" g="0" b="0"/>
-      </a:lnRef>
-      <a:fillRef idx="1">
-        <a:scrgbClr r="0" g="0" b="0"/>
-      </a:fillRef>
-      <a:effectRef idx="1">
-        <a:scrgbClr r="0" g="0" b="0"/>
-      </a:effectRef>
-      <a:fontRef idx="minor">
-        <a:schemeClr val="lt1"/>
-      </a:fontRef>
-    </dgm:style>
-  </dgm:styleLbl>
-  <dgm:styleLbl name="node1">
-    <dgm:scene3d>
-      <a:camera prst="orthographicFront"/>
-      <a:lightRig rig="threePt" dir="t"/>
-    </dgm:scene3d>
-    <dgm:sp3d/>
-    <dgm:txPr/>
-    <dgm:style>
-      <a:lnRef idx="3">
-        <a:scrgbClr r="0" g="0" b="0"/>
-      </a:lnRef>
-      <a:fillRef idx="1">
-        <a:scrgbClr r="0" g="0" b="0"/>
-      </a:fillRef>
-      <a:effectRef idx="1">
-        <a:scrgbClr r="0" g="0" b="0"/>
-      </a:effectRef>
-      <a:fontRef idx="minor">
-        <a:schemeClr val="lt1"/>
-      </a:fontRef>
-    </dgm:style>
-  </dgm:styleLbl>
-  <dgm:styleLbl name="node2">
-    <dgm:scene3d>
-      <a:camera prst="orthographicFront"/>
-      <a:lightRig rig="threePt" dir="t"/>
-    </dgm:scene3d>
-    <dgm:sp3d/>
-    <dgm:txPr/>
-    <dgm:style>
-      <a:lnRef idx="3">
-        <a:scrgbClr r="0" g="0" b="0"/>
-      </a:lnRef>
-      <a:fillRef idx="1">
-        <a:scrgbClr r="0" g="0" b="0"/>
-      </a:fillRef>
-      <a:effectRef idx="1">
-        <a:scrgbClr r="0" g="0" b="0"/>
-      </a:effectRef>
-      <a:fontRef idx="minor">
-        <a:schemeClr val="lt1"/>
-      </a:fontRef>
-    </dgm:style>
-  </dgm:styleLbl>
-  <dgm:styleLbl name="node3">
-    <dgm:scene3d>
-      <a:camera prst="orthographicFront"/>
-      <a:lightRig rig="threePt" dir="t"/>
-    </dgm:scene3d>
-    <dgm:sp3d/>
-    <dgm:txPr/>
-    <dgm:style>
-      <a:lnRef idx="3">
-        <a:scrgbClr r="0" g="0" b="0"/>
-      </a:lnRef>
-      <a:fillRef idx="1">
-        <a:scrgbClr r="0" g="0" b="0"/>
-      </a:fillRef>
-      <a:effectRef idx="1">
-        <a:scrgbClr r="0" g="0" b="0"/>
-      </a:effectRef>
-      <a:fontRef idx="minor">
-        <a:schemeClr val="lt1"/>
-      </a:fontRef>
-    </dgm:style>
-  </dgm:styleLbl>
-  <dgm:styleLbl name="node4">
-    <dgm:scene3d>
-      <a:camera prst="orthographicFront"/>
-      <a:lightRig rig="threePt" dir="t"/>
-    </dgm:scene3d>
-    <dgm:sp3d/>
-    <dgm:txPr/>
-    <dgm:style>
-      <a:lnRef idx="3">
-        <a:scrgbClr r="0" g="0" b="0"/>
-      </a:lnRef>
-      <a:fillRef idx="1">
-        <a:scrgbClr r="0" g="0" b="0"/>
-      </a:fillRef>
-      <a:effectRef idx="1">
-        <a:scrgbClr r="0" g="0" b="0"/>
-      </a:effectRef>
-      <a:fontRef idx="minor">
-        <a:schemeClr val="lt1"/>
-      </a:fontRef>
-    </dgm:style>
-  </dgm:styleLbl>
-  <dgm:styleLbl name="fgImgPlace1">
-    <dgm:scene3d>
-      <a:camera prst="orthographicFront"/>
-      <a:lightRig rig="threePt" dir="t"/>
-    </dgm:scene3d>
-    <dgm:sp3d/>
-    <dgm:txPr/>
-    <dgm:style>
-      <a:lnRef idx="3">
-        <a:scrgbClr r="0" g="0" b="0"/>
-      </a:lnRef>
-      <a:fillRef idx="1">
-        <a:scrgbClr r="0" g="0" b="0"/>
-      </a:fillRef>
-      <a:effectRef idx="1">
-        <a:scrgbClr r="0" g="0" b="0"/>
-      </a:effectRef>
-      <a:fontRef idx="minor"/>
-    </dgm:style>
-  </dgm:styleLbl>
-  <dgm:styleLbl name="alignImgPlace1">
-    <dgm:scene3d>
-      <a:camera prst="orthographicFront"/>
-      <a:lightRig rig="threePt" dir="t"/>
-    </dgm:scene3d>
-    <dgm:sp3d/>
-    <dgm:txPr/>
-    <dgm:style>
-      <a:lnRef idx="3">
-        <a:scrgbClr r="0" g="0" b="0"/>
-      </a:lnRef>
-      <a:fillRef idx="1">
-        <a:scrgbClr r="0" g="0" b="0"/>
-      </a:fillRef>
-      <a:effectRef idx="1">
-        <a:scrgbClr r="0" g="0" b="0"/>
-      </a:effectRef>
-      <a:fontRef idx="minor"/>
-    </dgm:style>
-  </dgm:styleLbl>
-  <dgm:styleLbl name="bgImgPlace1">
-    <dgm:scene3d>
-      <a:camera prst="orthographicFront"/>
-      <a:lightRig rig="threePt" dir="t"/>
-    </dgm:scene3d>
-    <dgm:sp3d/>
-    <dgm:txPr/>
-    <dgm:style>
-      <a:lnRef idx="3">
-        <a:scrgbClr r="0" g="0" b="0"/>
-      </a:lnRef>
-      <a:fillRef idx="1">
-        <a:scrgbClr r="0" g="0" b="0"/>
-      </a:fillRef>
-      <a:effectRef idx="1">
-        <a:scrgbClr r="0" g="0" b="0"/>
-      </a:effectRef>
-      <a:fontRef idx="minor"/>
-    </dgm:style>
-  </dgm:styleLbl>
-  <dgm:styleLbl name="sibTrans2D1">
-    <dgm:scene3d>
-      <a:camera prst="orthographicFront"/>
-      <a:lightRig rig="threePt" dir="t"/>
-    </dgm:scene3d>
-    <dgm:sp3d/>
-    <dgm:txPr/>
-    <dgm:style>
-      <a:lnRef idx="0">
-        <a:scrgbClr r="0" g="0" b="0"/>
-      </a:lnRef>
-      <a:fillRef idx="1">
-        <a:scrgbClr r="0" g="0" b="0"/>
-      </a:fillRef>
-      <a:effectRef idx="1">
-        <a:scrgbClr r="0" g="0" b="0"/>
-      </a:effectRef>
-      <a:fontRef idx="minor">
-        <a:schemeClr val="lt1"/>
-      </a:fontRef>
-    </dgm:style>
-  </dgm:styleLbl>
-  <dgm:styleLbl name="fgSibTrans2D1">
-    <dgm:scene3d>
-      <a:camera prst="orthographicFront"/>
-      <a:lightRig rig="threePt" dir="t"/>
-    </dgm:scene3d>
-    <dgm:sp3d/>
-    <dgm:txPr/>
-    <dgm:style>
-      <a:lnRef idx="0">
-        <a:scrgbClr r="0" g="0" b="0"/>
-      </a:lnRef>
-      <a:fillRef idx="1">
-        <a:scrgbClr r="0" g="0" b="0"/>
-      </a:fillRef>
-      <a:effectRef idx="1">
-        <a:scrgbClr r="0" g="0" b="0"/>
-      </a:effectRef>
-      <a:fontRef idx="minor">
-        <a:schemeClr val="lt1"/>
-      </a:fontRef>
-    </dgm:style>
-  </dgm:styleLbl>
-  <dgm:styleLbl name="bgSibTrans2D1">
-    <dgm:scene3d>
-      <a:camera prst="orthographicFront"/>
-      <a:lightRig rig="threePt" dir="t"/>
-    </dgm:scene3d>
-    <dgm:sp3d/>
-    <dgm:txPr/>
-    <dgm:style>
-      <a:lnRef idx="0">
-        <a:scrgbClr r="0" g="0" b="0"/>
-      </a:lnRef>
-      <a:fillRef idx="1">
-        <a:scrgbClr r="0" g="0" b="0"/>
-      </a:fillRef>
-      <a:effectRef idx="1">
-        <a:scrgbClr r="0" g="0" b="0"/>
-      </a:effectRef>
-      <a:fontRef idx="minor">
-        <a:schemeClr val="lt1"/>
-      </a:fontRef>
-    </dgm:style>
-  </dgm:styleLbl>
-  <dgm:styleLbl name="sibTrans1D1">
-    <dgm:scene3d>
-      <a:camera prst="orthographicFront"/>
-      <a:lightRig rig="threePt" dir="t"/>
-    </dgm:scene3d>
-    <dgm:sp3d/>
-    <dgm:txPr/>
-    <dgm:style>
-      <a:lnRef idx="1">
-        <a:scrgbClr r="0" g="0" b="0"/>
-      </a:lnRef>
-      <a:fillRef idx="0">
-        <a:scrgbClr r="0" g="0" b="0"/>
-      </a:fillRef>
-      <a:effectRef idx="0">
-        <a:scrgbClr r="0" g="0" b="0"/>
-      </a:effectRef>
-      <a:fontRef idx="minor"/>
-    </dgm:style>
-  </dgm:styleLbl>
-  <dgm:styleLbl name="callout">
-    <dgm:scene3d>
-      <a:camera prst="orthographicFront"/>
-      <a:lightRig rig="threePt" dir="t"/>
-    </dgm:scene3d>
-    <dgm:sp3d/>
-    <dgm:txPr/>
-    <dgm:style>
-      <a:lnRef idx="2">
-        <a:scrgbClr r="0" g="0" b="0"/>
-      </a:lnRef>
-      <a:fillRef idx="1">
-        <a:scrgbClr r="0" g="0" b="0"/>
-      </a:fillRef>
-      <a:effectRef idx="1">
-        <a:scrgbClr r="0" g="0" b="0"/>
-      </a:effectRef>
-      <a:fontRef idx="minor"/>
-    </dgm:style>
-  </dgm:styleLbl>
-  <dgm:styleLbl name="asst0">
-    <dgm:scene3d>
-      <a:camera prst="orthographicFront"/>
-      <a:lightRig rig="threePt" dir="t"/>
-    </dgm:scene3d>
-    <dgm:sp3d/>
-    <dgm:txPr/>
-    <dgm:style>
-      <a:lnRef idx="3">
-        <a:scrgbClr r="0" g="0" b="0"/>
-      </a:lnRef>
-      <a:fillRef idx="1">
-        <a:scrgbClr r="0" g="0" b="0"/>
-      </a:fillRef>
-      <a:effectRef idx="1">
-        <a:scrgbClr r="0" g="0" b="0"/>
-      </a:effectRef>
-      <a:fontRef idx="minor">
-        <a:schemeClr val="lt1"/>
-      </a:fontRef>
-    </dgm:style>
-  </dgm:styleLbl>
-  <dgm:styleLbl name="asst1">
-    <dgm:scene3d>
-      <a:camera prst="orthographicFront"/>
-      <a:lightRig rig="threePt" dir="t"/>
-    </dgm:scene3d>
-    <dgm:sp3d/>
-    <dgm:txPr/>
-    <dgm:style>
-      <a:lnRef idx="3">
-        <a:scrgbClr r="0" g="0" b="0"/>
-      </a:lnRef>
-      <a:fillRef idx="1">
-        <a:scrgbClr r="0" g="0" b="0"/>
-      </a:fillRef>
-      <a:effectRef idx="1">
-        <a:scrgbClr r="0" g="0" b="0"/>
-      </a:effectRef>
-      <a:fontRef idx="minor">
-        <a:schemeClr val="lt1"/>
-      </a:fontRef>
-    </dgm:style>
-  </dgm:styleLbl>
-  <dgm:styleLbl name="asst2">
-    <dgm:scene3d>
-      <a:camera prst="orthographicFront"/>
-      <a:lightRig rig="threePt" dir="t"/>
-    </dgm:scene3d>
-    <dgm:sp3d/>
-    <dgm:txPr/>
-    <dgm:style>
-      <a:lnRef idx="3">
-        <a:scrgbClr r="0" g="0" b="0"/>
-      </a:lnRef>
-      <a:fillRef idx="1">
-        <a:scrgbClr r="0" g="0" b="0"/>
-      </a:fillRef>
-      <a:effectRef idx="1">
-        <a:scrgbClr r="0" g="0" b="0"/>
-      </a:effectRef>
-      <a:fontRef idx="minor">
-        <a:schemeClr val="lt1"/>
-      </a:fontRef>
-    </dgm:style>
-  </dgm:styleLbl>
-  <dgm:styleLbl name="asst3">
-    <dgm:scene3d>
-      <a:camera prst="orthographicFront"/>
-      <a:lightRig rig="threePt" dir="t"/>
-    </dgm:scene3d>
-    <dgm:sp3d/>
-    <dgm:txPr/>
-    <dgm:style>
-      <a:lnRef idx="3">
-        <a:scrgbClr r="0" g="0" b="0"/>
-      </a:lnRef>
-      <a:fillRef idx="1">
-        <a:scrgbClr r="0" g="0" b="0"/>
-      </a:fillRef>
-      <a:effectRef idx="1">
-        <a:scrgbClr r="0" g="0" b="0"/>
-      </a:effectRef>
-      <a:fontRef idx="minor">
-        <a:schemeClr val="lt1"/>
-      </a:fontRef>
-    </dgm:style>
-  </dgm:styleLbl>
-  <dgm:styleLbl name="asst4">
-    <dgm:scene3d>
-      <a:camera prst="orthographicFront"/>
-      <a:lightRig rig="threePt" dir="t"/>
-    </dgm:scene3d>
-    <dgm:sp3d/>
-    <dgm:txPr/>
-    <dgm:style>
-      <a:lnRef idx="3">
-        <a:scrgbClr r="0" g="0" b="0"/>
-      </a:lnRef>
-      <a:fillRef idx="1">
-        <a:scrgbClr r="0" g="0" b="0"/>
-      </a:fillRef>
-      <a:effectRef idx="1">
-        <a:scrgbClr r="0" g="0" b="0"/>
-      </a:effectRef>
-      <a:fontRef idx="minor">
-        <a:schemeClr val="lt1"/>
-      </a:fontRef>
-    </dgm:style>
-  </dgm:styleLbl>
-  <dgm:styleLbl name="parChTrans2D1">
-    <dgm:scene3d>
-      <a:camera prst="orthographicFront"/>
-      <a:lightRig rig="threePt" dir="t"/>
-    </dgm:scene3d>
-    <dgm:sp3d/>
-    <dgm:txPr/>
-    <dgm:style>
-      <a:lnRef idx="3">
-        <a:scrgbClr r="0" g="0" b="0"/>
-      </a:lnRef>
-      <a:fillRef idx="1">
-        <a:scrgbClr r="0" g="0" b="0"/>
-      </a:fillRef>
-      <a:effectRef idx="1">
-        <a:scrgbClr r="0" g="0" b="0"/>
-      </a:effectRef>
-      <a:fontRef idx="minor">
-        <a:schemeClr val="lt1"/>
-      </a:fontRef>
-    </dgm:style>
-  </dgm:styleLbl>
-  <dgm:styleLbl name="parChTrans2D2">
-    <dgm:scene3d>
-      <a:camera prst="orthographicFront"/>
-      <a:lightRig rig="threePt" dir="t"/>
-    </dgm:scene3d>
-    <dgm:sp3d/>
-    <dgm:txPr/>
-    <dgm:style>
-      <a:lnRef idx="3">
-        <a:scrgbClr r="0" g="0" b="0"/>
-      </a:lnRef>
-      <a:fillRef idx="1">
-        <a:scrgbClr r="0" g="0" b="0"/>
-      </a:fillRef>
-      <a:effectRef idx="1">
-        <a:scrgbClr r="0" g="0" b="0"/>
-      </a:effectRef>
-      <a:fontRef idx="minor">
-        <a:schemeClr val="lt1"/>
-      </a:fontRef>
-    </dgm:style>
-  </dgm:styleLbl>
-  <dgm:styleLbl name="parChTrans2D3">
-    <dgm:scene3d>
-      <a:camera prst="orthographicFront"/>
-      <a:lightRig rig="threePt" dir="t"/>
-    </dgm:scene3d>
-    <dgm:sp3d/>
-    <dgm:txPr/>
-    <dgm:style>
-      <a:lnRef idx="3">
-        <a:scrgbClr r="0" g="0" b="0"/>
-      </a:lnRef>
-      <a:fillRef idx="1">
-        <a:scrgbClr r="0" g="0" b="0"/>
-      </a:fillRef>
-      <a:effectRef idx="1">
-        <a:scrgbClr r="0" g="0" b="0"/>
-      </a:effectRef>
-      <a:fontRef idx="minor">
-        <a:schemeClr val="lt1"/>
-      </a:fontRef>
-    </dgm:style>
-  </dgm:styleLbl>
-  <dgm:styleLbl name="parChTrans2D4">
-    <dgm:scene3d>
-      <a:camera prst="orthographicFront"/>
-      <a:lightRig rig="threePt" dir="t"/>
-    </dgm:scene3d>
-    <dgm:sp3d/>
-    <dgm:txPr/>
-    <dgm:style>
-      <a:lnRef idx="3">
-        <a:scrgbClr r="0" g="0" b="0"/>
-      </a:lnRef>
-      <a:fillRef idx="1">
-        <a:scrgbClr r="0" g="0" b="0"/>
-      </a:fillRef>
-      <a:effectRef idx="1">
-        <a:scrgbClr r="0" g="0" b="0"/>
-      </a:effectRef>
-      <a:fontRef idx="minor">
-        <a:schemeClr val="lt1"/>
-      </a:fontRef>
-    </dgm:style>
-  </dgm:styleLbl>
-  <dgm:styleLbl name="parChTrans1D1">
-    <dgm:scene3d>
-      <a:camera prst="orthographicFront"/>
-      <a:lightRig rig="threePt" dir="t"/>
-    </dgm:scene3d>
-    <dgm:sp3d/>
-    <dgm:txPr/>
-    <dgm:style>
-      <a:lnRef idx="2">
-        <a:scrgbClr r="0" g="0" b="0"/>
-      </a:lnRef>
-      <a:fillRef idx="0">
-        <a:scrgbClr r="0" g="0" b="0"/>
-      </a:fillRef>
-      <a:effectRef idx="0">
-        <a:scrgbClr r="0" g="0" b="0"/>
-      </a:effectRef>
-      <a:fontRef idx="minor"/>
-    </dgm:style>
-  </dgm:styleLbl>
-  <dgm:styleLbl name="parChTrans1D2">
-    <dgm:scene3d>
-      <a:camera prst="orthographicFront"/>
-      <a:lightRig rig="threePt" dir="t"/>
-    </dgm:scene3d>
-    <dgm:sp3d/>
-    <dgm:txPr/>
-    <dgm:style>
-      <a:lnRef idx="2">
-        <a:scrgbClr r="0" g="0" b="0"/>
-      </a:lnRef>
-      <a:fillRef idx="0">
-        <a:scrgbClr r="0" g="0" b="0"/>
-      </a:fillRef>
-      <a:effectRef idx="0">
-        <a:scrgbClr r="0" g="0" b="0"/>
-      </a:effectRef>
-      <a:fontRef idx="minor"/>
-    </dgm:style>
-  </dgm:styleLbl>
-  <dgm:styleLbl name="parChTrans1D3">
-    <dgm:scene3d>
-      <a:camera prst="orthographicFront"/>
-      <a:lightRig rig="threePt" dir="t"/>
-    </dgm:scene3d>
-    <dgm:sp3d/>
-    <dgm:txPr/>
-    <dgm:style>
-      <a:lnRef idx="2">
-        <a:scrgbClr r="0" g="0" b="0"/>
-      </a:lnRef>
-      <a:fillRef idx="0">
-        <a:scrgbClr r="0" g="0" b="0"/>
-      </a:fillRef>
-      <a:effectRef idx="0">
-        <a:scrgbClr r="0" g="0" b="0"/>
-      </a:effectRef>
-      <a:fontRef idx="minor"/>
-    </dgm:style>
-  </dgm:styleLbl>
-  <dgm:styleLbl name="parChTrans1D4">
-    <dgm:scene3d>
-      <a:camera prst="orthographicFront"/>
-      <a:lightRig rig="threePt" dir="t"/>
-    </dgm:scene3d>
-    <dgm:sp3d/>
-    <dgm:txPr/>
-    <dgm:style>
-      <a:lnRef idx="2">
-        <a:scrgbClr r="0" g="0" b="0"/>
-      </a:lnRef>
-      <a:fillRef idx="0">
-        <a:scrgbClr r="0" g="0" b="0"/>
-      </a:fillRef>
-      <a:effectRef idx="0">
-        <a:scrgbClr r="0" g="0" b="0"/>
-      </a:effectRef>
-      <a:fontRef idx="minor"/>
-    </dgm:style>
-  </dgm:styleLbl>
-  <dgm:styleLbl name="fgAcc1">
-    <dgm:scene3d>
-      <a:camera prst="orthographicFront"/>
-      <a:lightRig rig="threePt" dir="t"/>
-    </dgm:scene3d>
-    <dgm:sp3d/>
-    <dgm:txPr/>
-    <dgm:style>
-      <a:lnRef idx="2">
-        <a:scrgbClr r="0" g="0" b="0"/>
-      </a:lnRef>
-      <a:fillRef idx="1">
-        <a:scrgbClr r="0" g="0" b="0"/>
-      </a:fillRef>
-      <a:effectRef idx="0">
-        <a:scrgbClr r="0" g="0" b="0"/>
-      </a:effectRef>
-      <a:fontRef idx="minor"/>
-    </dgm:style>
-  </dgm:styleLbl>
-  <dgm:styleLbl name="conFgAcc1">
-    <dgm:scene3d>
-      <a:camera prst="orthographicFront"/>
-      <a:lightRig rig="threePt" dir="t"/>
-    </dgm:scene3d>
-    <dgm:sp3d/>
-    <dgm:txPr/>
-    <dgm:style>
-      <a:lnRef idx="2">
-        <a:scrgbClr r="0" g="0" b="0"/>
-      </a:lnRef>
-      <a:fillRef idx="1">
-        <a:scrgbClr r="0" g="0" b="0"/>
-      </a:fillRef>
-      <a:effectRef idx="0">
-        <a:scrgbClr r="0" g="0" b="0"/>
-      </a:effectRef>
-      <a:fontRef idx="minor"/>
-    </dgm:style>
-  </dgm:styleLbl>
-  <dgm:styleLbl name="alignAcc1">
-    <dgm:scene3d>
-      <a:camera prst="orthographicFront"/>
-      <a:lightRig rig="threePt" dir="t"/>
-    </dgm:scene3d>
-    <dgm:sp3d/>
-    <dgm:txPr/>
-    <dgm:style>
-      <a:lnRef idx="2">
-        <a:scrgbClr r="0" g="0" b="0"/>
-      </a:lnRef>
-      <a:fillRef idx="1">
-        <a:scrgbClr r="0" g="0" b="0"/>
-      </a:fillRef>
-      <a:effectRef idx="0">
-        <a:scrgbClr r="0" g="0" b="0"/>
-      </a:effectRef>
-      <a:fontRef idx="minor"/>
-    </dgm:style>
-  </dgm:styleLbl>
-  <dgm:styleLbl name="trAlignAcc1">
-    <dgm:scene3d>
-      <a:camera prst="orthographicFront"/>
-      <a:lightRig rig="threePt" dir="t"/>
-    </dgm:scene3d>
-    <dgm:sp3d/>
-    <dgm:txPr/>
-    <dgm:style>
-      <a:lnRef idx="1">
-        <a:scrgbClr r="0" g="0" b="0"/>
-      </a:lnRef>
-      <a:fillRef idx="1">
-        <a:scrgbClr r="0" g="0" b="0"/>
-      </a:fillRef>
-      <a:effectRef idx="0">
-        <a:scrgbClr r="0" g="0" b="0"/>
-      </a:effectRef>
-      <a:fontRef idx="minor"/>
-    </dgm:style>
-  </dgm:styleLbl>
-  <dgm:styleLbl name="bgAcc1">
-    <dgm:scene3d>
-      <a:camera prst="orthographicFront"/>
-      <a:lightRig rig="threePt" dir="t"/>
-    </dgm:scene3d>
-    <dgm:sp3d/>
-    <dgm:txPr/>
-    <dgm:style>
-      <a:lnRef idx="2">
-        <a:scrgbClr r="0" g="0" b="0"/>
-      </a:lnRef>
-      <a:fillRef idx="1">
-        <a:scrgbClr r="0" g="0" b="0"/>
-      </a:fillRef>
-      <a:effectRef idx="0">
-        <a:scrgbClr r="0" g="0" b="0"/>
-      </a:effectRef>
-      <a:fontRef idx="minor"/>
-    </dgm:style>
-  </dgm:styleLbl>
-  <dgm:styleLbl name="solidFgAcc1">
-    <dgm:scene3d>
-      <a:camera prst="orthographicFront"/>
-      <a:lightRig rig="threePt" dir="t"/>
-    </dgm:scene3d>
-    <dgm:sp3d/>
-    <dgm:txPr/>
-    <dgm:style>
-      <a:lnRef idx="2">
-        <a:scrgbClr r="0" g="0" b="0"/>
-      </a:lnRef>
-      <a:fillRef idx="1">
-        <a:scrgbClr r="0" g="0" b="0"/>
-      </a:fillRef>
-      <a:effectRef idx="0">
-        <a:scrgbClr r="0" g="0" b="0"/>
-      </a:effectRef>
-      <a:fontRef idx="minor"/>
-    </dgm:style>
-  </dgm:styleLbl>
-  <dgm:styleLbl name="solidAlignAcc1">
-    <dgm:scene3d>
-      <a:camera prst="orthographicFront"/>
-      <a:lightRig rig="threePt" dir="t"/>
-    </dgm:scene3d>
-    <dgm:sp3d/>
-    <dgm:txPr/>
-    <dgm:style>
-      <a:lnRef idx="2">
-        <a:scrgbClr r="0" g="0" b="0"/>
-      </a:lnRef>
-      <a:fillRef idx="1">
-        <a:scrgbClr r="0" g="0" b="0"/>
-      </a:fillRef>
-      <a:effectRef idx="0">
-        <a:scrgbClr r="0" g="0" b="0"/>
-      </a:effectRef>
-      <a:fontRef idx="minor"/>
-    </dgm:style>
-  </dgm:styleLbl>
-  <dgm:styleLbl name="solidBgAcc1">
-    <dgm:scene3d>
-      <a:camera prst="orthographicFront"/>
-      <a:lightRig rig="threePt" dir="t"/>
-    </dgm:scene3d>
-    <dgm:sp3d/>
-    <dgm:txPr/>
-    <dgm:style>
-      <a:lnRef idx="2">
-        <a:scrgbClr r="0" g="0" b="0"/>
-      </a:lnRef>
-      <a:fillRef idx="1">
-        <a:scrgbClr r="0" g="0" b="0"/>
-      </a:fillRef>
-      <a:effectRef idx="0">
-        <a:scrgbClr r="0" g="0" b="0"/>
-      </a:effectRef>
-      <a:fontRef idx="minor"/>
-    </dgm:style>
-  </dgm:styleLbl>
-  <dgm:styleLbl name="fgAccFollowNode1">
-    <dgm:scene3d>
-      <a:camera prst="orthographicFront"/>
-      <a:lightRig rig="threePt" dir="t"/>
-    </dgm:scene3d>
-    <dgm:sp3d/>
-    <dgm:txPr/>
-    <dgm:style>
-      <a:lnRef idx="2">
-        <a:scrgbClr r="0" g="0" b="0"/>
-      </a:lnRef>
-      <a:fillRef idx="1">
-        <a:scrgbClr r="0" g="0" b="0"/>
-      </a:fillRef>
-      <a:effectRef idx="0">
-        <a:scrgbClr r="0" g="0" b="0"/>
-      </a:effectRef>
-      <a:fontRef idx="minor"/>
-    </dgm:style>
-  </dgm:styleLbl>
-  <dgm:styleLbl name="alignAccFollowNode1">
-    <dgm:scene3d>
-      <a:camera prst="orthographicFront"/>
-      <a:lightRig rig="threePt" dir="t"/>
-    </dgm:scene3d>
-    <dgm:sp3d/>
-    <dgm:txPr/>
-    <dgm:style>
-      <a:lnRef idx="2">
-        <a:scrgbClr r="0" g="0" b="0"/>
-      </a:lnRef>
-      <a:fillRef idx="1">
-        <a:scrgbClr r="0" g="0" b="0"/>
-      </a:fillRef>
-      <a:effectRef idx="0">
-        <a:scrgbClr r="0" g="0" b="0"/>
-      </a:effectRef>
-      <a:fontRef idx="minor"/>
-    </dgm:style>
-  </dgm:styleLbl>
-  <dgm:styleLbl name="bgAccFollowNode1">
-    <dgm:scene3d>
-      <a:camera prst="orthographicFront"/>
-      <a:lightRig rig="threePt" dir="t"/>
-    </dgm:scene3d>
-    <dgm:sp3d/>
-    <dgm:txPr/>
-    <dgm:style>
-      <a:lnRef idx="2">
-        <a:scrgbClr r="0" g="0" b="0"/>
-      </a:lnRef>
-      <a:fillRef idx="1">
-        <a:scrgbClr r="0" g="0" b="0"/>
-      </a:fillRef>
-      <a:effectRef idx="0">
-        <a:scrgbClr r="0" g="0" b="0"/>
-      </a:effectRef>
-      <a:fontRef idx="minor"/>
-    </dgm:style>
-  </dgm:styleLbl>
-  <dgm:styleLbl name="fgAcc0">
-    <dgm:scene3d>
-      <a:camera prst="orthographicFront"/>
-      <a:lightRig rig="threePt" dir="t"/>
-    </dgm:scene3d>
-    <dgm:sp3d/>
-    <dgm:txPr/>
-    <dgm:style>
-      <a:lnRef idx="2">
-        <a:scrgbClr r="0" g="0" b="0"/>
-      </a:lnRef>
-      <a:fillRef idx="1">
-        <a:scrgbClr r="0" g="0" b="0"/>
-      </a:fillRef>
-      <a:effectRef idx="0">
-        <a:scrgbClr r="0" g="0" b="0"/>
-      </a:effectRef>
-      <a:fontRef idx="minor"/>
-    </dgm:style>
-  </dgm:styleLbl>
-  <dgm:styleLbl name="fgAcc2">
-    <dgm:scene3d>
-      <a:camera prst="orthographicFront"/>
-      <a:lightRig rig="threePt" dir="t"/>
-    </dgm:scene3d>
-    <dgm:sp3d/>
-    <dgm:txPr/>
-    <dgm:style>
-      <a:lnRef idx="2">
-        <a:scrgbClr r="0" g="0" b="0"/>
-      </a:lnRef>
-      <a:fillRef idx="1">
-        <a:scrgbClr r="0" g="0" b="0"/>
-      </a:fillRef>
-      <a:effectRef idx="0">
-        <a:scrgbClr r="0" g="0" b="0"/>
-      </a:effectRef>
-      <a:fontRef idx="minor"/>
-    </dgm:style>
-  </dgm:styleLbl>
-  <dgm:styleLbl name="fgAcc3">
-    <dgm:scene3d>
-      <a:camera prst="orthographicFront"/>
-      <a:lightRig rig="threePt" dir="t"/>
-    </dgm:scene3d>
-    <dgm:sp3d/>
-    <dgm:txPr/>
-    <dgm:style>
-      <a:lnRef idx="2">
-        <a:scrgbClr r="0" g="0" b="0"/>
-      </a:lnRef>
-      <a:fillRef idx="1">
-        <a:scrgbClr r="0" g="0" b="0"/>
-      </a:fillRef>
-      <a:effectRef idx="0">
-        <a:scrgbClr r="0" g="0" b="0"/>
-      </a:effectRef>
-      <a:fontRef idx="minor"/>
-    </dgm:style>
-  </dgm:styleLbl>
-  <dgm:styleLbl name="fgAcc4">
-    <dgm:scene3d>
-      <a:camera prst="orthographicFront"/>
-      <a:lightRig rig="threePt" dir="t"/>
-    </dgm:scene3d>
-    <dgm:sp3d/>
-    <dgm:txPr/>
-    <dgm:style>
-      <a:lnRef idx="2">
-        <a:scrgbClr r="0" g="0" b="0"/>
-      </a:lnRef>
-      <a:fillRef idx="1">
-        <a:scrgbClr r="0" g="0" b="0"/>
-      </a:fillRef>
-      <a:effectRef idx="0">
-        <a:scrgbClr r="0" g="0" b="0"/>
-      </a:effectRef>
-      <a:fontRef idx="minor"/>
-    </dgm:style>
-  </dgm:styleLbl>
-  <dgm:styleLbl name="bgShp">
-    <dgm:scene3d>
-      <a:camera prst="orthographicFront"/>
-      <a:lightRig rig="threePt" dir="t"/>
-    </dgm:scene3d>
-    <dgm:sp3d/>
-    <dgm:txPr/>
-    <dgm:style>
-      <a:lnRef idx="0">
-        <a:scrgbClr r="0" g="0" b="0"/>
-      </a:lnRef>
-      <a:fillRef idx="1">
-        <a:scrgbClr r="0" g="0" b="0"/>
-      </a:fillRef>
-      <a:effectRef idx="0">
-        <a:scrgbClr r="0" g="0" b="0"/>
-      </a:effectRef>
-      <a:fontRef idx="minor"/>
-    </dgm:style>
-  </dgm:styleLbl>
-  <dgm:styleLbl name="dkBgShp">
-    <dgm:scene3d>
-      <a:camera prst="orthographicFront"/>
-      <a:lightRig rig="threePt" dir="t"/>
-    </dgm:scene3d>
-    <dgm:sp3d/>
-    <dgm:txPr/>
-    <dgm:style>
-      <a:lnRef idx="0">
-        <a:scrgbClr r="0" g="0" b="0"/>
-      </a:lnRef>
-      <a:fillRef idx="1">
-        <a:scrgbClr r="0" g="0" b="0"/>
-      </a:fillRef>
-      <a:effectRef idx="0">
-        <a:scrgbClr r="0" g="0" b="0"/>
-      </a:effectRef>
-      <a:fontRef idx="minor"/>
-    </dgm:style>
-  </dgm:styleLbl>
-  <dgm:styleLbl name="trBgShp">
-    <dgm:scene3d>
-      <a:camera prst="orthographicFront"/>
-      <a:lightRig rig="threePt" dir="t"/>
-    </dgm:scene3d>
-    <dgm:sp3d/>
-    <dgm:txPr/>
-    <dgm:style>
-      <a:lnRef idx="0">
-        <a:scrgbClr r="0" g="0" b="0"/>
-      </a:lnRef>
-      <a:fillRef idx="1">
-        <a:scrgbClr r="0" g="0" b="0"/>
-      </a:fillRef>
-      <a:effectRef idx="0">
-        <a:scrgbClr r="0" g="0" b="0"/>
-      </a:effectRef>
-      <a:fontRef idx="minor"/>
-    </dgm:style>
-  </dgm:styleLbl>
-  <dgm:styleLbl name="fgShp">
-    <dgm:scene3d>
-      <a:camera prst="orthographicFront"/>
-      <a:lightRig rig="threePt" dir="t"/>
-    </dgm:scene3d>
-    <dgm:sp3d/>
-    <dgm:txPr/>
-    <dgm:style>
-      <a:lnRef idx="3">
-        <a:scrgbClr r="0" g="0" b="0"/>
-      </a:lnRef>
-      <a:fillRef idx="1">
-        <a:scrgbClr r="0" g="0" b="0"/>
-      </a:fillRef>
-      <a:effectRef idx="1">
-        <a:scrgbClr r="0" g="0" b="0"/>
-      </a:effectRef>
-      <a:fontRef idx="minor"/>
-    </dgm:style>
-  </dgm:styleLbl>
-  <dgm:styleLbl name="revTx">
-    <dgm:scene3d>
-      <a:camera prst="orthographicFront"/>
-      <a:lightRig rig="threePt" dir="t"/>
-    </dgm:scene3d>
-    <dgm:sp3d/>
-    <dgm:txPr/>
-    <dgm:style>
-      <a:lnRef idx="0">
-        <a:scrgbClr r="0" g="0" b="0"/>
-      </a:lnRef>
-      <a:fillRef idx="0">
-        <a:scrgbClr r="0" g="0" b="0"/>
-      </a:fillRef>
-      <a:effectRef idx="0">
-        <a:scrgbClr r="0" g="0" b="0"/>
-      </a:effectRef>
-      <a:fontRef idx="minor"/>
-    </dgm:style>
-  </dgm:styleLbl>
-</dgm:styleDef>
 </file>
 
 <file path=ppt/slideLayouts/slideLayout1.xml><?xml version="1.0" encoding="utf-8"?>
@@ -8866,7 +4650,7 @@
           <p:cNvPr id="2" name="Title 1">
             <a:extLst>
               <a:ext uri="{FF2B5EF4-FFF2-40B4-BE49-F238E27FC236}">
-                <a16:creationId xmlns:a16="http://schemas.microsoft.com/office/drawing/2014/main" id="{92C9295F-E638-4F61-AFE2-CF3E40556031}"/>
+                <a16:creationId xmlns:a16="http://schemas.microsoft.com/office/drawing/2014/main" id="{A38FD3A9-F35D-4E2C-8963-00925B1C81AF}"/>
               </a:ext>
             </a:extLst>
           </p:cNvPr>
@@ -8877,65 +4661,66 @@
             <p:ph type="title"/>
           </p:nvPr>
         </p:nvSpPr>
-        <p:spPr>
-          <a:xfrm>
-            <a:off x="1066800" y="642594"/>
-            <a:ext cx="10058400" cy="1371600"/>
-          </a:xfrm>
-        </p:spPr>
-        <p:txBody>
-          <a:bodyPr>
+        <p:spPr/>
+        <p:txBody>
+          <a:bodyPr vert="horz" lIns="91440" tIns="45720" rIns="91440" bIns="45720" rtlCol="0" anchor="ctr">
             <a:normAutofit/>
           </a:bodyPr>
           <a:lstStyle/>
           <a:p>
-            <a:pPr algn="ctr"/>
-            <a:r>
-              <a:rPr lang="en-US" dirty="0">
+            <a:pPr algn="ctr">
+              <a:lnSpc>
+                <a:spcPct val="83000"/>
+              </a:lnSpc>
+            </a:pPr>
+            <a:r>
+              <a:rPr lang="en-US" sz="4400" cap="all" spc="-100" dirty="0">
                 <a:latin typeface="Algerian" panose="04020705040A02060702" pitchFamily="82" charset="0"/>
               </a:rPr>
-              <a:t>Overview</a:t>
-            </a:r>
-          </a:p>
-        </p:txBody>
-      </p:sp>
-      <p:graphicFrame>
-        <p:nvGraphicFramePr>
-          <p:cNvPr id="31" name="Content Placeholder 2" descr="SmartArt timeline">
+              <a:t>Data source</a:t>
+            </a:r>
+          </a:p>
+        </p:txBody>
+      </p:sp>
+      <p:pic>
+        <p:nvPicPr>
+          <p:cNvPr id="6" name="Picture 5">
             <a:extLst>
               <a:ext uri="{FF2B5EF4-FFF2-40B4-BE49-F238E27FC236}">
-                <a16:creationId xmlns:a16="http://schemas.microsoft.com/office/drawing/2014/main" id="{613FC9B6-ED9E-4F51-A217-156DA01928CD}"/>
+                <a16:creationId xmlns:a16="http://schemas.microsoft.com/office/drawing/2014/main" id="{E85B2AF2-A4E9-476C-B1DB-B7BEFB6DBCAD}"/>
               </a:ext>
             </a:extLst>
           </p:cNvPr>
-          <p:cNvGraphicFramePr/>
-          <p:nvPr>
-            <p:extLst>
-              <p:ext uri="{D42A27DB-BD31-4B8C-83A1-F6EECF244321}">
-                <p14:modId xmlns:p14="http://schemas.microsoft.com/office/powerpoint/2010/main" val="4131268238"/>
-              </p:ext>
-            </p:extLst>
-          </p:nvPr>
-        </p:nvGraphicFramePr>
-        <p:xfrm>
-          <a:off x="1066800" y="2310063"/>
-          <a:ext cx="10058400" cy="3725612"/>
-        </p:xfrm>
-        <a:graphic>
-          <a:graphicData uri="http://schemas.openxmlformats.org/drawingml/2006/diagram">
-            <dgm:relIds xmlns:dgm="http://schemas.openxmlformats.org/drawingml/2006/diagram" xmlns:r="http://schemas.openxmlformats.org/officeDocument/2006/relationships" r:dm="rId3" r:lo="rId4" r:qs="rId5" r:cs="rId6"/>
-          </a:graphicData>
-        </a:graphic>
-      </p:graphicFrame>
+          <p:cNvPicPr>
+            <a:picLocks noChangeAspect="1"/>
+          </p:cNvPicPr>
+          <p:nvPr/>
+        </p:nvPicPr>
+        <p:blipFill>
+          <a:blip r:embed="rId2"/>
+          <a:stretch>
+            <a:fillRect/>
+          </a:stretch>
+        </p:blipFill>
+        <p:spPr>
+          <a:xfrm>
+            <a:off x="1010913" y="2121370"/>
+            <a:ext cx="10335495" cy="3431954"/>
+          </a:xfrm>
+          <a:prstGeom prst="rect">
+            <a:avLst/>
+          </a:prstGeom>
+        </p:spPr>
+      </p:pic>
     </p:spTree>
     <p:extLst>
       <p:ext uri="{BB962C8B-B14F-4D97-AF65-F5344CB8AC3E}">
-        <p14:creationId xmlns:p14="http://schemas.microsoft.com/office/powerpoint/2010/main" val="2049548788"/>
+        <p14:creationId xmlns:p14="http://schemas.microsoft.com/office/powerpoint/2010/main" val="3441444383"/>
       </p:ext>
     </p:extLst>
   </p:cSld>
   <p:clrMapOvr>
-    <a:masterClrMapping/>
+    <a:overrideClrMapping bg1="dk1" tx1="lt1" bg2="dk2" tx2="lt2" accent1="accent1" accent2="accent2" accent3="accent3" accent4="accent4" accent5="accent5" accent6="accent6" hlink="hlink" folHlink="folHlink"/>
   </p:clrMapOvr>
 </p:sld>
 </file>
@@ -8997,111 +4782,6 @@
               <a:rPr lang="en-US" sz="4400" cap="all" spc="-100" dirty="0">
                 <a:latin typeface="Algerian" panose="04020705040A02060702" pitchFamily="82" charset="0"/>
               </a:rPr>
-              <a:t>Data source</a:t>
-            </a:r>
-          </a:p>
-        </p:txBody>
-      </p:sp>
-      <p:pic>
-        <p:nvPicPr>
-          <p:cNvPr id="6" name="Picture 5">
-            <a:extLst>
-              <a:ext uri="{FF2B5EF4-FFF2-40B4-BE49-F238E27FC236}">
-                <a16:creationId xmlns:a16="http://schemas.microsoft.com/office/drawing/2014/main" id="{E85B2AF2-A4E9-476C-B1DB-B7BEFB6DBCAD}"/>
-              </a:ext>
-            </a:extLst>
-          </p:cNvPr>
-          <p:cNvPicPr>
-            <a:picLocks noChangeAspect="1"/>
-          </p:cNvPicPr>
-          <p:nvPr/>
-        </p:nvPicPr>
-        <p:blipFill>
-          <a:blip r:embed="rId2"/>
-          <a:stretch>
-            <a:fillRect/>
-          </a:stretch>
-        </p:blipFill>
-        <p:spPr>
-          <a:xfrm>
-            <a:off x="1010913" y="2121370"/>
-            <a:ext cx="10335495" cy="3431954"/>
-          </a:xfrm>
-          <a:prstGeom prst="rect">
-            <a:avLst/>
-          </a:prstGeom>
-        </p:spPr>
-      </p:pic>
-    </p:spTree>
-    <p:extLst>
-      <p:ext uri="{BB962C8B-B14F-4D97-AF65-F5344CB8AC3E}">
-        <p14:creationId xmlns:p14="http://schemas.microsoft.com/office/powerpoint/2010/main" val="3441444383"/>
-      </p:ext>
-    </p:extLst>
-  </p:cSld>
-  <p:clrMapOvr>
-    <a:overrideClrMapping bg1="dk1" tx1="lt1" bg2="dk2" tx2="lt2" accent1="accent1" accent2="accent2" accent3="accent3" accent4="accent4" accent5="accent5" accent6="accent6" hlink="hlink" folHlink="folHlink"/>
-  </p:clrMapOvr>
-</p:sld>
-</file>
-
-<file path=ppt/slides/slide4.xml><?xml version="1.0" encoding="utf-8"?>
-<p:sld xmlns:a="http://schemas.openxmlformats.org/drawingml/2006/main" xmlns:r="http://schemas.openxmlformats.org/officeDocument/2006/relationships" xmlns:p="http://schemas.openxmlformats.org/presentationml/2006/main">
-  <p:cSld>
-    <p:bg>
-      <p:bgPr>
-        <a:solidFill>
-          <a:schemeClr val="bg1"/>
-        </a:solidFill>
-        <a:effectLst/>
-      </p:bgPr>
-    </p:bg>
-    <p:spTree>
-      <p:nvGrpSpPr>
-        <p:cNvPr id="1" name=""/>
-        <p:cNvGrpSpPr/>
-        <p:nvPr/>
-      </p:nvGrpSpPr>
-      <p:grpSpPr>
-        <a:xfrm>
-          <a:off x="0" y="0"/>
-          <a:ext cx="0" cy="0"/>
-          <a:chOff x="0" y="0"/>
-          <a:chExt cx="0" cy="0"/>
-        </a:xfrm>
-      </p:grpSpPr>
-      <p:sp>
-        <p:nvSpPr>
-          <p:cNvPr id="2" name="Title 1">
-            <a:extLst>
-              <a:ext uri="{FF2B5EF4-FFF2-40B4-BE49-F238E27FC236}">
-                <a16:creationId xmlns:a16="http://schemas.microsoft.com/office/drawing/2014/main" id="{A38FD3A9-F35D-4E2C-8963-00925B1C81AF}"/>
-              </a:ext>
-            </a:extLst>
-          </p:cNvPr>
-          <p:cNvSpPr>
-            <a:spLocks noGrp="1"/>
-          </p:cNvSpPr>
-          <p:nvPr>
-            <p:ph type="title"/>
-          </p:nvPr>
-        </p:nvSpPr>
-        <p:spPr/>
-        <p:txBody>
-          <a:bodyPr vert="horz" lIns="91440" tIns="45720" rIns="91440" bIns="45720" rtlCol="0" anchor="ctr">
-            <a:normAutofit/>
-          </a:bodyPr>
-          <a:lstStyle/>
-          <a:p>
-            <a:pPr algn="ctr">
-              <a:lnSpc>
-                <a:spcPct val="83000"/>
-              </a:lnSpc>
-            </a:pPr>
-            <a:r>
-              <a:rPr lang="en-US" sz="4400" cap="all" spc="-100" dirty="0">
-                <a:latin typeface="Algerian" panose="04020705040A02060702" pitchFamily="82" charset="0"/>
-              </a:rPr>
               <a:t>Dive into the data</a:t>
             </a:r>
           </a:p>
@@ -9360,7 +5040,7 @@
 </p:sld>
 </file>
 
-<file path=ppt/slides/slide5.xml><?xml version="1.0" encoding="utf-8"?>
+<file path=ppt/slides/slide4.xml><?xml version="1.0" encoding="utf-8"?>
 <p:sld xmlns:a="http://schemas.openxmlformats.org/drawingml/2006/main" xmlns:r="http://schemas.openxmlformats.org/officeDocument/2006/relationships" xmlns:p="http://schemas.openxmlformats.org/presentationml/2006/main">
   <p:cSld>
     <p:bg>
@@ -10041,7 +5721,7 @@
 </p:sld>
 </file>
 
-<file path=ppt/slides/slide6.xml><?xml version="1.0" encoding="utf-8"?>
+<file path=ppt/slides/slide5.xml><?xml version="1.0" encoding="utf-8"?>
 <p:sld xmlns:a="http://schemas.openxmlformats.org/drawingml/2006/main" xmlns:r="http://schemas.openxmlformats.org/officeDocument/2006/relationships" xmlns:p="http://schemas.openxmlformats.org/presentationml/2006/main">
   <p:cSld>
     <p:bg>
@@ -10198,7 +5878,7 @@
 </p:sld>
 </file>
 
-<file path=ppt/slides/slide7.xml><?xml version="1.0" encoding="utf-8"?>
+<file path=ppt/slides/slide6.xml><?xml version="1.0" encoding="utf-8"?>
 <p:sld xmlns:a="http://schemas.openxmlformats.org/drawingml/2006/main" xmlns:r="http://schemas.openxmlformats.org/officeDocument/2006/relationships" xmlns:p="http://schemas.openxmlformats.org/presentationml/2006/main">
   <p:cSld>
     <p:bg>
@@ -10835,68 +6515,7 @@
 </a:themeOverride>
 </file>
 
-<file path=ppt/theme/themeOverride2.xml><?xml version="1.0" encoding="utf-8"?>
-<a:themeOverride xmlns:a="http://schemas.openxmlformats.org/drawingml/2006/main">
-  <a:clrScheme name="Blue">
-    <a:dk1>
-      <a:sysClr val="windowText" lastClr="000000"/>
-    </a:dk1>
-    <a:lt1>
-      <a:sysClr val="window" lastClr="FFFFFF"/>
-    </a:lt1>
-    <a:dk2>
-      <a:srgbClr val="17406D"/>
-    </a:dk2>
-    <a:lt2>
-      <a:srgbClr val="DBEFF9"/>
-    </a:lt2>
-    <a:accent1>
-      <a:srgbClr val="0F6FC6"/>
-    </a:accent1>
-    <a:accent2>
-      <a:srgbClr val="009DD9"/>
-    </a:accent2>
-    <a:accent3>
-      <a:srgbClr val="0BD0D9"/>
-    </a:accent3>
-    <a:accent4>
-      <a:srgbClr val="10CF9B"/>
-    </a:accent4>
-    <a:accent5>
-      <a:srgbClr val="7CCA62"/>
-    </a:accent5>
-    <a:accent6>
-      <a:srgbClr val="A5C249"/>
-    </a:accent6>
-    <a:hlink>
-      <a:srgbClr val="F49100"/>
-    </a:hlink>
-    <a:folHlink>
-      <a:srgbClr val="85DFD0"/>
-    </a:folHlink>
-  </a:clrScheme>
-</a:themeOverride>
-</file>
-
 <file path=customXml/item1.xml><?xml version="1.0" encoding="utf-8"?>
-<p:properties xmlns:p="http://schemas.microsoft.com/office/2006/metadata/properties" xmlns:xsi="http://www.w3.org/2001/XMLSchema-instance" xmlns:pc="http://schemas.microsoft.com/office/infopath/2007/PartnerControls">
-  <documentManagement>
-    <Status xmlns="71af3243-3dd4-4a8d-8c0d-dd76da1f02a5">Not started</Status>
-    <MediaServiceKeyPoints xmlns="71af3243-3dd4-4a8d-8c0d-dd76da1f02a5" xsi:nil="true"/>
-  </documentManagement>
-</p:properties>
-</file>
-
-<file path=customXml/item2.xml><?xml version="1.0" encoding="utf-8"?>
-<?mso-contentType ?>
-<FormTemplates xmlns="http://schemas.microsoft.com/sharepoint/v3/contenttype/forms">
-  <Display>DocumentLibraryForm</Display>
-  <Edit>DocumentLibraryForm</Edit>
-  <New>DocumentLibraryForm</New>
-</FormTemplates>
-</file>
-
-<file path=customXml/item3.xml><?xml version="1.0" encoding="utf-8"?>
 <ct:contentTypeSchema xmlns:ct="http://schemas.microsoft.com/office/2006/metadata/contentType" xmlns:ma="http://schemas.microsoft.com/office/2006/metadata/properties/metaAttributes" ct:_="" ma:_="" ma:contentTypeName="Document" ma:contentTypeID="0x01010079F111ED35F8CC479449609E8A0923A6" ma:contentTypeVersion="12" ma:contentTypeDescription="Create a new document." ma:contentTypeScope="" ma:versionID="a410dd7f93c95333ffa1b60ed6adedd1">
   <xsd:schema xmlns:xsd="http://www.w3.org/2001/XMLSchema" xmlns:xs="http://www.w3.org/2001/XMLSchema" xmlns:p="http://schemas.microsoft.com/office/2006/metadata/properties" xmlns:ns2="71af3243-3dd4-4a8d-8c0d-dd76da1f02a5" xmlns:ns3="16c05727-aa75-4e4a-9b5f-8a80a1165891" targetNamespace="http://schemas.microsoft.com/office/2006/metadata/properties" ma:root="true" ma:fieldsID="a936d9baba76aa3866493feff160faab" ns2:_="" ns3:_="">
     <xsd:import namespace="71af3243-3dd4-4a8d-8c0d-dd76da1f02a5"/>
@@ -11117,25 +6736,25 @@
 </ct:contentTypeSchema>
 </file>
 
-<file path=customXml/itemProps1.xml><?xml version="1.0" encoding="utf-8"?>
-<ds:datastoreItem xmlns:ds="http://schemas.openxmlformats.org/officeDocument/2006/customXml" ds:itemID="{B975FBC4-9D33-46BE-911D-419763BA9AF9}">
-  <ds:schemaRefs>
-    <ds:schemaRef ds:uri="http://schemas.microsoft.com/office/2006/metadata/properties"/>
-    <ds:schemaRef ds:uri="http://schemas.microsoft.com/office/infopath/2007/PartnerControls"/>
-    <ds:schemaRef ds:uri="71af3243-3dd4-4a8d-8c0d-dd76da1f02a5"/>
-  </ds:schemaRefs>
-</ds:datastoreItem>
+<file path=customXml/item2.xml><?xml version="1.0" encoding="utf-8"?>
+<?mso-contentType ?>
+<FormTemplates xmlns="http://schemas.microsoft.com/sharepoint/v3/contenttype/forms">
+  <Display>DocumentLibraryForm</Display>
+  <Edit>DocumentLibraryForm</Edit>
+  <New>DocumentLibraryForm</New>
+</FormTemplates>
 </file>
 
-<file path=customXml/itemProps2.xml><?xml version="1.0" encoding="utf-8"?>
-<ds:datastoreItem xmlns:ds="http://schemas.openxmlformats.org/officeDocument/2006/customXml" ds:itemID="{294F055B-D391-44D3-A87A-BCD07BD5A31C}">
-  <ds:schemaRefs>
-    <ds:schemaRef ds:uri="http://schemas.microsoft.com/sharepoint/v3/contenttype/forms"/>
-  </ds:schemaRefs>
-</ds:datastoreItem>
+<file path=customXml/item3.xml><?xml version="1.0" encoding="utf-8"?>
+<p:properties xmlns:p="http://schemas.microsoft.com/office/2006/metadata/properties" xmlns:xsi="http://www.w3.org/2001/XMLSchema-instance" xmlns:pc="http://schemas.microsoft.com/office/infopath/2007/PartnerControls">
+  <documentManagement>
+    <Status xmlns="71af3243-3dd4-4a8d-8c0d-dd76da1f02a5">Not started</Status>
+    <MediaServiceKeyPoints xmlns="71af3243-3dd4-4a8d-8c0d-dd76da1f02a5" xsi:nil="true"/>
+  </documentManagement>
+</p:properties>
 </file>
 
-<file path=customXml/itemProps3.xml><?xml version="1.0" encoding="utf-8"?>
+<file path=customXml/itemProps1.xml><?xml version="1.0" encoding="utf-8"?>
 <ds:datastoreItem xmlns:ds="http://schemas.openxmlformats.org/officeDocument/2006/customXml" ds:itemID="{26DBD101-FC0A-4B21-82B0-57CAA7AEEC71}">
   <ds:schemaRefs>
     <ds:schemaRef ds:uri="http://schemas.microsoft.com/office/2006/metadata/contentType"/>
@@ -11152,4 +6771,22 @@
     <ds:schemaRef ds:uri="http://schemas.microsoft.com/internal/obd"/>
   </ds:schemaRefs>
 </ds:datastoreItem>
+</file>
+
+<file path=customXml/itemProps2.xml><?xml version="1.0" encoding="utf-8"?>
+<ds:datastoreItem xmlns:ds="http://schemas.openxmlformats.org/officeDocument/2006/customXml" ds:itemID="{294F055B-D391-44D3-A87A-BCD07BD5A31C}">
+  <ds:schemaRefs>
+    <ds:schemaRef ds:uri="http://schemas.microsoft.com/sharepoint/v3/contenttype/forms"/>
+  </ds:schemaRefs>
+</ds:datastoreItem>
+</file>
+
+<file path=customXml/itemProps3.xml><?xml version="1.0" encoding="utf-8"?>
+<ds:datastoreItem xmlns:ds="http://schemas.openxmlformats.org/officeDocument/2006/customXml" ds:itemID="{B975FBC4-9D33-46BE-911D-419763BA9AF9}">
+  <ds:schemaRefs>
+    <ds:schemaRef ds:uri="http://schemas.microsoft.com/office/2006/metadata/properties"/>
+    <ds:schemaRef ds:uri="http://schemas.microsoft.com/office/infopath/2007/PartnerControls"/>
+    <ds:schemaRef ds:uri="71af3243-3dd4-4a8d-8c0d-dd76da1f02a5"/>
+  </ds:schemaRefs>
+</ds:datastoreItem>
 </file>
</xml_diff>